<commit_message>
REPORTGEN-234 : fix typo in templates
</commit_message>
<xml_diff>
--- a/CastReporting.Reporting/TemplatesFiles/Generic Graph Definition.pptx
+++ b/CastReporting.Reporting/TemplatesFiles/Generic Graph Definition.pptx
@@ -6225,7 +6225,7 @@
           <a:p>
             <a:fld id="{BE7CF963-E58D-FC4D-BA9E-60A980752DC6}" type="datetimeFigureOut">
               <a:rPr lang="en-US" smtClean="0"/>
-              <a:t>2/28/2017</a:t>
+              <a:t>3/28/2017</a:t>
             </a:fld>
             <a:endParaRPr lang="en-US"/>
           </a:p>
@@ -6714,7 +6714,7 @@
           <a:p>
             <a:fld id="{B590C078-9131-4E49-8A0D-400FEE8377B5}" type="datetimeFigureOut">
               <a:rPr lang="en-US" smtClean="0"/>
-              <a:t>2/28/2017</a:t>
+              <a:t>3/28/2017</a:t>
             </a:fld>
             <a:endParaRPr lang="en-US"/>
           </a:p>
@@ -10299,7 +10299,7 @@
           <a:p>
             <a:fld id="{B590C078-9131-4E49-8A0D-400FEE8377B5}" type="datetimeFigureOut">
               <a:rPr lang="en-US" smtClean="0"/>
-              <a:t>2/28/2017</a:t>
+              <a:t>3/28/2017</a:t>
             </a:fld>
             <a:endParaRPr lang="en-US"/>
           </a:p>
@@ -14377,7 +14377,7 @@
           <a:p>
             <a:fld id="{B590C078-9131-4E49-8A0D-400FEE8377B5}" type="datetimeFigureOut">
               <a:rPr lang="en-US" smtClean="0"/>
-              <a:t>2/28/2017</a:t>
+              <a:t>3/28/2017</a:t>
             </a:fld>
             <a:endParaRPr lang="en-US"/>
           </a:p>
@@ -18202,7 +18202,7 @@
           <a:p>
             <a:fld id="{B590C078-9131-4E49-8A0D-400FEE8377B5}" type="datetimeFigureOut">
               <a:rPr lang="en-US" smtClean="0"/>
-              <a:t>2/28/2017</a:t>
+              <a:t>3/28/2017</a:t>
             </a:fld>
             <a:endParaRPr lang="en-US"/>
           </a:p>
@@ -20447,8 +20447,12 @@
           </a:p>
           <a:p>
             <a:r>
+              <a:rPr lang="en-GB"/>
+              <a:t>COL 1: </a:t>
+            </a:r>
+            <a:r>
               <a:rPr lang="en-GB" dirty="0"/>
-              <a:t>COL 1,: 1</a:t>
+              <a:t>1</a:t>
             </a:r>
             <a:r>
               <a:rPr lang="en-GB" baseline="30000" dirty="0"/>

</xml_diff>

<commit_message>
REPORTGEN-234 : new templates from DCH
</commit_message>
<xml_diff>
--- a/CastReporting.Reporting/TemplatesFiles/Generic Graph Definition.pptx
+++ b/CastReporting.Reporting/TemplatesFiles/Generic Graph Definition.pptx
@@ -16,7 +16,7 @@
     <p:sldId id="380" r:id="rId7"/>
     <p:sldId id="381" r:id="rId8"/>
     <p:sldId id="382" r:id="rId9"/>
-    <p:sldId id="384" r:id="rId10"/>
+    <p:sldId id="385" r:id="rId10"/>
   </p:sldIdLst>
   <p:sldSz cx="12192000" cy="6858000"/>
   <p:notesSz cx="6858000" cy="9144000"/>
@@ -155,7 +155,7 @@
           <a:lstStyle/>
           <a:p>
             <a:pPr>
-              <a:defRPr sz="1862" b="0" i="0" u="none" strike="noStrike" kern="1200" spc="0" baseline="0">
+              <a:defRPr sz="1200" b="1" i="0" u="none" strike="noStrike" kern="1200" spc="0" baseline="0">
                 <a:solidFill>
                   <a:schemeClr val="tx1">
                     <a:lumMod val="65000"/>
@@ -168,10 +168,10 @@
               </a:defRPr>
             </a:pPr>
             <a:r>
-              <a:rPr lang="en-US" sz="1800" noProof="0" dirty="0">
+              <a:rPr lang="en-US" sz="1200" b="1" noProof="0" dirty="0">
                 <a:effectLst/>
               </a:rPr>
-              <a:t>Health Factors benchmark</a:t>
+              <a:t>HEALTH FACTORS BENCHMARK</a:t>
             </a:r>
           </a:p>
         </c:rich>
@@ -189,7 +189,7 @@
         <a:lstStyle/>
         <a:p>
           <a:pPr>
-            <a:defRPr sz="1862" b="0" i="0" u="none" strike="noStrike" kern="1200" spc="0" baseline="0">
+            <a:defRPr sz="1200" b="1" i="0" u="none" strike="noStrike" kern="1200" spc="0" baseline="0">
               <a:solidFill>
                 <a:schemeClr val="tx1">
                   <a:lumMod val="65000"/>
@@ -238,9 +238,9 @@
           <c:invertIfNegative val="0"/>
           <c:cat>
             <c:strRef>
-              <c:f>Sheet1!$A$2:$A$5</c:f>
+              <c:f>Sheet1!$A$2:$A$6</c:f>
               <c:strCache>
-                <c:ptCount val="4"/>
+                <c:ptCount val="5"/>
                 <c:pt idx="0">
                   <c:v>Category 1</c:v>
                 </c:pt>
@@ -253,17 +253,20 @@
                 <c:pt idx="3">
                   <c:v>Category 4</c:v>
                 </c:pt>
+                <c:pt idx="4">
+                  <c:v>Category 5</c:v>
+                </c:pt>
               </c:strCache>
             </c:strRef>
           </c:cat>
           <c:val>
             <c:numRef>
-              <c:f>Sheet1!$B$2:$B$5</c:f>
+              <c:f>Sheet1!$B$2:$B$6</c:f>
               <c:numCache>
                 <c:formatCode>General</c:formatCode>
-                <c:ptCount val="4"/>
+                <c:ptCount val="5"/>
                 <c:pt idx="0">
-                  <c:v>4.3</c:v>
+                  <c:v>3.5</c:v>
                 </c:pt>
                 <c:pt idx="1">
                   <c:v>2.5</c:v>
@@ -272,7 +275,10 @@
                   <c:v>3.5</c:v>
                 </c:pt>
                 <c:pt idx="3">
-                  <c:v>4.5</c:v>
+                  <c:v>2.2999999999999998</c:v>
+                </c:pt>
+                <c:pt idx="4">
+                  <c:v>2.2999999999999998</c:v>
                 </c:pt>
               </c:numCache>
             </c:numRef>
@@ -309,9 +315,9 @@
           <c:invertIfNegative val="0"/>
           <c:cat>
             <c:strRef>
-              <c:f>Sheet1!$A$2:$A$5</c:f>
+              <c:f>Sheet1!$A$2:$A$6</c:f>
               <c:strCache>
-                <c:ptCount val="4"/>
+                <c:ptCount val="5"/>
                 <c:pt idx="0">
                   <c:v>Category 1</c:v>
                 </c:pt>
@@ -324,26 +330,32 @@
                 <c:pt idx="3">
                   <c:v>Category 4</c:v>
                 </c:pt>
+                <c:pt idx="4">
+                  <c:v>Category 5</c:v>
+                </c:pt>
               </c:strCache>
             </c:strRef>
           </c:cat>
           <c:val>
             <c:numRef>
-              <c:f>Sheet1!$C$2:$C$5</c:f>
+              <c:f>Sheet1!$C$2:$C$6</c:f>
               <c:numCache>
                 <c:formatCode>General</c:formatCode>
-                <c:ptCount val="4"/>
+                <c:ptCount val="5"/>
                 <c:pt idx="0">
                   <c:v>2.4</c:v>
                 </c:pt>
                 <c:pt idx="1">
-                  <c:v>4.4000000000000004</c:v>
+                  <c:v>2.2999999999999998</c:v>
                 </c:pt>
                 <c:pt idx="2">
                   <c:v>1.8</c:v>
                 </c:pt>
                 <c:pt idx="3">
                   <c:v>2.8</c:v>
+                </c:pt>
+                <c:pt idx="4">
+                  <c:v>2.7</c:v>
                 </c:pt>
               </c:numCache>
             </c:numRef>
@@ -422,8 +434,8 @@
         <c:axId val="582959936"/>
         <c:scaling>
           <c:orientation val="minMax"/>
-          <c:max val="4"/>
-          <c:min val="1"/>
+          <c:max val="4.5"/>
+          <c:min val="0.5"/>
         </c:scaling>
         <c:delete val="0"/>
         <c:axPos val="l"/>
@@ -475,6 +487,7 @@
         <c:crossAx val="582957968"/>
         <c:crosses val="autoZero"/>
         <c:crossBetween val="between"/>
+        <c:majorUnit val="0.5"/>
       </c:valAx>
       <c:spPr>
         <a:noFill/>
@@ -563,7 +576,7 @@
           <a:lstStyle/>
           <a:p>
             <a:pPr>
-              <a:defRPr sz="1862" b="0" i="0" u="none" strike="noStrike" kern="1200" spc="0" baseline="0">
+              <a:defRPr sz="1200" b="1" i="0" u="none" strike="noStrike" kern="1200" spc="0" baseline="0">
                 <a:solidFill>
                   <a:schemeClr val="tx1">
                     <a:lumMod val="65000"/>
@@ -576,48 +589,12 @@
               </a:defRPr>
             </a:pPr>
             <a:r>
-              <a:rPr lang="fr-FR" sz="1800" dirty="0" err="1">
+              <a:rPr lang="fr-FR" sz="1200" b="1" dirty="0">
                 <a:effectLst/>
               </a:rPr>
-              <a:t>Health</a:t>
-            </a:r>
-            <a:r>
-              <a:rPr lang="fr-FR" sz="1800" dirty="0">
-                <a:effectLst/>
-              </a:rPr>
-              <a:t> </a:t>
-            </a:r>
-            <a:r>
-              <a:rPr lang="fr-FR" sz="1800" dirty="0" err="1">
-                <a:effectLst/>
-              </a:rPr>
-              <a:t>factors</a:t>
-            </a:r>
-            <a:r>
-              <a:rPr lang="fr-FR" sz="1800" dirty="0">
-                <a:effectLst/>
-              </a:rPr>
-              <a:t> by Module for </a:t>
-            </a:r>
-            <a:r>
-              <a:rPr lang="fr-FR" sz="1800" dirty="0" err="1">
-                <a:effectLst/>
-              </a:rPr>
-              <a:t>current</a:t>
-            </a:r>
-            <a:r>
-              <a:rPr lang="fr-FR" sz="1800" dirty="0">
-                <a:effectLst/>
-              </a:rPr>
-              <a:t> </a:t>
-            </a:r>
-            <a:r>
-              <a:rPr lang="fr-FR" sz="1800" dirty="0" err="1">
-                <a:effectLst/>
-              </a:rPr>
-              <a:t>snapshot</a:t>
-            </a:r>
-            <a:endParaRPr lang="en-US" sz="1800" dirty="0">
+              <a:t>HEALTH FACTORS BY MODULE FOR CURRENT SNAPSHOT</a:t>
+            </a:r>
+            <a:endParaRPr lang="en-US" sz="1200" b="1" dirty="0">
               <a:effectLst/>
             </a:endParaRPr>
           </a:p>
@@ -636,7 +613,7 @@
         <a:lstStyle/>
         <a:p>
           <a:pPr>
-            <a:defRPr sz="1862" b="0" i="0" u="none" strike="noStrike" kern="1200" spc="0" baseline="0">
+            <a:defRPr sz="1200" b="1" i="0" u="none" strike="noStrike" kern="1200" spc="0" baseline="0">
               <a:solidFill>
                 <a:schemeClr val="tx1">
                   <a:lumMod val="65000"/>
@@ -1142,8 +1119,8 @@
         <c:axId val="461299544"/>
         <c:scaling>
           <c:orientation val="minMax"/>
-          <c:max val="4"/>
-          <c:min val="1"/>
+          <c:max val="4.5"/>
+          <c:min val="0.5"/>
         </c:scaling>
         <c:delete val="0"/>
         <c:axPos val="l"/>
@@ -1285,7 +1262,7 @@
           <a:lstStyle/>
           <a:p>
             <a:pPr>
-              <a:defRPr sz="1862" b="0" i="0" u="none" strike="noStrike" kern="1200" spc="0" baseline="0">
+              <a:defRPr sz="1000" b="1" i="0" u="none" strike="noStrike" kern="1200" spc="0" baseline="0">
                 <a:solidFill>
                   <a:schemeClr val="tx1">
                     <a:lumMod val="65000"/>
@@ -1298,42 +1275,30 @@
               </a:defRPr>
             </a:pPr>
             <a:r>
-              <a:rPr lang="fr-FR" sz="1800" dirty="0" err="1">
+              <a:rPr lang="fr-FR" sz="1000" b="1" dirty="0">
                 <a:effectLst/>
               </a:rPr>
-              <a:t>Added</a:t>
-            </a:r>
-            <a:r>
-              <a:rPr lang="fr-FR" sz="1800" dirty="0">
+              <a:t>ROBUSTNESS</a:t>
+            </a:r>
+            <a:r>
+              <a:rPr lang="fr-FR" sz="1000" b="1" baseline="0" dirty="0">
                 <a:effectLst/>
               </a:rPr>
-              <a:t> and </a:t>
-            </a:r>
-            <a:r>
-              <a:rPr lang="fr-FR" sz="1800" dirty="0" err="1">
+              <a:t> - </a:t>
+            </a:r>
+            <a:r>
+              <a:rPr lang="fr-FR" sz="1000" b="1" dirty="0">
                 <a:effectLst/>
               </a:rPr>
-              <a:t>Removed</a:t>
-            </a:r>
-            <a:r>
-              <a:rPr lang="fr-FR" sz="1800" dirty="0">
+              <a:t>CRITICAL VIOLATIONS OVERVIEW BY</a:t>
+            </a:r>
+            <a:r>
+              <a:rPr lang="fr-FR" sz="1000" b="1" baseline="0" dirty="0">
                 <a:effectLst/>
               </a:rPr>
-              <a:t> </a:t>
-            </a:r>
-            <a:r>
-              <a:rPr lang="fr-FR" sz="1800" dirty="0" err="1">
-                <a:effectLst/>
-              </a:rPr>
-              <a:t>critical</a:t>
-            </a:r>
-            <a:r>
-              <a:rPr lang="fr-FR" sz="1800" dirty="0">
-                <a:effectLst/>
-              </a:rPr>
-              <a:t> violations</a:t>
-            </a:r>
-            <a:endParaRPr lang="en-US" sz="1800" dirty="0">
+              <a:t> MODULE</a:t>
+            </a:r>
+            <a:endParaRPr lang="en-US" sz="1000" b="1" dirty="0">
               <a:effectLst/>
             </a:endParaRPr>
           </a:p>
@@ -1352,7 +1317,7 @@
         <a:lstStyle/>
         <a:p>
           <a:pPr>
-            <a:defRPr sz="1862" b="0" i="0" u="none" strike="noStrike" kern="1200" spc="0" baseline="0">
+            <a:defRPr sz="1000" b="1" i="0" u="none" strike="noStrike" kern="1200" spc="0" baseline="0">
               <a:solidFill>
                 <a:schemeClr val="tx1">
                   <a:lumMod val="65000"/>
@@ -1373,7 +1338,7 @@
       <c:layout/>
       <c:barChart>
         <c:barDir val="bar"/>
-        <c:grouping val="stacked"/>
+        <c:grouping val="clustered"/>
         <c:varyColors val="0"/>
         <c:ser>
           <c:idx val="0"/>
@@ -1384,7 +1349,7 @@
               <c:strCache>
                 <c:ptCount val="1"/>
                 <c:pt idx="0">
-                  <c:v>Series 1</c:v>
+                  <c:v>Total</c:v>
                 </c:pt>
               </c:strCache>
             </c:strRef>
@@ -1405,16 +1370,16 @@
               <c:strCache>
                 <c:ptCount val="4"/>
                 <c:pt idx="0">
-                  <c:v>Category 1</c:v>
+                  <c:v>Module 1</c:v>
                 </c:pt>
                 <c:pt idx="1">
-                  <c:v>Category 2</c:v>
+                  <c:v>Module 2</c:v>
                 </c:pt>
                 <c:pt idx="2">
-                  <c:v>Category 3</c:v>
+                  <c:v>Module 3</c:v>
                 </c:pt>
                 <c:pt idx="3">
-                  <c:v>Category 4</c:v>
+                  <c:v>Module 4</c:v>
                 </c:pt>
               </c:strCache>
             </c:strRef>
@@ -1426,23 +1391,23 @@
                 <c:formatCode>General</c:formatCode>
                 <c:ptCount val="4"/>
                 <c:pt idx="0">
-                  <c:v>4.3</c:v>
+                  <c:v>30</c:v>
                 </c:pt>
                 <c:pt idx="1">
-                  <c:v>2.5</c:v>
+                  <c:v>30</c:v>
                 </c:pt>
                 <c:pt idx="2">
-                  <c:v>4.3</c:v>
+                  <c:v>30</c:v>
                 </c:pt>
                 <c:pt idx="3">
-                  <c:v>2.5</c:v>
+                  <c:v>30</c:v>
                 </c:pt>
               </c:numCache>
             </c:numRef>
           </c:val>
           <c:extLst>
             <c:ext xmlns:c16="http://schemas.microsoft.com/office/drawing/2014/chart" uri="{C3380CC4-5D6E-409C-BE32-E72D297353CC}">
-              <c16:uniqueId val="{00000000-46BF-4028-AA4B-B18488AD1496}"/>
+              <c16:uniqueId val="{00000000-3332-4F3C-99BE-F7E77DEDD538}"/>
             </c:ext>
           </c:extLst>
         </c:ser>
@@ -1455,7 +1420,7 @@
               <c:strCache>
                 <c:ptCount val="1"/>
                 <c:pt idx="0">
-                  <c:v>Series 2</c:v>
+                  <c:v>Added</c:v>
                 </c:pt>
               </c:strCache>
             </c:strRef>
@@ -1476,16 +1441,16 @@
               <c:strCache>
                 <c:ptCount val="4"/>
                 <c:pt idx="0">
-                  <c:v>Category 1</c:v>
+                  <c:v>Module 1</c:v>
                 </c:pt>
                 <c:pt idx="1">
-                  <c:v>Category 2</c:v>
+                  <c:v>Module 2</c:v>
                 </c:pt>
                 <c:pt idx="2">
-                  <c:v>Category 3</c:v>
+                  <c:v>Module 3</c:v>
                 </c:pt>
                 <c:pt idx="3">
-                  <c:v>Category 4</c:v>
+                  <c:v>Module 4</c:v>
                 </c:pt>
               </c:strCache>
             </c:strRef>
@@ -1497,23 +1462,94 @@
                 <c:formatCode>General</c:formatCode>
                 <c:ptCount val="4"/>
                 <c:pt idx="0">
-                  <c:v>2.4</c:v>
+                  <c:v>10</c:v>
                 </c:pt>
                 <c:pt idx="1">
-                  <c:v>4.4000000000000004</c:v>
+                  <c:v>10</c:v>
                 </c:pt>
                 <c:pt idx="2">
-                  <c:v>2.4</c:v>
+                  <c:v>10</c:v>
                 </c:pt>
                 <c:pt idx="3">
-                  <c:v>4.4000000000000004</c:v>
+                  <c:v>10</c:v>
                 </c:pt>
               </c:numCache>
             </c:numRef>
           </c:val>
           <c:extLst>
             <c:ext xmlns:c16="http://schemas.microsoft.com/office/drawing/2014/chart" uri="{C3380CC4-5D6E-409C-BE32-E72D297353CC}">
-              <c16:uniqueId val="{00000001-46BF-4028-AA4B-B18488AD1496}"/>
+              <c16:uniqueId val="{00000001-3332-4F3C-99BE-F7E77DEDD538}"/>
+            </c:ext>
+          </c:extLst>
+        </c:ser>
+        <c:ser>
+          <c:idx val="2"/>
+          <c:order val="2"/>
+          <c:tx>
+            <c:strRef>
+              <c:f>Sheet1!$D$1</c:f>
+              <c:strCache>
+                <c:ptCount val="1"/>
+                <c:pt idx="0">
+                  <c:v>Removed</c:v>
+                </c:pt>
+              </c:strCache>
+            </c:strRef>
+          </c:tx>
+          <c:spPr>
+            <a:solidFill>
+              <a:schemeClr val="accent3"/>
+            </a:solidFill>
+            <a:ln>
+              <a:noFill/>
+            </a:ln>
+            <a:effectLst/>
+          </c:spPr>
+          <c:invertIfNegative val="0"/>
+          <c:cat>
+            <c:strRef>
+              <c:f>Sheet1!$A$2:$A$5</c:f>
+              <c:strCache>
+                <c:ptCount val="4"/>
+                <c:pt idx="0">
+                  <c:v>Module 1</c:v>
+                </c:pt>
+                <c:pt idx="1">
+                  <c:v>Module 2</c:v>
+                </c:pt>
+                <c:pt idx="2">
+                  <c:v>Module 3</c:v>
+                </c:pt>
+                <c:pt idx="3">
+                  <c:v>Module 4</c:v>
+                </c:pt>
+              </c:strCache>
+            </c:strRef>
+          </c:cat>
+          <c:val>
+            <c:numRef>
+              <c:f>Sheet1!$D$2:$D$5</c:f>
+              <c:numCache>
+                <c:formatCode>General</c:formatCode>
+                <c:ptCount val="4"/>
+                <c:pt idx="0">
+                  <c:v>10</c:v>
+                </c:pt>
+                <c:pt idx="1">
+                  <c:v>10</c:v>
+                </c:pt>
+                <c:pt idx="2">
+                  <c:v>10</c:v>
+                </c:pt>
+                <c:pt idx="3">
+                  <c:v>10</c:v>
+                </c:pt>
+              </c:numCache>
+            </c:numRef>
+          </c:val>
+          <c:extLst>
+            <c:ext xmlns:c16="http://schemas.microsoft.com/office/drawing/2014/chart" uri="{C3380CC4-5D6E-409C-BE32-E72D297353CC}">
+              <c16:uniqueId val="{00000002-3332-4F3C-99BE-F7E77DEDD538}"/>
             </c:ext>
           </c:extLst>
         </c:ser>
@@ -1526,7 +1562,6 @@
           <c:showBubbleSize val="0"/>
         </c:dLbls>
         <c:gapWidth val="219"/>
-        <c:overlap val="100"/>
         <c:axId val="461299216"/>
         <c:axId val="461299544"/>
       </c:barChart>
@@ -1724,7 +1759,7 @@
           <a:lstStyle/>
           <a:p>
             <a:pPr>
-              <a:defRPr sz="1862" b="0" i="0" u="none" strike="noStrike" kern="1200" spc="0" baseline="0">
+              <a:defRPr sz="1100" b="1" i="0" u="none" strike="noStrike" kern="1200" spc="0" baseline="0">
                 <a:solidFill>
                   <a:schemeClr val="tx1">
                     <a:lumMod val="65000"/>
@@ -1737,54 +1772,12 @@
               </a:defRPr>
             </a:pPr>
             <a:r>
-              <a:rPr lang="fr-FR" sz="1800" dirty="0" err="1">
+              <a:rPr lang="fr-FR" sz="1100" b="1" dirty="0">
                 <a:effectLst/>
               </a:rPr>
-              <a:t>Added</a:t>
-            </a:r>
-            <a:r>
-              <a:rPr lang="fr-FR" sz="1800" dirty="0">
-                <a:effectLst/>
-              </a:rPr>
-              <a:t> and </a:t>
-            </a:r>
-            <a:r>
-              <a:rPr lang="fr-FR" sz="1800" dirty="0" err="1">
-                <a:effectLst/>
-              </a:rPr>
-              <a:t>Removed</a:t>
-            </a:r>
-            <a:r>
-              <a:rPr lang="fr-FR" sz="1800" dirty="0">
-                <a:effectLst/>
-              </a:rPr>
-              <a:t> </a:t>
-            </a:r>
-            <a:r>
-              <a:rPr lang="fr-FR" sz="1800" dirty="0" err="1">
-                <a:effectLst/>
-              </a:rPr>
-              <a:t>critical</a:t>
-            </a:r>
-            <a:r>
-              <a:rPr lang="fr-FR" sz="1800" dirty="0">
-                <a:effectLst/>
-              </a:rPr>
-              <a:t> violations by </a:t>
-            </a:r>
-            <a:r>
-              <a:rPr lang="fr-FR" sz="1800" dirty="0" err="1">
-                <a:effectLst/>
-              </a:rPr>
-              <a:t>Health</a:t>
-            </a:r>
-            <a:r>
-              <a:rPr lang="fr-FR" sz="1800" dirty="0">
-                <a:effectLst/>
-              </a:rPr>
-              <a:t> Factor</a:t>
-            </a:r>
-            <a:endParaRPr lang="en-US" sz="1800" dirty="0">
+              <a:t>ADDED AND REMOVED CRITICAL VIOLATIONS BY HEALTH FACTOR</a:t>
+            </a:r>
+            <a:endParaRPr lang="en-US" sz="1100" b="1" dirty="0">
               <a:effectLst/>
             </a:endParaRPr>
           </a:p>
@@ -1803,7 +1796,7 @@
         <a:lstStyle/>
         <a:p>
           <a:pPr>
-            <a:defRPr sz="1862" b="0" i="0" u="none" strike="noStrike" kern="1200" spc="0" baseline="0">
+            <a:defRPr sz="1100" b="1" i="0" u="none" strike="noStrike" kern="1200" spc="0" baseline="0">
               <a:solidFill>
                 <a:schemeClr val="tx1">
                   <a:lumMod val="65000"/>
@@ -1835,7 +1828,7 @@
               <c:strCache>
                 <c:ptCount val="1"/>
                 <c:pt idx="0">
-                  <c:v>Series 1</c:v>
+                  <c:v>Added</c:v>
                 </c:pt>
               </c:strCache>
             </c:strRef>
@@ -1852,41 +1845,47 @@
           <c:invertIfNegative val="0"/>
           <c:cat>
             <c:strRef>
-              <c:f>Sheet1!$A$2:$A$5</c:f>
+              <c:f>Sheet1!$A$2:$A$6</c:f>
               <c:strCache>
-                <c:ptCount val="4"/>
+                <c:ptCount val="5"/>
                 <c:pt idx="0">
-                  <c:v>Category 1</c:v>
+                  <c:v>Robustness</c:v>
                 </c:pt>
                 <c:pt idx="1">
-                  <c:v>Category 2</c:v>
+                  <c:v>Efficiency</c:v>
                 </c:pt>
                 <c:pt idx="2">
-                  <c:v>Category 3</c:v>
+                  <c:v>Security</c:v>
                 </c:pt>
                 <c:pt idx="3">
-                  <c:v>Category 4</c:v>
+                  <c:v>Changeability</c:v>
+                </c:pt>
+                <c:pt idx="4">
+                  <c:v>Transferability</c:v>
                 </c:pt>
               </c:strCache>
             </c:strRef>
           </c:cat>
           <c:val>
             <c:numRef>
-              <c:f>Sheet1!$B$2:$B$5</c:f>
+              <c:f>Sheet1!$B$2:$B$6</c:f>
               <c:numCache>
                 <c:formatCode>General</c:formatCode>
-                <c:ptCount val="4"/>
+                <c:ptCount val="5"/>
                 <c:pt idx="0">
-                  <c:v>4.3</c:v>
+                  <c:v>10</c:v>
                 </c:pt>
                 <c:pt idx="1">
-                  <c:v>2.5</c:v>
+                  <c:v>10</c:v>
                 </c:pt>
                 <c:pt idx="2">
-                  <c:v>4.3</c:v>
+                  <c:v>10</c:v>
                 </c:pt>
                 <c:pt idx="3">
-                  <c:v>2.5</c:v>
+                  <c:v>10</c:v>
+                </c:pt>
+                <c:pt idx="4">
+                  <c:v>10</c:v>
                 </c:pt>
               </c:numCache>
             </c:numRef>
@@ -1906,7 +1905,7 @@
               <c:strCache>
                 <c:ptCount val="1"/>
                 <c:pt idx="0">
-                  <c:v>Series 2</c:v>
+                  <c:v>Removed</c:v>
                 </c:pt>
               </c:strCache>
             </c:strRef>
@@ -1923,41 +1922,47 @@
           <c:invertIfNegative val="0"/>
           <c:cat>
             <c:strRef>
-              <c:f>Sheet1!$A$2:$A$5</c:f>
+              <c:f>Sheet1!$A$2:$A$6</c:f>
               <c:strCache>
-                <c:ptCount val="4"/>
+                <c:ptCount val="5"/>
                 <c:pt idx="0">
-                  <c:v>Category 1</c:v>
+                  <c:v>Robustness</c:v>
                 </c:pt>
                 <c:pt idx="1">
-                  <c:v>Category 2</c:v>
+                  <c:v>Efficiency</c:v>
                 </c:pt>
                 <c:pt idx="2">
-                  <c:v>Category 3</c:v>
+                  <c:v>Security</c:v>
                 </c:pt>
                 <c:pt idx="3">
-                  <c:v>Category 4</c:v>
+                  <c:v>Changeability</c:v>
+                </c:pt>
+                <c:pt idx="4">
+                  <c:v>Transferability</c:v>
                 </c:pt>
               </c:strCache>
             </c:strRef>
           </c:cat>
           <c:val>
             <c:numRef>
-              <c:f>Sheet1!$C$2:$C$5</c:f>
+              <c:f>Sheet1!$C$2:$C$6</c:f>
               <c:numCache>
                 <c:formatCode>General</c:formatCode>
-                <c:ptCount val="4"/>
+                <c:ptCount val="5"/>
                 <c:pt idx="0">
-                  <c:v>2.4</c:v>
+                  <c:v>10</c:v>
                 </c:pt>
                 <c:pt idx="1">
-                  <c:v>4.4000000000000004</c:v>
+                  <c:v>10</c:v>
                 </c:pt>
                 <c:pt idx="2">
-                  <c:v>2.4</c:v>
+                  <c:v>10</c:v>
                 </c:pt>
                 <c:pt idx="3">
-                  <c:v>4.4000000000000004</c:v>
+                  <c:v>10</c:v>
+                </c:pt>
+                <c:pt idx="4">
+                  <c:v>10</c:v>
                 </c:pt>
               </c:numCache>
             </c:numRef>
@@ -2175,7 +2180,7 @@
           <a:lstStyle/>
           <a:p>
             <a:pPr>
-              <a:defRPr sz="1862" b="0" i="0" u="none" strike="noStrike" kern="1200" spc="0" baseline="0">
+              <a:defRPr sz="1200" b="1" i="0" u="none" strike="noStrike" kern="1200" spc="0" baseline="0">
                 <a:solidFill>
                   <a:schemeClr val="tx1">
                     <a:lumMod val="65000"/>
@@ -2188,36 +2193,12 @@
               </a:defRPr>
             </a:pPr>
             <a:r>
-              <a:rPr lang="fr-FR" sz="1800" dirty="0" err="1">
+              <a:rPr lang="fr-FR" sz="1200" b="1" dirty="0">
                 <a:effectLst/>
               </a:rPr>
-              <a:t>Risk</a:t>
-            </a:r>
-            <a:r>
-              <a:rPr lang="fr-FR" sz="1800" dirty="0">
-                <a:effectLst/>
-              </a:rPr>
-              <a:t> </a:t>
-            </a:r>
-            <a:r>
-              <a:rPr lang="fr-FR" sz="1800" dirty="0" err="1">
-                <a:effectLst/>
-              </a:rPr>
-              <a:t>Factors</a:t>
-            </a:r>
-            <a:r>
-              <a:rPr lang="fr-FR" sz="1800" dirty="0">
-                <a:effectLst/>
-              </a:rPr>
-              <a:t> benchmark for 2 last </a:t>
-            </a:r>
-            <a:r>
-              <a:rPr lang="fr-FR" sz="1800" dirty="0" err="1">
-                <a:effectLst/>
-              </a:rPr>
-              <a:t>snapshots</a:t>
-            </a:r>
-            <a:endParaRPr lang="en-US" sz="1800" dirty="0">
+              <a:t>RISK FACTORS BENCHMARK FOR 2 LAST SNAPSHOTS</a:t>
+            </a:r>
+            <a:endParaRPr lang="en-US" sz="1200" b="1" dirty="0">
               <a:effectLst/>
             </a:endParaRPr>
           </a:p>
@@ -2236,7 +2217,7 @@
         <a:lstStyle/>
         <a:p>
           <a:pPr>
-            <a:defRPr sz="1862" b="0" i="0" u="none" strike="noStrike" kern="1200" spc="0" baseline="0">
+            <a:defRPr sz="1200" b="1" i="0" u="none" strike="noStrike" kern="1200" spc="0" baseline="0">
               <a:solidFill>
                 <a:schemeClr val="tx1">
                   <a:lumMod val="65000"/>
@@ -2273,7 +2254,7 @@
             </c:strRef>
           </c:tx>
           <c:spPr>
-            <a:ln w="28575" cap="rnd">
+            <a:ln w="19050" cap="rnd">
               <a:solidFill>
                 <a:schemeClr val="accent1"/>
               </a:solidFill>
@@ -2314,19 +2295,19 @@
                 <c:formatCode>General</c:formatCode>
                 <c:ptCount val="5"/>
                 <c:pt idx="0">
-                  <c:v>32</c:v>
+                  <c:v>3.2</c:v>
                 </c:pt>
                 <c:pt idx="1">
-                  <c:v>32</c:v>
+                  <c:v>3.2</c:v>
                 </c:pt>
                 <c:pt idx="2">
-                  <c:v>28</c:v>
+                  <c:v>2.5</c:v>
                 </c:pt>
                 <c:pt idx="3">
-                  <c:v>12</c:v>
+                  <c:v>1.8</c:v>
                 </c:pt>
                 <c:pt idx="4">
-                  <c:v>15</c:v>
+                  <c:v>3.4</c:v>
                 </c:pt>
               </c:numCache>
             </c:numRef>
@@ -2352,10 +2333,11 @@
             </c:strRef>
           </c:tx>
           <c:spPr>
-            <a:ln w="28575" cap="rnd">
+            <a:ln w="12700" cap="rnd">
               <a:solidFill>
                 <a:schemeClr val="accent2"/>
               </a:solidFill>
+              <a:prstDash val="dash"/>
               <a:round/>
             </a:ln>
             <a:effectLst/>
@@ -2615,6 +2597,44 @@
   </mc:AlternateContent>
   <c:chart>
     <c:title>
+      <c:tx>
+        <c:rich>
+          <a:bodyPr rot="0" spcFirstLastPara="1" vertOverflow="ellipsis" vert="horz" wrap="square" anchor="ctr" anchorCtr="1"/>
+          <a:lstStyle/>
+          <a:p>
+            <a:pPr>
+              <a:defRPr sz="1200" b="1" i="0" u="none" strike="noStrike" kern="1200" spc="0" baseline="0">
+                <a:solidFill>
+                  <a:schemeClr val="tx1">
+                    <a:lumMod val="65000"/>
+                    <a:lumOff val="35000"/>
+                  </a:schemeClr>
+                </a:solidFill>
+                <a:latin typeface="+mn-lt"/>
+                <a:ea typeface="+mn-ea"/>
+                <a:cs typeface="+mn-cs"/>
+              </a:defRPr>
+            </a:pPr>
+            <a:r>
+              <a:rPr lang="fr-FR" sz="1200" b="1" dirty="0">
+                <a:effectLst/>
+              </a:rPr>
+              <a:t>ARCHITECTURE FACTORS FOR 2 LAST SNAPSHOTS</a:t>
+            </a:r>
+            <a:endParaRPr lang="en-US" sz="1200" b="1" dirty="0">
+              <a:effectLst/>
+            </a:endParaRPr>
+          </a:p>
+        </c:rich>
+      </c:tx>
+      <c:layout>
+        <c:manualLayout>
+          <c:xMode val="edge"/>
+          <c:yMode val="edge"/>
+          <c:x val="0.1050873436410683"/>
+          <c:y val="2.0737041254193671E-2"/>
+        </c:manualLayout>
+      </c:layout>
       <c:overlay val="0"/>
       <c:spPr>
         <a:noFill/>
@@ -2628,7 +2648,430 @@
         <a:lstStyle/>
         <a:p>
           <a:pPr>
-            <a:defRPr sz="1862" b="0" i="0" u="none" strike="noStrike" kern="1200" spc="0" baseline="0">
+            <a:defRPr sz="1200" b="1" i="0" u="none" strike="noStrike" kern="1200" spc="0" baseline="0">
+              <a:solidFill>
+                <a:schemeClr val="tx1">
+                  <a:lumMod val="65000"/>
+                  <a:lumOff val="35000"/>
+                </a:schemeClr>
+              </a:solidFill>
+              <a:latin typeface="+mn-lt"/>
+              <a:ea typeface="+mn-ea"/>
+              <a:cs typeface="+mn-cs"/>
+            </a:defRPr>
+          </a:pPr>
+          <a:endParaRPr lang="en-US"/>
+        </a:p>
+      </c:txPr>
+    </c:title>
+    <c:autoTitleDeleted val="0"/>
+    <c:plotArea>
+      <c:layout/>
+      <c:radarChart>
+        <c:radarStyle val="marker"/>
+        <c:varyColors val="0"/>
+        <c:ser>
+          <c:idx val="0"/>
+          <c:order val="0"/>
+          <c:tx>
+            <c:strRef>
+              <c:f>Sheet1!$B$1</c:f>
+              <c:strCache>
+                <c:ptCount val="1"/>
+                <c:pt idx="0">
+                  <c:v>snapshot 1</c:v>
+                </c:pt>
+              </c:strCache>
+            </c:strRef>
+          </c:tx>
+          <c:spPr>
+            <a:ln w="19050" cap="rnd">
+              <a:solidFill>
+                <a:schemeClr val="accent1"/>
+              </a:solidFill>
+              <a:round/>
+            </a:ln>
+            <a:effectLst/>
+          </c:spPr>
+          <c:marker>
+            <c:symbol val="none"/>
+          </c:marker>
+          <c:cat>
+            <c:strRef>
+              <c:f>Sheet1!$A$2:$A$6</c:f>
+              <c:strCache>
+                <c:ptCount val="5"/>
+                <c:pt idx="0">
+                  <c:v>HF1</c:v>
+                </c:pt>
+                <c:pt idx="1">
+                  <c:v>HF2</c:v>
+                </c:pt>
+                <c:pt idx="2">
+                  <c:v>HF3</c:v>
+                </c:pt>
+                <c:pt idx="3">
+                  <c:v>HF4</c:v>
+                </c:pt>
+                <c:pt idx="4">
+                  <c:v>HF5</c:v>
+                </c:pt>
+              </c:strCache>
+            </c:strRef>
+          </c:cat>
+          <c:val>
+            <c:numRef>
+              <c:f>Sheet1!$B$2:$B$6</c:f>
+              <c:numCache>
+                <c:formatCode>General</c:formatCode>
+                <c:ptCount val="5"/>
+                <c:pt idx="0">
+                  <c:v>3.2</c:v>
+                </c:pt>
+                <c:pt idx="1">
+                  <c:v>3.2</c:v>
+                </c:pt>
+                <c:pt idx="2">
+                  <c:v>2.8</c:v>
+                </c:pt>
+                <c:pt idx="3">
+                  <c:v>1.2</c:v>
+                </c:pt>
+                <c:pt idx="4">
+                  <c:v>1.5</c:v>
+                </c:pt>
+              </c:numCache>
+            </c:numRef>
+          </c:val>
+          <c:extLst>
+            <c:ext xmlns:c16="http://schemas.microsoft.com/office/drawing/2014/chart" uri="{C3380CC4-5D6E-409C-BE32-E72D297353CC}">
+              <c16:uniqueId val="{00000000-BDF2-4F1D-9517-CD51F5D8D91E}"/>
+            </c:ext>
+          </c:extLst>
+        </c:ser>
+        <c:ser>
+          <c:idx val="1"/>
+          <c:order val="1"/>
+          <c:tx>
+            <c:strRef>
+              <c:f>Sheet1!$C$1</c:f>
+              <c:strCache>
+                <c:ptCount val="1"/>
+                <c:pt idx="0">
+                  <c:v>snapshot 2</c:v>
+                </c:pt>
+              </c:strCache>
+            </c:strRef>
+          </c:tx>
+          <c:spPr>
+            <a:ln w="12700" cap="rnd">
+              <a:solidFill>
+                <a:schemeClr val="accent2"/>
+              </a:solidFill>
+              <a:prstDash val="dash"/>
+              <a:round/>
+            </a:ln>
+            <a:effectLst/>
+          </c:spPr>
+          <c:marker>
+            <c:symbol val="none"/>
+          </c:marker>
+          <c:cat>
+            <c:strRef>
+              <c:f>Sheet1!$A$2:$A$6</c:f>
+              <c:strCache>
+                <c:ptCount val="5"/>
+                <c:pt idx="0">
+                  <c:v>HF1</c:v>
+                </c:pt>
+                <c:pt idx="1">
+                  <c:v>HF2</c:v>
+                </c:pt>
+                <c:pt idx="2">
+                  <c:v>HF3</c:v>
+                </c:pt>
+                <c:pt idx="3">
+                  <c:v>HF4</c:v>
+                </c:pt>
+                <c:pt idx="4">
+                  <c:v>HF5</c:v>
+                </c:pt>
+              </c:strCache>
+            </c:strRef>
+          </c:cat>
+          <c:val>
+            <c:numRef>
+              <c:f>Sheet1!$C$2:$C$6</c:f>
+              <c:numCache>
+                <c:formatCode>General</c:formatCode>
+                <c:ptCount val="5"/>
+                <c:pt idx="0">
+                  <c:v>2</c:v>
+                </c:pt>
+                <c:pt idx="1">
+                  <c:v>2</c:v>
+                </c:pt>
+                <c:pt idx="2">
+                  <c:v>2</c:v>
+                </c:pt>
+                <c:pt idx="3">
+                  <c:v>2</c:v>
+                </c:pt>
+                <c:pt idx="4">
+                  <c:v>2</c:v>
+                </c:pt>
+              </c:numCache>
+            </c:numRef>
+          </c:val>
+          <c:extLst>
+            <c:ext xmlns:c16="http://schemas.microsoft.com/office/drawing/2014/chart" uri="{C3380CC4-5D6E-409C-BE32-E72D297353CC}">
+              <c16:uniqueId val="{00000001-BDF2-4F1D-9517-CD51F5D8D91E}"/>
+            </c:ext>
+          </c:extLst>
+        </c:ser>
+        <c:dLbls>
+          <c:showLegendKey val="0"/>
+          <c:showVal val="0"/>
+          <c:showCatName val="0"/>
+          <c:showSerName val="0"/>
+          <c:showPercent val="0"/>
+          <c:showBubbleSize val="0"/>
+        </c:dLbls>
+        <c:axId val="396083864"/>
+        <c:axId val="344842200"/>
+      </c:radarChart>
+      <c:catAx>
+        <c:axId val="396083864"/>
+        <c:scaling>
+          <c:orientation val="minMax"/>
+        </c:scaling>
+        <c:delete val="0"/>
+        <c:axPos val="b"/>
+        <c:numFmt formatCode="General" sourceLinked="0"/>
+        <c:majorTickMark val="none"/>
+        <c:minorTickMark val="none"/>
+        <c:tickLblPos val="nextTo"/>
+        <c:spPr>
+          <a:noFill/>
+          <a:ln w="9525" cap="flat" cmpd="sng" algn="ctr">
+            <a:solidFill>
+              <a:schemeClr val="tx1">
+                <a:lumMod val="15000"/>
+                <a:lumOff val="85000"/>
+              </a:schemeClr>
+            </a:solidFill>
+            <a:round/>
+          </a:ln>
+          <a:effectLst/>
+        </c:spPr>
+        <c:txPr>
+          <a:bodyPr rot="-60000000" spcFirstLastPara="1" vertOverflow="ellipsis" vert="horz" wrap="square" anchor="ctr" anchorCtr="1"/>
+          <a:lstStyle/>
+          <a:p>
+            <a:pPr>
+              <a:defRPr sz="1197" b="0" i="0" u="none" strike="noStrike" kern="1200" baseline="0">
+                <a:solidFill>
+                  <a:schemeClr val="tx1">
+                    <a:lumMod val="65000"/>
+                    <a:lumOff val="35000"/>
+                  </a:schemeClr>
+                </a:solidFill>
+                <a:latin typeface="+mn-lt"/>
+                <a:ea typeface="+mn-ea"/>
+                <a:cs typeface="+mn-cs"/>
+              </a:defRPr>
+            </a:pPr>
+            <a:endParaRPr lang="en-US"/>
+          </a:p>
+        </c:txPr>
+        <c:crossAx val="344842200"/>
+        <c:crosses val="autoZero"/>
+        <c:auto val="1"/>
+        <c:lblAlgn val="ctr"/>
+        <c:lblOffset val="100"/>
+        <c:noMultiLvlLbl val="0"/>
+      </c:catAx>
+      <c:valAx>
+        <c:axId val="344842200"/>
+        <c:scaling>
+          <c:orientation val="minMax"/>
+        </c:scaling>
+        <c:delete val="0"/>
+        <c:axPos val="l"/>
+        <c:majorGridlines>
+          <c:spPr>
+            <a:ln w="9525" cap="flat" cmpd="sng" algn="ctr">
+              <a:solidFill>
+                <a:schemeClr val="tx1">
+                  <a:lumMod val="15000"/>
+                  <a:lumOff val="85000"/>
+                </a:schemeClr>
+              </a:solidFill>
+              <a:round/>
+            </a:ln>
+            <a:effectLst/>
+          </c:spPr>
+        </c:majorGridlines>
+        <c:numFmt formatCode="General" sourceLinked="1"/>
+        <c:majorTickMark val="none"/>
+        <c:minorTickMark val="none"/>
+        <c:tickLblPos val="nextTo"/>
+        <c:spPr>
+          <a:noFill/>
+          <a:ln>
+            <a:noFill/>
+          </a:ln>
+          <a:effectLst/>
+        </c:spPr>
+        <c:txPr>
+          <a:bodyPr rot="-60000000" spcFirstLastPara="1" vertOverflow="ellipsis" vert="horz" wrap="square" anchor="ctr" anchorCtr="1"/>
+          <a:lstStyle/>
+          <a:p>
+            <a:pPr>
+              <a:defRPr sz="1197" b="0" i="0" u="none" strike="noStrike" kern="1200" baseline="0">
+                <a:solidFill>
+                  <a:schemeClr val="tx1">
+                    <a:lumMod val="65000"/>
+                    <a:lumOff val="35000"/>
+                  </a:schemeClr>
+                </a:solidFill>
+                <a:latin typeface="+mn-lt"/>
+                <a:ea typeface="+mn-ea"/>
+                <a:cs typeface="+mn-cs"/>
+              </a:defRPr>
+            </a:pPr>
+            <a:endParaRPr lang="en-US"/>
+          </a:p>
+        </c:txPr>
+        <c:crossAx val="396083864"/>
+        <c:crosses val="autoZero"/>
+        <c:crossBetween val="between"/>
+      </c:valAx>
+      <c:spPr>
+        <a:noFill/>
+        <a:ln>
+          <a:noFill/>
+        </a:ln>
+        <a:effectLst/>
+      </c:spPr>
+    </c:plotArea>
+    <c:legend>
+      <c:legendPos val="t"/>
+      <c:overlay val="0"/>
+      <c:spPr>
+        <a:noFill/>
+        <a:ln>
+          <a:noFill/>
+        </a:ln>
+        <a:effectLst/>
+      </c:spPr>
+      <c:txPr>
+        <a:bodyPr rot="0" spcFirstLastPara="1" vertOverflow="ellipsis" vert="horz" wrap="square" anchor="ctr" anchorCtr="1"/>
+        <a:lstStyle/>
+        <a:p>
+          <a:pPr>
+            <a:defRPr sz="1197" b="0" i="0" u="none" strike="noStrike" kern="1200" baseline="0">
+              <a:solidFill>
+                <a:schemeClr val="tx1">
+                  <a:lumMod val="65000"/>
+                  <a:lumOff val="35000"/>
+                </a:schemeClr>
+              </a:solidFill>
+              <a:latin typeface="+mn-lt"/>
+              <a:ea typeface="+mn-ea"/>
+              <a:cs typeface="+mn-cs"/>
+            </a:defRPr>
+          </a:pPr>
+          <a:endParaRPr lang="en-US"/>
+        </a:p>
+      </c:txPr>
+    </c:legend>
+    <c:plotVisOnly val="1"/>
+    <c:dispBlanksAs val="gap"/>
+    <c:showDLblsOverMax val="0"/>
+  </c:chart>
+  <c:spPr>
+    <a:noFill/>
+    <a:ln>
+      <a:noFill/>
+    </a:ln>
+    <a:effectLst/>
+  </c:spPr>
+  <c:txPr>
+    <a:bodyPr/>
+    <a:lstStyle/>
+    <a:p>
+      <a:pPr>
+        <a:defRPr/>
+      </a:pPr>
+      <a:endParaRPr lang="en-US"/>
+    </a:p>
+  </c:txPr>
+  <c:externalData r:id="rId3">
+    <c:autoUpdate val="0"/>
+  </c:externalData>
+</c:chartSpace>
+</file>
+
+<file path=ppt/charts/chart7.xml><?xml version="1.0" encoding="utf-8"?>
+<c:chartSpace xmlns:c="http://schemas.openxmlformats.org/drawingml/2006/chart" xmlns:a="http://schemas.openxmlformats.org/drawingml/2006/main" xmlns:r="http://schemas.openxmlformats.org/officeDocument/2006/relationships" xmlns:c16r2="http://schemas.microsoft.com/office/drawing/2015/06/chart">
+  <c:date1904 val="0"/>
+  <c:lang val="en-US"/>
+  <c:roundedCorners val="0"/>
+  <mc:AlternateContent xmlns:mc="http://schemas.openxmlformats.org/markup-compatibility/2006">
+    <mc:Choice xmlns:c14="http://schemas.microsoft.com/office/drawing/2007/8/2/chart" Requires="c14">
+      <c14:style val="102"/>
+    </mc:Choice>
+    <mc:Fallback>
+      <c:style val="2"/>
+    </mc:Fallback>
+  </mc:AlternateContent>
+  <c:chart>
+    <c:title>
+      <c:tx>
+        <c:rich>
+          <a:bodyPr rot="0" spcFirstLastPara="1" vertOverflow="ellipsis" vert="horz" wrap="square" anchor="ctr" anchorCtr="1"/>
+          <a:lstStyle/>
+          <a:p>
+            <a:pPr>
+              <a:defRPr sz="1200" b="1" i="0" u="none" strike="noStrike" kern="1200" cap="all" spc="50" baseline="0">
+                <a:solidFill>
+                  <a:schemeClr val="tx1">
+                    <a:lumMod val="65000"/>
+                    <a:lumOff val="35000"/>
+                  </a:schemeClr>
+                </a:solidFill>
+                <a:latin typeface="+mn-lt"/>
+                <a:ea typeface="+mn-ea"/>
+                <a:cs typeface="+mn-cs"/>
+              </a:defRPr>
+            </a:pPr>
+            <a:r>
+              <a:rPr lang="en-US" sz="1200" dirty="0"/>
+              <a:t>Technology</a:t>
+            </a:r>
+            <a:r>
+              <a:rPr lang="en-US" sz="1200" baseline="0" dirty="0"/>
+              <a:t> distribution</a:t>
+            </a:r>
+            <a:endParaRPr lang="en-US" sz="1200" dirty="0"/>
+          </a:p>
+        </c:rich>
+      </c:tx>
+      <c:overlay val="0"/>
+      <c:spPr>
+        <a:noFill/>
+        <a:ln>
+          <a:noFill/>
+        </a:ln>
+        <a:effectLst/>
+      </c:spPr>
+      <c:txPr>
+        <a:bodyPr rot="0" spcFirstLastPara="1" vertOverflow="ellipsis" vert="horz" wrap="square" anchor="ctr" anchorCtr="1"/>
+        <a:lstStyle/>
+        <a:p>
+          <a:pPr>
+            <a:defRPr sz="1200" b="1" i="0" u="none" strike="noStrike" kern="1200" cap="all" spc="50" baseline="0">
               <a:solidFill>
                 <a:schemeClr val="tx1">
                   <a:lumMod val="65000"/>
@@ -2658,7 +3101,7 @@
               <c:strCache>
                 <c:ptCount val="1"/>
                 <c:pt idx="0">
-                  <c:v>Sales</c:v>
+                  <c:v>Number of Code Lines</c:v>
                 </c:pt>
               </c:strCache>
             </c:strRef>
@@ -2670,16 +3113,24 @@
               <a:solidFill>
                 <a:schemeClr val="accent1"/>
               </a:solidFill>
-              <a:ln w="19050">
-                <a:solidFill>
-                  <a:schemeClr val="lt1"/>
-                </a:solidFill>
+              <a:ln>
+                <a:noFill/>
               </a:ln>
               <a:effectLst/>
+              <a:scene3d>
+                <a:camera prst="orthographicFront"/>
+                <a:lightRig rig="brightRoom" dir="t"/>
+              </a:scene3d>
+              <a:sp3d prstMaterial="flat">
+                <a:bevelT w="50800" h="101600" prst="angle"/>
+                <a:contourClr>
+                  <a:srgbClr val="000000"/>
+                </a:contourClr>
+              </a:sp3d>
             </c:spPr>
             <c:extLst>
               <c:ext xmlns:c16="http://schemas.microsoft.com/office/drawing/2014/chart" uri="{C3380CC4-5D6E-409C-BE32-E72D297353CC}">
-                <c16:uniqueId val="{00000001-C935-4623-BD3E-30CAD7BBD2A8}"/>
+                <c16:uniqueId val="{00000001-0639-4467-8ACB-DA3943658705}"/>
               </c:ext>
             </c:extLst>
           </c:dPt>
@@ -2690,16 +3141,24 @@
               <a:solidFill>
                 <a:schemeClr val="accent2"/>
               </a:solidFill>
-              <a:ln w="19050">
-                <a:solidFill>
-                  <a:schemeClr val="lt1"/>
-                </a:solidFill>
+              <a:ln>
+                <a:noFill/>
               </a:ln>
               <a:effectLst/>
+              <a:scene3d>
+                <a:camera prst="orthographicFront"/>
+                <a:lightRig rig="brightRoom" dir="t"/>
+              </a:scene3d>
+              <a:sp3d prstMaterial="flat">
+                <a:bevelT w="50800" h="101600" prst="angle"/>
+                <a:contourClr>
+                  <a:srgbClr val="000000"/>
+                </a:contourClr>
+              </a:sp3d>
             </c:spPr>
             <c:extLst>
               <c:ext xmlns:c16="http://schemas.microsoft.com/office/drawing/2014/chart" uri="{C3380CC4-5D6E-409C-BE32-E72D297353CC}">
-                <c16:uniqueId val="{00000003-C935-4623-BD3E-30CAD7BBD2A8}"/>
+                <c16:uniqueId val="{00000003-0639-4467-8ACB-DA3943658705}"/>
               </c:ext>
             </c:extLst>
           </c:dPt>
@@ -2710,16 +3169,24 @@
               <a:solidFill>
                 <a:schemeClr val="accent3"/>
               </a:solidFill>
-              <a:ln w="19050">
-                <a:solidFill>
-                  <a:schemeClr val="lt1"/>
-                </a:solidFill>
+              <a:ln>
+                <a:noFill/>
               </a:ln>
               <a:effectLst/>
+              <a:scene3d>
+                <a:camera prst="orthographicFront"/>
+                <a:lightRig rig="brightRoom" dir="t"/>
+              </a:scene3d>
+              <a:sp3d prstMaterial="flat">
+                <a:bevelT w="50800" h="101600" prst="angle"/>
+                <a:contourClr>
+                  <a:srgbClr val="000000"/>
+                </a:contourClr>
+              </a:sp3d>
             </c:spPr>
             <c:extLst>
               <c:ext xmlns:c16="http://schemas.microsoft.com/office/drawing/2014/chart" uri="{C3380CC4-5D6E-409C-BE32-E72D297353CC}">
-                <c16:uniqueId val="{00000005-C935-4623-BD3E-30CAD7BBD2A8}"/>
+                <c16:uniqueId val="{00000005-0639-4467-8ACB-DA3943658705}"/>
               </c:ext>
             </c:extLst>
           </c:dPt>
@@ -2730,70 +3197,333 @@
               <a:solidFill>
                 <a:schemeClr val="accent4"/>
               </a:solidFill>
-              <a:ln w="19050">
-                <a:solidFill>
-                  <a:schemeClr val="lt1"/>
-                </a:solidFill>
+              <a:ln>
+                <a:noFill/>
+              </a:ln>
+              <a:effectLst/>
+              <a:scene3d>
+                <a:camera prst="orthographicFront"/>
+                <a:lightRig rig="brightRoom" dir="t"/>
+              </a:scene3d>
+              <a:sp3d prstMaterial="flat">
+                <a:bevelT w="50800" h="101600" prst="angle"/>
+                <a:contourClr>
+                  <a:srgbClr val="000000"/>
+                </a:contourClr>
+              </a:sp3d>
+            </c:spPr>
+            <c:extLst>
+              <c:ext xmlns:c16="http://schemas.microsoft.com/office/drawing/2014/chart" uri="{C3380CC4-5D6E-409C-BE32-E72D297353CC}">
+                <c16:uniqueId val="{00000007-0639-4467-8ACB-DA3943658705}"/>
+              </c:ext>
+            </c:extLst>
+          </c:dPt>
+          <c:dPt>
+            <c:idx val="4"/>
+            <c:bubble3D val="0"/>
+            <c:spPr>
+              <a:solidFill>
+                <a:schemeClr val="accent5"/>
+              </a:solidFill>
+              <a:ln>
+                <a:noFill/>
+              </a:ln>
+              <a:effectLst/>
+              <a:scene3d>
+                <a:camera prst="orthographicFront"/>
+                <a:lightRig rig="brightRoom" dir="t"/>
+              </a:scene3d>
+              <a:sp3d prstMaterial="flat">
+                <a:bevelT w="50800" h="101600" prst="angle"/>
+                <a:contourClr>
+                  <a:srgbClr val="000000"/>
+                </a:contourClr>
+              </a:sp3d>
+            </c:spPr>
+            <c:extLst>
+              <c:ext xmlns:c16="http://schemas.microsoft.com/office/drawing/2014/chart" uri="{C3380CC4-5D6E-409C-BE32-E72D297353CC}">
+                <c16:uniqueId val="{00000009-0639-4467-8ACB-DA3943658705}"/>
+              </c:ext>
+            </c:extLst>
+          </c:dPt>
+          <c:dPt>
+            <c:idx val="5"/>
+            <c:bubble3D val="0"/>
+            <c:spPr>
+              <a:solidFill>
+                <a:schemeClr val="accent6"/>
+              </a:solidFill>
+              <a:ln>
+                <a:noFill/>
+              </a:ln>
+              <a:effectLst/>
+              <a:scene3d>
+                <a:camera prst="orthographicFront"/>
+                <a:lightRig rig="brightRoom" dir="t"/>
+              </a:scene3d>
+              <a:sp3d prstMaterial="flat">
+                <a:bevelT w="50800" h="101600" prst="angle"/>
+                <a:contourClr>
+                  <a:srgbClr val="000000"/>
+                </a:contourClr>
+              </a:sp3d>
+            </c:spPr>
+            <c:extLst>
+              <c:ext xmlns:c16="http://schemas.microsoft.com/office/drawing/2014/chart" uri="{C3380CC4-5D6E-409C-BE32-E72D297353CC}">
+                <c16:uniqueId val="{0000000B-0639-4467-8ACB-DA3943658705}"/>
+              </c:ext>
+            </c:extLst>
+          </c:dPt>
+          <c:dPt>
+            <c:idx val="6"/>
+            <c:bubble3D val="0"/>
+            <c:spPr>
+              <a:solidFill>
+                <a:schemeClr val="accent1">
+                  <a:lumMod val="60000"/>
+                </a:schemeClr>
+              </a:solidFill>
+              <a:ln>
+                <a:noFill/>
+              </a:ln>
+              <a:effectLst/>
+              <a:scene3d>
+                <a:camera prst="orthographicFront"/>
+                <a:lightRig rig="brightRoom" dir="t"/>
+              </a:scene3d>
+              <a:sp3d prstMaterial="flat">
+                <a:bevelT w="50800" h="101600" prst="angle"/>
+                <a:contourClr>
+                  <a:srgbClr val="000000"/>
+                </a:contourClr>
+              </a:sp3d>
+            </c:spPr>
+            <c:extLst>
+              <c:ext xmlns:c16="http://schemas.microsoft.com/office/drawing/2014/chart" uri="{C3380CC4-5D6E-409C-BE32-E72D297353CC}">
+                <c16:uniqueId val="{0000000D-0639-4467-8ACB-DA3943658705}"/>
+              </c:ext>
+            </c:extLst>
+          </c:dPt>
+          <c:dPt>
+            <c:idx val="7"/>
+            <c:bubble3D val="0"/>
+            <c:spPr>
+              <a:solidFill>
+                <a:schemeClr val="accent2">
+                  <a:lumMod val="60000"/>
+                </a:schemeClr>
+              </a:solidFill>
+              <a:ln>
+                <a:noFill/>
+              </a:ln>
+              <a:effectLst/>
+              <a:scene3d>
+                <a:camera prst="orthographicFront"/>
+                <a:lightRig rig="brightRoom" dir="t"/>
+              </a:scene3d>
+              <a:sp3d prstMaterial="flat">
+                <a:bevelT w="50800" h="101600" prst="angle"/>
+                <a:contourClr>
+                  <a:srgbClr val="000000"/>
+                </a:contourClr>
+              </a:sp3d>
+            </c:spPr>
+            <c:extLst>
+              <c:ext xmlns:c16="http://schemas.microsoft.com/office/drawing/2014/chart" uri="{C3380CC4-5D6E-409C-BE32-E72D297353CC}">
+                <c16:uniqueId val="{0000000F-0639-4467-8ACB-DA3943658705}"/>
+              </c:ext>
+            </c:extLst>
+          </c:dPt>
+          <c:dPt>
+            <c:idx val="8"/>
+            <c:bubble3D val="0"/>
+            <c:spPr>
+              <a:solidFill>
+                <a:schemeClr val="accent3">
+                  <a:lumMod val="60000"/>
+                </a:schemeClr>
+              </a:solidFill>
+              <a:ln>
+                <a:noFill/>
+              </a:ln>
+              <a:effectLst/>
+              <a:scene3d>
+                <a:camera prst="orthographicFront"/>
+                <a:lightRig rig="brightRoom" dir="t"/>
+              </a:scene3d>
+              <a:sp3d prstMaterial="flat">
+                <a:bevelT w="50800" h="101600" prst="angle"/>
+                <a:contourClr>
+                  <a:srgbClr val="000000"/>
+                </a:contourClr>
+              </a:sp3d>
+            </c:spPr>
+            <c:extLst>
+              <c:ext xmlns:c16="http://schemas.microsoft.com/office/drawing/2014/chart" uri="{C3380CC4-5D6E-409C-BE32-E72D297353CC}">
+                <c16:uniqueId val="{00000011-0639-4467-8ACB-DA3943658705}"/>
+              </c:ext>
+            </c:extLst>
+          </c:dPt>
+          <c:dPt>
+            <c:idx val="9"/>
+            <c:bubble3D val="0"/>
+            <c:spPr>
+              <a:solidFill>
+                <a:schemeClr val="accent4">
+                  <a:lumMod val="60000"/>
+                </a:schemeClr>
+              </a:solidFill>
+              <a:ln>
+                <a:noFill/>
+              </a:ln>
+              <a:effectLst/>
+              <a:scene3d>
+                <a:camera prst="orthographicFront"/>
+                <a:lightRig rig="brightRoom" dir="t"/>
+              </a:scene3d>
+              <a:sp3d prstMaterial="flat">
+                <a:bevelT w="50800" h="101600" prst="angle"/>
+                <a:contourClr>
+                  <a:srgbClr val="000000"/>
+                </a:contourClr>
+              </a:sp3d>
+            </c:spPr>
+            <c:extLst>
+              <c:ext xmlns:c16="http://schemas.microsoft.com/office/drawing/2014/chart" uri="{C3380CC4-5D6E-409C-BE32-E72D297353CC}">
+                <c16:uniqueId val="{00000013-0639-4467-8ACB-DA3943658705}"/>
+              </c:ext>
+            </c:extLst>
+          </c:dPt>
+          <c:dPt>
+            <c:idx val="10"/>
+            <c:bubble3D val="0"/>
+            <c:spPr>
+              <a:solidFill>
+                <a:schemeClr val="accent5">
+                  <a:lumMod val="60000"/>
+                </a:schemeClr>
+              </a:solidFill>
+              <a:ln>
+                <a:noFill/>
+              </a:ln>
+              <a:effectLst/>
+              <a:scene3d>
+                <a:camera prst="orthographicFront"/>
+                <a:lightRig rig="brightRoom" dir="t"/>
+              </a:scene3d>
+              <a:sp3d prstMaterial="flat">
+                <a:bevelT w="50800" h="101600" prst="angle"/>
+                <a:contourClr>
+                  <a:srgbClr val="000000"/>
+                </a:contourClr>
+              </a:sp3d>
+            </c:spPr>
+            <c:extLst>
+              <c:ext xmlns:c16="http://schemas.microsoft.com/office/drawing/2014/chart" uri="{C3380CC4-5D6E-409C-BE32-E72D297353CC}">
+                <c16:uniqueId val="{00000015-0639-4467-8ACB-DA3943658705}"/>
+              </c:ext>
+            </c:extLst>
+          </c:dPt>
+          <c:dLbls>
+            <c:numFmt formatCode="#,##0_);\(#,##0\)" sourceLinked="0"/>
+            <c:spPr>
+              <a:noFill/>
+              <a:ln>
+                <a:noFill/>
               </a:ln>
               <a:effectLst/>
             </c:spPr>
+            <c:txPr>
+              <a:bodyPr rot="0" spcFirstLastPara="1" vertOverflow="ellipsis" vert="horz" wrap="square" lIns="38100" tIns="19050" rIns="38100" bIns="19050" anchor="ctr" anchorCtr="1">
+                <a:spAutoFit/>
+              </a:bodyPr>
+              <a:lstStyle/>
+              <a:p>
+                <a:pPr>
+                  <a:defRPr sz="1197" b="0" i="0" u="none" strike="noStrike" kern="1200" baseline="0">
+                    <a:solidFill>
+                      <a:schemeClr val="tx1"/>
+                    </a:solidFill>
+                    <a:latin typeface="+mn-lt"/>
+                    <a:ea typeface="+mn-ea"/>
+                    <a:cs typeface="+mn-cs"/>
+                  </a:defRPr>
+                </a:pPr>
+                <a:endParaRPr lang="en-US"/>
+              </a:p>
+            </c:txPr>
+            <c:showLegendKey val="0"/>
+            <c:showVal val="1"/>
+            <c:showCatName val="1"/>
+            <c:showSerName val="0"/>
+            <c:showPercent val="0"/>
+            <c:showBubbleSize val="0"/>
+            <c:separator>
+</c:separator>
+            <c:showLeaderLines val="1"/>
+            <c:leaderLines>
+              <c:spPr>
+                <a:ln w="9525" cap="flat" cmpd="sng" algn="ctr">
+                  <a:solidFill>
+                    <a:schemeClr val="tx1">
+                      <a:lumMod val="35000"/>
+                      <a:lumOff val="65000"/>
+                    </a:schemeClr>
+                  </a:solidFill>
+                  <a:round/>
+                </a:ln>
+                <a:effectLst/>
+              </c:spPr>
+            </c:leaderLines>
             <c:extLst>
-              <c:ext xmlns:c16="http://schemas.microsoft.com/office/drawing/2014/chart" uri="{C3380CC4-5D6E-409C-BE32-E72D297353CC}">
-                <c16:uniqueId val="{00000007-C935-4623-BD3E-30CAD7BBD2A8}"/>
-              </c:ext>
+              <c:ext xmlns:c15="http://schemas.microsoft.com/office/drawing/2012/chart" uri="{CE6537A1-D6FC-4f65-9D91-7224C49458BB}"/>
             </c:extLst>
-          </c:dPt>
+          </c:dLbls>
           <c:cat>
             <c:strRef>
-              <c:f>Sheet1!$A$2:$A$5</c:f>
+              <c:f>Sheet1!$A$2:$A$4</c:f>
               <c:strCache>
-                <c:ptCount val="4"/>
+                <c:ptCount val="3"/>
                 <c:pt idx="0">
-                  <c:v>1st Qtr</c:v>
+                  <c:v>Techno 1</c:v>
                 </c:pt>
                 <c:pt idx="1">
-                  <c:v>2nd Qtr</c:v>
+                  <c:v>Techno 2</c:v>
                 </c:pt>
                 <c:pt idx="2">
-                  <c:v>3rd Qtr</c:v>
-                </c:pt>
-                <c:pt idx="3">
-                  <c:v>4th Qtr</c:v>
+                  <c:v>Techno 3</c:v>
                 </c:pt>
               </c:strCache>
             </c:strRef>
           </c:cat>
           <c:val>
             <c:numRef>
-              <c:f>Sheet1!$B$2:$B$5</c:f>
+              <c:f>Sheet1!$B$2:$B$4</c:f>
               <c:numCache>
                 <c:formatCode>General</c:formatCode>
-                <c:ptCount val="4"/>
+                <c:ptCount val="3"/>
                 <c:pt idx="0">
-                  <c:v>8.1999999999999993</c:v>
+                  <c:v>300000</c:v>
                 </c:pt>
                 <c:pt idx="1">
-                  <c:v>3.2</c:v>
+                  <c:v>300000</c:v>
                 </c:pt>
                 <c:pt idx="2">
-                  <c:v>1.4</c:v>
-                </c:pt>
-                <c:pt idx="3">
-                  <c:v>1.2</c:v>
+                  <c:v>300000</c:v>
                 </c:pt>
               </c:numCache>
             </c:numRef>
           </c:val>
           <c:extLst>
             <c:ext xmlns:c16="http://schemas.microsoft.com/office/drawing/2014/chart" uri="{C3380CC4-5D6E-409C-BE32-E72D297353CC}">
-              <c16:uniqueId val="{00000000-5345-4A1F-962B-0AE6888F0DAB}"/>
+              <c16:uniqueId val="{00000016-0639-4467-8ACB-DA3943658705}"/>
             </c:ext>
           </c:extLst>
         </c:ser>
         <c:dLbls>
           <c:showLegendKey val="0"/>
-          <c:showVal val="0"/>
-          <c:showCatName val="0"/>
+          <c:showVal val="1"/>
+          <c:showCatName val="1"/>
           <c:showSerName val="0"/>
           <c:showPercent val="0"/>
           <c:showBubbleSize val="0"/>
@@ -2809,8 +3539,73 @@
         <a:effectLst/>
       </c:spPr>
     </c:plotArea>
-    <c:legend>
-      <c:legendPos val="b"/>
+    <c:plotVisOnly val="1"/>
+    <c:dispBlanksAs val="gap"/>
+    <c:showDLblsOverMax val="0"/>
+  </c:chart>
+  <c:spPr>
+    <a:noFill/>
+    <a:ln>
+      <a:noFill/>
+    </a:ln>
+    <a:effectLst/>
+  </c:spPr>
+  <c:txPr>
+    <a:bodyPr/>
+    <a:lstStyle/>
+    <a:p>
+      <a:pPr>
+        <a:defRPr/>
+      </a:pPr>
+      <a:endParaRPr lang="en-US"/>
+    </a:p>
+  </c:txPr>
+  <c:externalData r:id="rId3">
+    <c:autoUpdate val="0"/>
+  </c:externalData>
+</c:chartSpace>
+</file>
+
+<file path=ppt/charts/chart8.xml><?xml version="1.0" encoding="utf-8"?>
+<c:chartSpace xmlns:c="http://schemas.openxmlformats.org/drawingml/2006/chart" xmlns:a="http://schemas.openxmlformats.org/drawingml/2006/main" xmlns:r="http://schemas.openxmlformats.org/officeDocument/2006/relationships" xmlns:c16r2="http://schemas.microsoft.com/office/drawing/2015/06/chart">
+  <c:date1904 val="0"/>
+  <c:lang val="en-US"/>
+  <c:roundedCorners val="0"/>
+  <mc:AlternateContent xmlns:mc="http://schemas.openxmlformats.org/markup-compatibility/2006">
+    <mc:Choice xmlns:c14="http://schemas.microsoft.com/office/drawing/2007/8/2/chart" Requires="c14">
+      <c14:style val="102"/>
+    </mc:Choice>
+    <mc:Fallback>
+      <c:style val="2"/>
+    </mc:Fallback>
+  </mc:AlternateContent>
+  <c:chart>
+    <c:title>
+      <c:tx>
+        <c:rich>
+          <a:bodyPr rot="0" spcFirstLastPara="1" vertOverflow="ellipsis" vert="horz" wrap="square" anchor="ctr" anchorCtr="1"/>
+          <a:lstStyle/>
+          <a:p>
+            <a:pPr>
+              <a:defRPr sz="1200" b="1" i="0" u="none" strike="noStrike" kern="1200" baseline="0">
+                <a:solidFill>
+                  <a:schemeClr val="tx1">
+                    <a:lumMod val="65000"/>
+                    <a:lumOff val="35000"/>
+                  </a:schemeClr>
+                </a:solidFill>
+                <a:latin typeface="+mn-lt"/>
+                <a:ea typeface="+mn-ea"/>
+                <a:cs typeface="+mn-cs"/>
+              </a:defRPr>
+            </a:pPr>
+            <a:r>
+              <a:rPr lang="en-US" sz="1200" dirty="0"/>
+              <a:t>MODULES DISTRIBUTION</a:t>
+            </a:r>
+          </a:p>
+        </c:rich>
+      </c:tx>
       <c:overlay val="0"/>
       <c:spPr>
         <a:noFill/>
@@ -2824,7 +3619,7 @@
         <a:lstStyle/>
         <a:p>
           <a:pPr>
-            <a:defRPr sz="1197" b="0" i="0" u="none" strike="noStrike" kern="1200" baseline="0">
+            <a:defRPr sz="1200" b="1" i="0" u="none" strike="noStrike" kern="1200" baseline="0">
               <a:solidFill>
                 <a:schemeClr val="tx1">
                   <a:lumMod val="65000"/>
@@ -2839,7 +3634,848 @@
           <a:endParaRPr lang="en-US"/>
         </a:p>
       </c:txPr>
-    </c:legend>
+    </c:title>
+    <c:autoTitleDeleted val="0"/>
+    <c:plotArea>
+      <c:layout/>
+      <c:pieChart>
+        <c:varyColors val="1"/>
+        <c:ser>
+          <c:idx val="0"/>
+          <c:order val="0"/>
+          <c:tx>
+            <c:strRef>
+              <c:f>Sheet1!$B$1</c:f>
+              <c:strCache>
+                <c:ptCount val="1"/>
+                <c:pt idx="0">
+                  <c:v>Number of Code Lines</c:v>
+                </c:pt>
+              </c:strCache>
+            </c:strRef>
+          </c:tx>
+          <c:explosion val="5"/>
+          <c:dPt>
+            <c:idx val="0"/>
+            <c:bubble3D val="0"/>
+            <c:spPr>
+              <a:gradFill rotWithShape="1">
+                <a:gsLst>
+                  <a:gs pos="0">
+                    <a:schemeClr val="accent1">
+                      <a:satMod val="103000"/>
+                      <a:lumMod val="102000"/>
+                      <a:tint val="94000"/>
+                    </a:schemeClr>
+                  </a:gs>
+                  <a:gs pos="50000">
+                    <a:schemeClr val="accent1">
+                      <a:satMod val="110000"/>
+                      <a:lumMod val="100000"/>
+                      <a:shade val="100000"/>
+                    </a:schemeClr>
+                  </a:gs>
+                  <a:gs pos="100000">
+                    <a:schemeClr val="accent1">
+                      <a:lumMod val="99000"/>
+                      <a:satMod val="120000"/>
+                      <a:shade val="78000"/>
+                    </a:schemeClr>
+                  </a:gs>
+                </a:gsLst>
+                <a:lin ang="5400000" scaled="0"/>
+              </a:gradFill>
+              <a:ln>
+                <a:noFill/>
+              </a:ln>
+              <a:effectLst>
+                <a:outerShdw blurRad="57150" dist="19050" dir="5400000" algn="ctr" rotWithShape="0">
+                  <a:srgbClr val="000000">
+                    <a:alpha val="63000"/>
+                  </a:srgbClr>
+                </a:outerShdw>
+              </a:effectLst>
+            </c:spPr>
+            <c:extLst>
+              <c:ext xmlns:c16="http://schemas.microsoft.com/office/drawing/2014/chart" uri="{C3380CC4-5D6E-409C-BE32-E72D297353CC}">
+                <c16:uniqueId val="{00000001-DA04-41DB-A679-0EDFA31B34A6}"/>
+              </c:ext>
+            </c:extLst>
+          </c:dPt>
+          <c:dPt>
+            <c:idx val="1"/>
+            <c:bubble3D val="0"/>
+            <c:spPr>
+              <a:gradFill rotWithShape="1">
+                <a:gsLst>
+                  <a:gs pos="0">
+                    <a:schemeClr val="accent2">
+                      <a:satMod val="103000"/>
+                      <a:lumMod val="102000"/>
+                      <a:tint val="94000"/>
+                    </a:schemeClr>
+                  </a:gs>
+                  <a:gs pos="50000">
+                    <a:schemeClr val="accent2">
+                      <a:satMod val="110000"/>
+                      <a:lumMod val="100000"/>
+                      <a:shade val="100000"/>
+                    </a:schemeClr>
+                  </a:gs>
+                  <a:gs pos="100000">
+                    <a:schemeClr val="accent2">
+                      <a:lumMod val="99000"/>
+                      <a:satMod val="120000"/>
+                      <a:shade val="78000"/>
+                    </a:schemeClr>
+                  </a:gs>
+                </a:gsLst>
+                <a:lin ang="5400000" scaled="0"/>
+              </a:gradFill>
+              <a:ln>
+                <a:noFill/>
+              </a:ln>
+              <a:effectLst>
+                <a:outerShdw blurRad="57150" dist="19050" dir="5400000" algn="ctr" rotWithShape="0">
+                  <a:srgbClr val="000000">
+                    <a:alpha val="63000"/>
+                  </a:srgbClr>
+                </a:outerShdw>
+              </a:effectLst>
+            </c:spPr>
+            <c:extLst>
+              <c:ext xmlns:c16="http://schemas.microsoft.com/office/drawing/2014/chart" uri="{C3380CC4-5D6E-409C-BE32-E72D297353CC}">
+                <c16:uniqueId val="{00000003-DA04-41DB-A679-0EDFA31B34A6}"/>
+              </c:ext>
+            </c:extLst>
+          </c:dPt>
+          <c:dPt>
+            <c:idx val="2"/>
+            <c:bubble3D val="0"/>
+            <c:spPr>
+              <a:gradFill rotWithShape="1">
+                <a:gsLst>
+                  <a:gs pos="0">
+                    <a:schemeClr val="accent3">
+                      <a:satMod val="103000"/>
+                      <a:lumMod val="102000"/>
+                      <a:tint val="94000"/>
+                    </a:schemeClr>
+                  </a:gs>
+                  <a:gs pos="50000">
+                    <a:schemeClr val="accent3">
+                      <a:satMod val="110000"/>
+                      <a:lumMod val="100000"/>
+                      <a:shade val="100000"/>
+                    </a:schemeClr>
+                  </a:gs>
+                  <a:gs pos="100000">
+                    <a:schemeClr val="accent3">
+                      <a:lumMod val="99000"/>
+                      <a:satMod val="120000"/>
+                      <a:shade val="78000"/>
+                    </a:schemeClr>
+                  </a:gs>
+                </a:gsLst>
+                <a:lin ang="5400000" scaled="0"/>
+              </a:gradFill>
+              <a:ln>
+                <a:noFill/>
+              </a:ln>
+              <a:effectLst>
+                <a:outerShdw blurRad="57150" dist="19050" dir="5400000" algn="ctr" rotWithShape="0">
+                  <a:srgbClr val="000000">
+                    <a:alpha val="63000"/>
+                  </a:srgbClr>
+                </a:outerShdw>
+              </a:effectLst>
+            </c:spPr>
+            <c:extLst>
+              <c:ext xmlns:c16="http://schemas.microsoft.com/office/drawing/2014/chart" uri="{C3380CC4-5D6E-409C-BE32-E72D297353CC}">
+                <c16:uniqueId val="{00000005-DA04-41DB-A679-0EDFA31B34A6}"/>
+              </c:ext>
+            </c:extLst>
+          </c:dPt>
+          <c:dPt>
+            <c:idx val="3"/>
+            <c:bubble3D val="0"/>
+            <c:spPr>
+              <a:gradFill rotWithShape="1">
+                <a:gsLst>
+                  <a:gs pos="0">
+                    <a:schemeClr val="accent4">
+                      <a:satMod val="103000"/>
+                      <a:lumMod val="102000"/>
+                      <a:tint val="94000"/>
+                    </a:schemeClr>
+                  </a:gs>
+                  <a:gs pos="50000">
+                    <a:schemeClr val="accent4">
+                      <a:satMod val="110000"/>
+                      <a:lumMod val="100000"/>
+                      <a:shade val="100000"/>
+                    </a:schemeClr>
+                  </a:gs>
+                  <a:gs pos="100000">
+                    <a:schemeClr val="accent4">
+                      <a:lumMod val="99000"/>
+                      <a:satMod val="120000"/>
+                      <a:shade val="78000"/>
+                    </a:schemeClr>
+                  </a:gs>
+                </a:gsLst>
+                <a:lin ang="5400000" scaled="0"/>
+              </a:gradFill>
+              <a:ln>
+                <a:noFill/>
+              </a:ln>
+              <a:effectLst>
+                <a:outerShdw blurRad="57150" dist="19050" dir="5400000" algn="ctr" rotWithShape="0">
+                  <a:srgbClr val="000000">
+                    <a:alpha val="63000"/>
+                  </a:srgbClr>
+                </a:outerShdw>
+              </a:effectLst>
+            </c:spPr>
+            <c:extLst>
+              <c:ext xmlns:c16="http://schemas.microsoft.com/office/drawing/2014/chart" uri="{C3380CC4-5D6E-409C-BE32-E72D297353CC}">
+                <c16:uniqueId val="{00000007-DA04-41DB-A679-0EDFA31B34A6}"/>
+              </c:ext>
+            </c:extLst>
+          </c:dPt>
+          <c:dPt>
+            <c:idx val="4"/>
+            <c:bubble3D val="0"/>
+            <c:spPr>
+              <a:gradFill rotWithShape="1">
+                <a:gsLst>
+                  <a:gs pos="0">
+                    <a:schemeClr val="accent5">
+                      <a:satMod val="103000"/>
+                      <a:lumMod val="102000"/>
+                      <a:tint val="94000"/>
+                    </a:schemeClr>
+                  </a:gs>
+                  <a:gs pos="50000">
+                    <a:schemeClr val="accent5">
+                      <a:satMod val="110000"/>
+                      <a:lumMod val="100000"/>
+                      <a:shade val="100000"/>
+                    </a:schemeClr>
+                  </a:gs>
+                  <a:gs pos="100000">
+                    <a:schemeClr val="accent5">
+                      <a:lumMod val="99000"/>
+                      <a:satMod val="120000"/>
+                      <a:shade val="78000"/>
+                    </a:schemeClr>
+                  </a:gs>
+                </a:gsLst>
+                <a:lin ang="5400000" scaled="0"/>
+              </a:gradFill>
+              <a:ln>
+                <a:noFill/>
+              </a:ln>
+              <a:effectLst>
+                <a:outerShdw blurRad="57150" dist="19050" dir="5400000" algn="ctr" rotWithShape="0">
+                  <a:srgbClr val="000000">
+                    <a:alpha val="63000"/>
+                  </a:srgbClr>
+                </a:outerShdw>
+              </a:effectLst>
+            </c:spPr>
+            <c:extLst>
+              <c:ext xmlns:c16="http://schemas.microsoft.com/office/drawing/2014/chart" uri="{C3380CC4-5D6E-409C-BE32-E72D297353CC}">
+                <c16:uniqueId val="{00000009-DA04-41DB-A679-0EDFA31B34A6}"/>
+              </c:ext>
+            </c:extLst>
+          </c:dPt>
+          <c:dPt>
+            <c:idx val="5"/>
+            <c:bubble3D val="0"/>
+            <c:spPr>
+              <a:gradFill rotWithShape="1">
+                <a:gsLst>
+                  <a:gs pos="0">
+                    <a:schemeClr val="accent6">
+                      <a:satMod val="103000"/>
+                      <a:lumMod val="102000"/>
+                      <a:tint val="94000"/>
+                    </a:schemeClr>
+                  </a:gs>
+                  <a:gs pos="50000">
+                    <a:schemeClr val="accent6">
+                      <a:satMod val="110000"/>
+                      <a:lumMod val="100000"/>
+                      <a:shade val="100000"/>
+                    </a:schemeClr>
+                  </a:gs>
+                  <a:gs pos="100000">
+                    <a:schemeClr val="accent6">
+                      <a:lumMod val="99000"/>
+                      <a:satMod val="120000"/>
+                      <a:shade val="78000"/>
+                    </a:schemeClr>
+                  </a:gs>
+                </a:gsLst>
+                <a:lin ang="5400000" scaled="0"/>
+              </a:gradFill>
+              <a:ln>
+                <a:noFill/>
+              </a:ln>
+              <a:effectLst>
+                <a:outerShdw blurRad="57150" dist="19050" dir="5400000" algn="ctr" rotWithShape="0">
+                  <a:srgbClr val="000000">
+                    <a:alpha val="63000"/>
+                  </a:srgbClr>
+                </a:outerShdw>
+              </a:effectLst>
+            </c:spPr>
+            <c:extLst>
+              <c:ext xmlns:c16="http://schemas.microsoft.com/office/drawing/2014/chart" uri="{C3380CC4-5D6E-409C-BE32-E72D297353CC}">
+                <c16:uniqueId val="{0000000B-DA04-41DB-A679-0EDFA31B34A6}"/>
+              </c:ext>
+            </c:extLst>
+          </c:dPt>
+          <c:dPt>
+            <c:idx val="6"/>
+            <c:bubble3D val="0"/>
+            <c:spPr>
+              <a:gradFill rotWithShape="1">
+                <a:gsLst>
+                  <a:gs pos="0">
+                    <a:schemeClr val="accent1">
+                      <a:lumMod val="60000"/>
+                      <a:satMod val="103000"/>
+                      <a:lumMod val="102000"/>
+                      <a:tint val="94000"/>
+                    </a:schemeClr>
+                  </a:gs>
+                  <a:gs pos="50000">
+                    <a:schemeClr val="accent1">
+                      <a:lumMod val="60000"/>
+                      <a:satMod val="110000"/>
+                      <a:lumMod val="100000"/>
+                      <a:shade val="100000"/>
+                    </a:schemeClr>
+                  </a:gs>
+                  <a:gs pos="100000">
+                    <a:schemeClr val="accent1">
+                      <a:lumMod val="60000"/>
+                      <a:lumMod val="99000"/>
+                      <a:satMod val="120000"/>
+                      <a:shade val="78000"/>
+                    </a:schemeClr>
+                  </a:gs>
+                </a:gsLst>
+                <a:lin ang="5400000" scaled="0"/>
+              </a:gradFill>
+              <a:ln>
+                <a:noFill/>
+              </a:ln>
+              <a:effectLst>
+                <a:outerShdw blurRad="57150" dist="19050" dir="5400000" algn="ctr" rotWithShape="0">
+                  <a:srgbClr val="000000">
+                    <a:alpha val="63000"/>
+                  </a:srgbClr>
+                </a:outerShdw>
+              </a:effectLst>
+            </c:spPr>
+            <c:extLst>
+              <c:ext xmlns:c16="http://schemas.microsoft.com/office/drawing/2014/chart" uri="{C3380CC4-5D6E-409C-BE32-E72D297353CC}">
+                <c16:uniqueId val="{0000000D-DA04-41DB-A679-0EDFA31B34A6}"/>
+              </c:ext>
+            </c:extLst>
+          </c:dPt>
+          <c:dPt>
+            <c:idx val="7"/>
+            <c:bubble3D val="0"/>
+            <c:spPr>
+              <a:gradFill rotWithShape="1">
+                <a:gsLst>
+                  <a:gs pos="0">
+                    <a:schemeClr val="accent2">
+                      <a:lumMod val="60000"/>
+                      <a:satMod val="103000"/>
+                      <a:lumMod val="102000"/>
+                      <a:tint val="94000"/>
+                    </a:schemeClr>
+                  </a:gs>
+                  <a:gs pos="50000">
+                    <a:schemeClr val="accent2">
+                      <a:lumMod val="60000"/>
+                      <a:satMod val="110000"/>
+                      <a:lumMod val="100000"/>
+                      <a:shade val="100000"/>
+                    </a:schemeClr>
+                  </a:gs>
+                  <a:gs pos="100000">
+                    <a:schemeClr val="accent2">
+                      <a:lumMod val="60000"/>
+                      <a:lumMod val="99000"/>
+                      <a:satMod val="120000"/>
+                      <a:shade val="78000"/>
+                    </a:schemeClr>
+                  </a:gs>
+                </a:gsLst>
+                <a:lin ang="5400000" scaled="0"/>
+              </a:gradFill>
+              <a:ln>
+                <a:noFill/>
+              </a:ln>
+              <a:effectLst>
+                <a:outerShdw blurRad="57150" dist="19050" dir="5400000" algn="ctr" rotWithShape="0">
+                  <a:srgbClr val="000000">
+                    <a:alpha val="63000"/>
+                  </a:srgbClr>
+                </a:outerShdw>
+              </a:effectLst>
+            </c:spPr>
+            <c:extLst>
+              <c:ext xmlns:c16="http://schemas.microsoft.com/office/drawing/2014/chart" uri="{C3380CC4-5D6E-409C-BE32-E72D297353CC}">
+                <c16:uniqueId val="{0000000F-DA04-41DB-A679-0EDFA31B34A6}"/>
+              </c:ext>
+            </c:extLst>
+          </c:dPt>
+          <c:dPt>
+            <c:idx val="8"/>
+            <c:bubble3D val="0"/>
+            <c:spPr>
+              <a:gradFill rotWithShape="1">
+                <a:gsLst>
+                  <a:gs pos="0">
+                    <a:schemeClr val="accent3">
+                      <a:lumMod val="60000"/>
+                      <a:satMod val="103000"/>
+                      <a:lumMod val="102000"/>
+                      <a:tint val="94000"/>
+                    </a:schemeClr>
+                  </a:gs>
+                  <a:gs pos="50000">
+                    <a:schemeClr val="accent3">
+                      <a:lumMod val="60000"/>
+                      <a:satMod val="110000"/>
+                      <a:lumMod val="100000"/>
+                      <a:shade val="100000"/>
+                    </a:schemeClr>
+                  </a:gs>
+                  <a:gs pos="100000">
+                    <a:schemeClr val="accent3">
+                      <a:lumMod val="60000"/>
+                      <a:lumMod val="99000"/>
+                      <a:satMod val="120000"/>
+                      <a:shade val="78000"/>
+                    </a:schemeClr>
+                  </a:gs>
+                </a:gsLst>
+                <a:lin ang="5400000" scaled="0"/>
+              </a:gradFill>
+              <a:ln>
+                <a:noFill/>
+              </a:ln>
+              <a:effectLst>
+                <a:outerShdw blurRad="57150" dist="19050" dir="5400000" algn="ctr" rotWithShape="0">
+                  <a:srgbClr val="000000">
+                    <a:alpha val="63000"/>
+                  </a:srgbClr>
+                </a:outerShdw>
+              </a:effectLst>
+            </c:spPr>
+            <c:extLst>
+              <c:ext xmlns:c16="http://schemas.microsoft.com/office/drawing/2014/chart" uri="{C3380CC4-5D6E-409C-BE32-E72D297353CC}">
+                <c16:uniqueId val="{00000011-DA04-41DB-A679-0EDFA31B34A6}"/>
+              </c:ext>
+            </c:extLst>
+          </c:dPt>
+          <c:dPt>
+            <c:idx val="9"/>
+            <c:bubble3D val="0"/>
+            <c:spPr>
+              <a:gradFill rotWithShape="1">
+                <a:gsLst>
+                  <a:gs pos="0">
+                    <a:schemeClr val="accent4">
+                      <a:lumMod val="60000"/>
+                      <a:satMod val="103000"/>
+                      <a:lumMod val="102000"/>
+                      <a:tint val="94000"/>
+                    </a:schemeClr>
+                  </a:gs>
+                  <a:gs pos="50000">
+                    <a:schemeClr val="accent4">
+                      <a:lumMod val="60000"/>
+                      <a:satMod val="110000"/>
+                      <a:lumMod val="100000"/>
+                      <a:shade val="100000"/>
+                    </a:schemeClr>
+                  </a:gs>
+                  <a:gs pos="100000">
+                    <a:schemeClr val="accent4">
+                      <a:lumMod val="60000"/>
+                      <a:lumMod val="99000"/>
+                      <a:satMod val="120000"/>
+                      <a:shade val="78000"/>
+                    </a:schemeClr>
+                  </a:gs>
+                </a:gsLst>
+                <a:lin ang="5400000" scaled="0"/>
+              </a:gradFill>
+              <a:ln>
+                <a:noFill/>
+              </a:ln>
+              <a:effectLst>
+                <a:outerShdw blurRad="57150" dist="19050" dir="5400000" algn="ctr" rotWithShape="0">
+                  <a:srgbClr val="000000">
+                    <a:alpha val="63000"/>
+                  </a:srgbClr>
+                </a:outerShdw>
+              </a:effectLst>
+            </c:spPr>
+            <c:extLst>
+              <c:ext xmlns:c16="http://schemas.microsoft.com/office/drawing/2014/chart" uri="{C3380CC4-5D6E-409C-BE32-E72D297353CC}">
+                <c16:uniqueId val="{00000013-DA04-41DB-A679-0EDFA31B34A6}"/>
+              </c:ext>
+            </c:extLst>
+          </c:dPt>
+          <c:dPt>
+            <c:idx val="10"/>
+            <c:bubble3D val="0"/>
+            <c:spPr>
+              <a:gradFill rotWithShape="1">
+                <a:gsLst>
+                  <a:gs pos="0">
+                    <a:schemeClr val="accent5">
+                      <a:lumMod val="60000"/>
+                      <a:satMod val="103000"/>
+                      <a:lumMod val="102000"/>
+                      <a:tint val="94000"/>
+                    </a:schemeClr>
+                  </a:gs>
+                  <a:gs pos="50000">
+                    <a:schemeClr val="accent5">
+                      <a:lumMod val="60000"/>
+                      <a:satMod val="110000"/>
+                      <a:lumMod val="100000"/>
+                      <a:shade val="100000"/>
+                    </a:schemeClr>
+                  </a:gs>
+                  <a:gs pos="100000">
+                    <a:schemeClr val="accent5">
+                      <a:lumMod val="60000"/>
+                      <a:lumMod val="99000"/>
+                      <a:satMod val="120000"/>
+                      <a:shade val="78000"/>
+                    </a:schemeClr>
+                  </a:gs>
+                </a:gsLst>
+                <a:lin ang="5400000" scaled="0"/>
+              </a:gradFill>
+              <a:ln>
+                <a:noFill/>
+              </a:ln>
+              <a:effectLst>
+                <a:outerShdw blurRad="57150" dist="19050" dir="5400000" algn="ctr" rotWithShape="0">
+                  <a:srgbClr val="000000">
+                    <a:alpha val="63000"/>
+                  </a:srgbClr>
+                </a:outerShdw>
+              </a:effectLst>
+            </c:spPr>
+            <c:extLst>
+              <c:ext xmlns:c16="http://schemas.microsoft.com/office/drawing/2014/chart" uri="{C3380CC4-5D6E-409C-BE32-E72D297353CC}">
+                <c16:uniqueId val="{00000015-DA04-41DB-A679-0EDFA31B34A6}"/>
+              </c:ext>
+            </c:extLst>
+          </c:dPt>
+          <c:dPt>
+            <c:idx val="11"/>
+            <c:bubble3D val="0"/>
+            <c:spPr>
+              <a:gradFill rotWithShape="1">
+                <a:gsLst>
+                  <a:gs pos="0">
+                    <a:schemeClr val="accent6">
+                      <a:lumMod val="60000"/>
+                      <a:satMod val="103000"/>
+                      <a:lumMod val="102000"/>
+                      <a:tint val="94000"/>
+                    </a:schemeClr>
+                  </a:gs>
+                  <a:gs pos="50000">
+                    <a:schemeClr val="accent6">
+                      <a:lumMod val="60000"/>
+                      <a:satMod val="110000"/>
+                      <a:lumMod val="100000"/>
+                      <a:shade val="100000"/>
+                    </a:schemeClr>
+                  </a:gs>
+                  <a:gs pos="100000">
+                    <a:schemeClr val="accent6">
+                      <a:lumMod val="60000"/>
+                      <a:lumMod val="99000"/>
+                      <a:satMod val="120000"/>
+                      <a:shade val="78000"/>
+                    </a:schemeClr>
+                  </a:gs>
+                </a:gsLst>
+                <a:lin ang="5400000" scaled="0"/>
+              </a:gradFill>
+              <a:ln>
+                <a:noFill/>
+              </a:ln>
+              <a:effectLst>
+                <a:outerShdw blurRad="57150" dist="19050" dir="5400000" algn="ctr" rotWithShape="0">
+                  <a:srgbClr val="000000">
+                    <a:alpha val="63000"/>
+                  </a:srgbClr>
+                </a:outerShdw>
+              </a:effectLst>
+            </c:spPr>
+            <c:extLst>
+              <c:ext xmlns:c16="http://schemas.microsoft.com/office/drawing/2014/chart" uri="{C3380CC4-5D6E-409C-BE32-E72D297353CC}">
+                <c16:uniqueId val="{00000017-DA04-41DB-A679-0EDFA31B34A6}"/>
+              </c:ext>
+            </c:extLst>
+          </c:dPt>
+          <c:dPt>
+            <c:idx val="12"/>
+            <c:bubble3D val="0"/>
+            <c:spPr>
+              <a:gradFill rotWithShape="1">
+                <a:gsLst>
+                  <a:gs pos="0">
+                    <a:schemeClr val="accent1">
+                      <a:lumMod val="80000"/>
+                      <a:lumOff val="20000"/>
+                      <a:satMod val="103000"/>
+                      <a:lumMod val="102000"/>
+                      <a:tint val="94000"/>
+                    </a:schemeClr>
+                  </a:gs>
+                  <a:gs pos="50000">
+                    <a:schemeClr val="accent1">
+                      <a:lumMod val="80000"/>
+                      <a:lumOff val="20000"/>
+                      <a:satMod val="110000"/>
+                      <a:lumMod val="100000"/>
+                      <a:shade val="100000"/>
+                    </a:schemeClr>
+                  </a:gs>
+                  <a:gs pos="100000">
+                    <a:schemeClr val="accent1">
+                      <a:lumMod val="80000"/>
+                      <a:lumOff val="20000"/>
+                      <a:lumMod val="99000"/>
+                      <a:satMod val="120000"/>
+                      <a:shade val="78000"/>
+                    </a:schemeClr>
+                  </a:gs>
+                </a:gsLst>
+                <a:lin ang="5400000" scaled="0"/>
+              </a:gradFill>
+              <a:ln>
+                <a:noFill/>
+              </a:ln>
+              <a:effectLst>
+                <a:outerShdw blurRad="57150" dist="19050" dir="5400000" algn="ctr" rotWithShape="0">
+                  <a:srgbClr val="000000">
+                    <a:alpha val="63000"/>
+                  </a:srgbClr>
+                </a:outerShdw>
+              </a:effectLst>
+            </c:spPr>
+            <c:extLst>
+              <c:ext xmlns:c16="http://schemas.microsoft.com/office/drawing/2014/chart" uri="{C3380CC4-5D6E-409C-BE32-E72D297353CC}">
+                <c16:uniqueId val="{00000019-DA04-41DB-A679-0EDFA31B34A6}"/>
+              </c:ext>
+            </c:extLst>
+          </c:dPt>
+          <c:dPt>
+            <c:idx val="13"/>
+            <c:bubble3D val="0"/>
+            <c:spPr>
+              <a:gradFill rotWithShape="1">
+                <a:gsLst>
+                  <a:gs pos="0">
+                    <a:schemeClr val="accent2">
+                      <a:lumMod val="80000"/>
+                      <a:lumOff val="20000"/>
+                      <a:satMod val="103000"/>
+                      <a:lumMod val="102000"/>
+                      <a:tint val="94000"/>
+                    </a:schemeClr>
+                  </a:gs>
+                  <a:gs pos="50000">
+                    <a:schemeClr val="accent2">
+                      <a:lumMod val="80000"/>
+                      <a:lumOff val="20000"/>
+                      <a:satMod val="110000"/>
+                      <a:lumMod val="100000"/>
+                      <a:shade val="100000"/>
+                    </a:schemeClr>
+                  </a:gs>
+                  <a:gs pos="100000">
+                    <a:schemeClr val="accent2">
+                      <a:lumMod val="80000"/>
+                      <a:lumOff val="20000"/>
+                      <a:lumMod val="99000"/>
+                      <a:satMod val="120000"/>
+                      <a:shade val="78000"/>
+                    </a:schemeClr>
+                  </a:gs>
+                </a:gsLst>
+                <a:lin ang="5400000" scaled="0"/>
+              </a:gradFill>
+              <a:ln>
+                <a:noFill/>
+              </a:ln>
+              <a:effectLst>
+                <a:outerShdw blurRad="57150" dist="19050" dir="5400000" algn="ctr" rotWithShape="0">
+                  <a:srgbClr val="000000">
+                    <a:alpha val="63000"/>
+                  </a:srgbClr>
+                </a:outerShdw>
+              </a:effectLst>
+            </c:spPr>
+            <c:extLst>
+              <c:ext xmlns:c16="http://schemas.microsoft.com/office/drawing/2014/chart" uri="{C3380CC4-5D6E-409C-BE32-E72D297353CC}">
+                <c16:uniqueId val="{0000001B-DA04-41DB-A679-0EDFA31B34A6}"/>
+              </c:ext>
+            </c:extLst>
+          </c:dPt>
+          <c:dLbls>
+            <c:numFmt formatCode="#,##0_);\(#,##0\)" sourceLinked="0"/>
+            <c:spPr>
+              <a:noFill/>
+              <a:ln>
+                <a:noFill/>
+              </a:ln>
+              <a:effectLst/>
+            </c:spPr>
+            <c:txPr>
+              <a:bodyPr rot="0" spcFirstLastPara="1" vertOverflow="ellipsis" vert="horz" wrap="square" lIns="38100" tIns="19050" rIns="38100" bIns="19050" anchor="ctr" anchorCtr="1">
+                <a:spAutoFit/>
+              </a:bodyPr>
+              <a:lstStyle/>
+              <a:p>
+                <a:pPr>
+                  <a:defRPr sz="1197" b="0" i="0" u="none" strike="noStrike" kern="1200" baseline="0">
+                    <a:solidFill>
+                      <a:schemeClr val="tx1"/>
+                    </a:solidFill>
+                    <a:latin typeface="+mn-lt"/>
+                    <a:ea typeface="+mn-ea"/>
+                    <a:cs typeface="+mn-cs"/>
+                  </a:defRPr>
+                </a:pPr>
+                <a:endParaRPr lang="en-US"/>
+              </a:p>
+            </c:txPr>
+            <c:showLegendKey val="0"/>
+            <c:showVal val="1"/>
+            <c:showCatName val="1"/>
+            <c:showSerName val="0"/>
+            <c:showPercent val="0"/>
+            <c:showBubbleSize val="0"/>
+            <c:separator>
+</c:separator>
+            <c:showLeaderLines val="1"/>
+            <c:leaderLines>
+              <c:spPr>
+                <a:ln w="9525" cap="flat" cmpd="sng" algn="ctr">
+                  <a:solidFill>
+                    <a:schemeClr val="tx1">
+                      <a:lumMod val="35000"/>
+                      <a:lumOff val="65000"/>
+                    </a:schemeClr>
+                  </a:solidFill>
+                  <a:round/>
+                </a:ln>
+                <a:effectLst/>
+              </c:spPr>
+            </c:leaderLines>
+            <c:extLst>
+              <c:ext xmlns:c15="http://schemas.microsoft.com/office/drawing/2012/chart" uri="{CE6537A1-D6FC-4f65-9D91-7224C49458BB}"/>
+            </c:extLst>
+          </c:dLbls>
+          <c:cat>
+            <c:strRef>
+              <c:f>Sheet1!$A$2:$A$15</c:f>
+              <c:strCache>
+                <c:ptCount val="6"/>
+                <c:pt idx="0">
+                  <c:v>Module 1</c:v>
+                </c:pt>
+                <c:pt idx="1">
+                  <c:v>Module 2</c:v>
+                </c:pt>
+                <c:pt idx="2">
+                  <c:v>Module 3</c:v>
+                </c:pt>
+                <c:pt idx="3">
+                  <c:v>Module 4</c:v>
+                </c:pt>
+                <c:pt idx="4">
+                  <c:v>Module 5</c:v>
+                </c:pt>
+                <c:pt idx="5">
+                  <c:v>Module 6</c:v>
+                </c:pt>
+              </c:strCache>
+            </c:strRef>
+          </c:cat>
+          <c:val>
+            <c:numRef>
+              <c:f>Sheet1!$B$2:$B$15</c:f>
+              <c:numCache>
+                <c:formatCode>General</c:formatCode>
+                <c:ptCount val="14"/>
+                <c:pt idx="0">
+                  <c:v>35000</c:v>
+                </c:pt>
+                <c:pt idx="1">
+                  <c:v>35000</c:v>
+                </c:pt>
+                <c:pt idx="2">
+                  <c:v>35000</c:v>
+                </c:pt>
+                <c:pt idx="3">
+                  <c:v>35000</c:v>
+                </c:pt>
+                <c:pt idx="4">
+                  <c:v>35000</c:v>
+                </c:pt>
+                <c:pt idx="5">
+                  <c:v>35000</c:v>
+                </c:pt>
+              </c:numCache>
+            </c:numRef>
+          </c:val>
+          <c:extLst>
+            <c:ext xmlns:c16="http://schemas.microsoft.com/office/drawing/2014/chart" uri="{C3380CC4-5D6E-409C-BE32-E72D297353CC}">
+              <c16:uniqueId val="{0000001C-DA04-41DB-A679-0EDFA31B34A6}"/>
+            </c:ext>
+          </c:extLst>
+        </c:ser>
+        <c:dLbls>
+          <c:showLegendKey val="0"/>
+          <c:showVal val="1"/>
+          <c:showCatName val="1"/>
+          <c:showSerName val="0"/>
+          <c:showPercent val="0"/>
+          <c:showBubbleSize val="0"/>
+          <c:showLeaderLines val="1"/>
+        </c:dLbls>
+        <c:firstSliceAng val="0"/>
+      </c:pieChart>
+      <c:spPr>
+        <a:noFill/>
+        <a:ln>
+          <a:noFill/>
+        </a:ln>
+        <a:effectLst/>
+      </c:spPr>
+    </c:plotArea>
     <c:plotVisOnly val="1"/>
     <c:dispBlanksAs val="gap"/>
     <c:showDLblsOverMax val="0"/>
@@ -3068,6 +4704,86 @@
 </file>
 
 <file path=ppt/charts/colors6.xml><?xml version="1.0" encoding="utf-8"?>
+<cs:colorStyle xmlns:cs="http://schemas.microsoft.com/office/drawing/2012/chartStyle" xmlns:a="http://schemas.openxmlformats.org/drawingml/2006/main" meth="cycle" id="10">
+  <a:schemeClr val="accent1"/>
+  <a:schemeClr val="accent2"/>
+  <a:schemeClr val="accent3"/>
+  <a:schemeClr val="accent4"/>
+  <a:schemeClr val="accent5"/>
+  <a:schemeClr val="accent6"/>
+  <cs:variation/>
+  <cs:variation>
+    <a:lumMod val="60000"/>
+  </cs:variation>
+  <cs:variation>
+    <a:lumMod val="80000"/>
+    <a:lumOff val="20000"/>
+  </cs:variation>
+  <cs:variation>
+    <a:lumMod val="80000"/>
+  </cs:variation>
+  <cs:variation>
+    <a:lumMod val="60000"/>
+    <a:lumOff val="40000"/>
+  </cs:variation>
+  <cs:variation>
+    <a:lumMod val="50000"/>
+  </cs:variation>
+  <cs:variation>
+    <a:lumMod val="70000"/>
+    <a:lumOff val="30000"/>
+  </cs:variation>
+  <cs:variation>
+    <a:lumMod val="70000"/>
+  </cs:variation>
+  <cs:variation>
+    <a:lumMod val="50000"/>
+    <a:lumOff val="50000"/>
+  </cs:variation>
+</cs:colorStyle>
+</file>
+
+<file path=ppt/charts/colors7.xml><?xml version="1.0" encoding="utf-8"?>
+<cs:colorStyle xmlns:cs="http://schemas.microsoft.com/office/drawing/2012/chartStyle" xmlns:a="http://schemas.openxmlformats.org/drawingml/2006/main" meth="cycle" id="10">
+  <a:schemeClr val="accent1"/>
+  <a:schemeClr val="accent2"/>
+  <a:schemeClr val="accent3"/>
+  <a:schemeClr val="accent4"/>
+  <a:schemeClr val="accent5"/>
+  <a:schemeClr val="accent6"/>
+  <cs:variation/>
+  <cs:variation>
+    <a:lumMod val="60000"/>
+  </cs:variation>
+  <cs:variation>
+    <a:lumMod val="80000"/>
+    <a:lumOff val="20000"/>
+  </cs:variation>
+  <cs:variation>
+    <a:lumMod val="80000"/>
+  </cs:variation>
+  <cs:variation>
+    <a:lumMod val="60000"/>
+    <a:lumOff val="40000"/>
+  </cs:variation>
+  <cs:variation>
+    <a:lumMod val="50000"/>
+  </cs:variation>
+  <cs:variation>
+    <a:lumMod val="70000"/>
+    <a:lumOff val="30000"/>
+  </cs:variation>
+  <cs:variation>
+    <a:lumMod val="70000"/>
+  </cs:variation>
+  <cs:variation>
+    <a:lumMod val="50000"/>
+    <a:lumOff val="50000"/>
+  </cs:variation>
+</cs:colorStyle>
+</file>
+
+<file path=ppt/charts/colors8.xml><?xml version="1.0" encoding="utf-8"?>
 <cs:colorStyle xmlns:cs="http://schemas.microsoft.com/office/drawing/2012/chartStyle" xmlns:a="http://schemas.openxmlformats.org/drawingml/2006/main" meth="cycle" id="10">
   <a:schemeClr val="accent1"/>
   <a:schemeClr val="accent2"/>
@@ -5625,7 +7341,7 @@
 </file>
 
 <file path=ppt/charts/style6.xml><?xml version="1.0" encoding="utf-8"?>
-<cs:chartStyle xmlns:cs="http://schemas.microsoft.com/office/drawing/2012/chartStyle" xmlns:a="http://schemas.openxmlformats.org/drawingml/2006/main" id="251">
+<cs:chartStyle xmlns:cs="http://schemas.microsoft.com/office/drawing/2012/chartStyle" xmlns:a="http://schemas.openxmlformats.org/drawingml/2006/main" id="317">
   <cs:axisTitle>
     <cs:lnRef idx="0"/>
     <cs:fillRef idx="0"/>
@@ -5682,7 +7398,7 @@
         <a:round/>
       </a:ln>
     </cs:spPr>
-    <cs:defRPr sz="1197" kern="1200"/>
+    <cs:defRPr sz="1330" kern="1200"/>
   </cs:chartArea>
   <cs:dataLabel>
     <cs:lnRef idx="0"/>
@@ -5733,13 +7449,6 @@
     <cs:fontRef idx="minor">
       <a:schemeClr val="tx1"/>
     </cs:fontRef>
-    <cs:spPr>
-      <a:ln w="19050">
-        <a:solidFill>
-          <a:schemeClr val="lt1"/>
-        </a:solidFill>
-      </a:ln>
-    </cs:spPr>
   </cs:dataPoint>
   <cs:dataPoint3D>
     <cs:lnRef idx="0"/>
@@ -5750,19 +7459,12 @@
     <cs:fontRef idx="minor">
       <a:schemeClr val="tx1"/>
     </cs:fontRef>
-    <cs:spPr>
-      <a:ln w="25400">
-        <a:solidFill>
-          <a:schemeClr val="lt1"/>
-        </a:solidFill>
-      </a:ln>
-    </cs:spPr>
   </cs:dataPoint3D>
   <cs:dataPointLine>
     <cs:lnRef idx="0">
       <cs:styleClr val="auto"/>
     </cs:lnRef>
-    <cs:fillRef idx="0"/>
+    <cs:fillRef idx="1"/>
     <cs:effectRef idx="0"/>
     <cs:fontRef idx="minor">
       <a:schemeClr val="tx1"/>
@@ -5800,7 +7502,7 @@
     <cs:lnRef idx="0">
       <cs:styleClr val="auto"/>
     </cs:lnRef>
-    <cs:fillRef idx="0"/>
+    <cs:fillRef idx="1"/>
     <cs:effectRef idx="0"/>
     <cs:fontRef idx="minor">
       <a:schemeClr val="tx1"/>
@@ -6143,6 +7845,1025 @@
 </cs:chartStyle>
 </file>
 
+<file path=ppt/charts/style7.xml><?xml version="1.0" encoding="utf-8"?>
+<cs:chartStyle xmlns:cs="http://schemas.microsoft.com/office/drawing/2012/chartStyle" xmlns:a="http://schemas.openxmlformats.org/drawingml/2006/main" id="258">
+  <cs:axisTitle>
+    <cs:lnRef idx="0"/>
+    <cs:fillRef idx="0"/>
+    <cs:effectRef idx="0"/>
+    <cs:fontRef idx="minor">
+      <a:schemeClr val="tx1">
+        <a:lumMod val="65000"/>
+        <a:lumOff val="35000"/>
+      </a:schemeClr>
+    </cs:fontRef>
+    <cs:defRPr sz="1197" kern="1200"/>
+  </cs:axisTitle>
+  <cs:categoryAxis>
+    <cs:lnRef idx="0"/>
+    <cs:fillRef idx="0"/>
+    <cs:effectRef idx="0"/>
+    <cs:fontRef idx="minor">
+      <a:schemeClr val="tx1">
+        <a:lumMod val="65000"/>
+        <a:lumOff val="35000"/>
+      </a:schemeClr>
+    </cs:fontRef>
+    <cs:defRPr sz="1197" kern="1200"/>
+  </cs:categoryAxis>
+  <cs:chartArea mods="allowNoFillOverride allowNoLineOverride">
+    <cs:lnRef idx="0"/>
+    <cs:fillRef idx="0"/>
+    <cs:effectRef idx="0"/>
+    <cs:fontRef idx="minor">
+      <a:schemeClr val="tx1"/>
+    </cs:fontRef>
+    <cs:spPr>
+      <a:solidFill>
+        <a:schemeClr val="bg1"/>
+      </a:solidFill>
+      <a:ln w="9525" cap="flat" cmpd="sng" algn="ctr">
+        <a:solidFill>
+          <a:schemeClr val="tx1">
+            <a:lumMod val="15000"/>
+            <a:lumOff val="85000"/>
+          </a:schemeClr>
+        </a:solidFill>
+        <a:round/>
+      </a:ln>
+    </cs:spPr>
+    <cs:defRPr sz="1197" kern="1200"/>
+  </cs:chartArea>
+  <cs:dataLabel>
+    <cs:lnRef idx="0"/>
+    <cs:fillRef idx="0"/>
+    <cs:effectRef idx="0"/>
+    <cs:fontRef idx="minor">
+      <a:schemeClr val="lt1"/>
+    </cs:fontRef>
+    <cs:defRPr sz="1197" b="1" kern="1200"/>
+  </cs:dataLabel>
+  <cs:dataLabelCallout>
+    <cs:lnRef idx="0"/>
+    <cs:fillRef idx="0"/>
+    <cs:effectRef idx="0"/>
+    <cs:fontRef idx="minor">
+      <a:schemeClr val="dk1">
+        <a:lumMod val="65000"/>
+        <a:lumOff val="35000"/>
+      </a:schemeClr>
+    </cs:fontRef>
+    <cs:spPr>
+      <a:solidFill>
+        <a:schemeClr val="lt1"/>
+      </a:solidFill>
+      <a:ln>
+        <a:solidFill>
+          <a:schemeClr val="dk1">
+            <a:lumMod val="25000"/>
+            <a:lumOff val="75000"/>
+          </a:schemeClr>
+        </a:solidFill>
+      </a:ln>
+    </cs:spPr>
+    <cs:defRPr sz="1197" kern="1200"/>
+    <cs:bodyPr rot="0" spcFirstLastPara="1" vertOverflow="clip" horzOverflow="clip" vert="horz" wrap="square" lIns="36576" tIns="18288" rIns="36576" bIns="18288" anchor="ctr" anchorCtr="1">
+      <a:spAutoFit/>
+    </cs:bodyPr>
+  </cs:dataLabelCallout>
+  <cs:dataPoint>
+    <cs:lnRef idx="0"/>
+    <cs:fillRef idx="0">
+      <cs:styleClr val="auto"/>
+    </cs:fillRef>
+    <cs:effectRef idx="0"/>
+    <cs:fontRef idx="minor">
+      <a:schemeClr val="tx1"/>
+    </cs:fontRef>
+    <cs:spPr>
+      <a:solidFill>
+        <a:schemeClr val="phClr"/>
+      </a:solidFill>
+      <a:scene3d>
+        <a:camera prst="orthographicFront"/>
+        <a:lightRig rig="brightRoom" dir="t"/>
+      </a:scene3d>
+      <a:sp3d prstMaterial="flat">
+        <a:bevelT w="50800" h="101600" prst="angle"/>
+        <a:contourClr>
+          <a:srgbClr val="000000"/>
+        </a:contourClr>
+      </a:sp3d>
+    </cs:spPr>
+  </cs:dataPoint>
+  <cs:dataPoint3D>
+    <cs:lnRef idx="0"/>
+    <cs:fillRef idx="0">
+      <cs:styleClr val="auto"/>
+    </cs:fillRef>
+    <cs:effectRef idx="0"/>
+    <cs:fontRef idx="minor">
+      <a:schemeClr val="tx1"/>
+    </cs:fontRef>
+    <cs:spPr>
+      <a:solidFill>
+        <a:schemeClr val="phClr"/>
+      </a:solidFill>
+      <a:ln w="19050">
+        <a:solidFill>
+          <a:schemeClr val="lt1"/>
+        </a:solidFill>
+      </a:ln>
+    </cs:spPr>
+  </cs:dataPoint3D>
+  <cs:dataPointLine>
+    <cs:lnRef idx="0">
+      <cs:styleClr val="auto"/>
+    </cs:lnRef>
+    <cs:fillRef idx="0"/>
+    <cs:effectRef idx="0"/>
+    <cs:fontRef idx="minor">
+      <a:schemeClr val="tx1"/>
+    </cs:fontRef>
+    <cs:spPr>
+      <a:ln w="28575" cap="rnd">
+        <a:solidFill>
+          <a:schemeClr val="phClr"/>
+        </a:solidFill>
+        <a:round/>
+      </a:ln>
+    </cs:spPr>
+  </cs:dataPointLine>
+  <cs:dataPointMarker>
+    <cs:lnRef idx="0"/>
+    <cs:fillRef idx="0">
+      <cs:styleClr val="auto"/>
+    </cs:fillRef>
+    <cs:effectRef idx="0"/>
+    <cs:fontRef idx="minor">
+      <a:schemeClr val="tx1"/>
+    </cs:fontRef>
+    <cs:spPr>
+      <a:solidFill>
+        <a:schemeClr val="phClr"/>
+      </a:solidFill>
+      <a:ln w="9525">
+        <a:solidFill>
+          <a:schemeClr val="lt1"/>
+        </a:solidFill>
+      </a:ln>
+    </cs:spPr>
+  </cs:dataPointMarker>
+  <cs:dataPointMarkerLayout symbol="circle" size="6"/>
+  <cs:dataPointWireframe>
+    <cs:lnRef idx="0">
+      <cs:styleClr val="auto"/>
+    </cs:lnRef>
+    <cs:fillRef idx="0"/>
+    <cs:effectRef idx="0"/>
+    <cs:fontRef idx="minor">
+      <a:schemeClr val="tx1"/>
+    </cs:fontRef>
+    <cs:spPr>
+      <a:ln w="9525" cap="rnd">
+        <a:solidFill>
+          <a:schemeClr val="phClr"/>
+        </a:solidFill>
+        <a:round/>
+      </a:ln>
+    </cs:spPr>
+  </cs:dataPointWireframe>
+  <cs:dataTable>
+    <cs:lnRef idx="0"/>
+    <cs:fillRef idx="0"/>
+    <cs:effectRef idx="0"/>
+    <cs:fontRef idx="minor">
+      <a:schemeClr val="tx1">
+        <a:lumMod val="65000"/>
+        <a:lumOff val="35000"/>
+      </a:schemeClr>
+    </cs:fontRef>
+    <cs:spPr>
+      <a:noFill/>
+      <a:ln w="9525" cap="flat" cmpd="sng" algn="ctr">
+        <a:solidFill>
+          <a:schemeClr val="tx1">
+            <a:lumMod val="15000"/>
+            <a:lumOff val="85000"/>
+          </a:schemeClr>
+        </a:solidFill>
+        <a:round/>
+      </a:ln>
+    </cs:spPr>
+    <cs:defRPr sz="1197" kern="1200"/>
+  </cs:dataTable>
+  <cs:downBar>
+    <cs:lnRef idx="0"/>
+    <cs:fillRef idx="0"/>
+    <cs:effectRef idx="0"/>
+    <cs:fontRef idx="minor">
+      <a:schemeClr val="tx1"/>
+    </cs:fontRef>
+    <cs:spPr>
+      <a:solidFill>
+        <a:schemeClr val="dk1">
+          <a:lumMod val="75000"/>
+          <a:lumOff val="25000"/>
+        </a:schemeClr>
+      </a:solidFill>
+      <a:ln w="9525" cap="flat" cmpd="sng" algn="ctr">
+        <a:solidFill>
+          <a:schemeClr val="tx1">
+            <a:lumMod val="65000"/>
+            <a:lumOff val="35000"/>
+          </a:schemeClr>
+        </a:solidFill>
+        <a:round/>
+      </a:ln>
+    </cs:spPr>
+  </cs:downBar>
+  <cs:dropLine>
+    <cs:lnRef idx="0"/>
+    <cs:fillRef idx="0"/>
+    <cs:effectRef idx="0"/>
+    <cs:fontRef idx="minor">
+      <a:schemeClr val="tx1"/>
+    </cs:fontRef>
+    <cs:spPr>
+      <a:ln w="9525" cap="flat" cmpd="sng" algn="ctr">
+        <a:solidFill>
+          <a:schemeClr val="tx1">
+            <a:lumMod val="35000"/>
+            <a:lumOff val="65000"/>
+          </a:schemeClr>
+        </a:solidFill>
+        <a:round/>
+      </a:ln>
+    </cs:spPr>
+  </cs:dropLine>
+  <cs:errorBar>
+    <cs:lnRef idx="0"/>
+    <cs:fillRef idx="0"/>
+    <cs:effectRef idx="0"/>
+    <cs:fontRef idx="minor">
+      <a:schemeClr val="tx1"/>
+    </cs:fontRef>
+    <cs:spPr>
+      <a:ln w="9525" cap="flat" cmpd="sng" algn="ctr">
+        <a:solidFill>
+          <a:schemeClr val="tx1">
+            <a:lumMod val="65000"/>
+            <a:lumOff val="35000"/>
+          </a:schemeClr>
+        </a:solidFill>
+        <a:round/>
+      </a:ln>
+    </cs:spPr>
+  </cs:errorBar>
+  <cs:floor>
+    <cs:lnRef idx="0"/>
+    <cs:fillRef idx="0"/>
+    <cs:effectRef idx="0"/>
+    <cs:fontRef idx="minor">
+      <a:schemeClr val="tx1"/>
+    </cs:fontRef>
+    <cs:spPr>
+      <a:noFill/>
+      <a:ln>
+        <a:noFill/>
+      </a:ln>
+    </cs:spPr>
+  </cs:floor>
+  <cs:gridlineMajor>
+    <cs:lnRef idx="0"/>
+    <cs:fillRef idx="0"/>
+    <cs:effectRef idx="0"/>
+    <cs:fontRef idx="minor">
+      <a:schemeClr val="tx1"/>
+    </cs:fontRef>
+    <cs:spPr>
+      <a:ln w="9525" cap="flat" cmpd="sng" algn="ctr">
+        <a:solidFill>
+          <a:schemeClr val="tx1">
+            <a:lumMod val="15000"/>
+            <a:lumOff val="85000"/>
+          </a:schemeClr>
+        </a:solidFill>
+        <a:round/>
+      </a:ln>
+    </cs:spPr>
+  </cs:gridlineMajor>
+  <cs:gridlineMinor>
+    <cs:lnRef idx="0"/>
+    <cs:fillRef idx="0"/>
+    <cs:effectRef idx="0"/>
+    <cs:fontRef idx="minor">
+      <a:schemeClr val="tx1"/>
+    </cs:fontRef>
+    <cs:spPr>
+      <a:ln w="9525" cap="flat" cmpd="sng" algn="ctr">
+        <a:solidFill>
+          <a:schemeClr val="tx1">
+            <a:lumMod val="5000"/>
+            <a:lumOff val="95000"/>
+          </a:schemeClr>
+        </a:solidFill>
+        <a:round/>
+      </a:ln>
+    </cs:spPr>
+  </cs:gridlineMinor>
+  <cs:hiLoLine>
+    <cs:lnRef idx="0"/>
+    <cs:fillRef idx="0"/>
+    <cs:effectRef idx="0"/>
+    <cs:fontRef idx="minor">
+      <a:schemeClr val="tx1"/>
+    </cs:fontRef>
+    <cs:spPr>
+      <a:ln w="9525" cap="flat" cmpd="sng" algn="ctr">
+        <a:solidFill>
+          <a:schemeClr val="tx1">
+            <a:lumMod val="50000"/>
+            <a:lumOff val="50000"/>
+          </a:schemeClr>
+        </a:solidFill>
+        <a:round/>
+      </a:ln>
+    </cs:spPr>
+  </cs:hiLoLine>
+  <cs:leaderLine>
+    <cs:lnRef idx="0"/>
+    <cs:fillRef idx="0"/>
+    <cs:effectRef idx="0"/>
+    <cs:fontRef idx="minor">
+      <a:schemeClr val="tx1"/>
+    </cs:fontRef>
+    <cs:spPr>
+      <a:ln w="9525" cap="flat" cmpd="sng" algn="ctr">
+        <a:solidFill>
+          <a:schemeClr val="tx1">
+            <a:lumMod val="35000"/>
+            <a:lumOff val="65000"/>
+          </a:schemeClr>
+        </a:solidFill>
+        <a:round/>
+      </a:ln>
+    </cs:spPr>
+  </cs:leaderLine>
+  <cs:legend>
+    <cs:lnRef idx="0"/>
+    <cs:fillRef idx="0"/>
+    <cs:effectRef idx="0"/>
+    <cs:fontRef idx="minor">
+      <a:schemeClr val="tx1">
+        <a:lumMod val="65000"/>
+        <a:lumOff val="35000"/>
+      </a:schemeClr>
+    </cs:fontRef>
+    <cs:defRPr sz="1197" kern="1200"/>
+  </cs:legend>
+  <cs:plotArea mods="allowNoFillOverride allowNoLineOverride">
+    <cs:lnRef idx="0"/>
+    <cs:fillRef idx="0"/>
+    <cs:effectRef idx="0"/>
+    <cs:fontRef idx="minor">
+      <a:schemeClr val="tx1"/>
+    </cs:fontRef>
+  </cs:plotArea>
+  <cs:plotArea3D mods="allowNoFillOverride allowNoLineOverride">
+    <cs:lnRef idx="0"/>
+    <cs:fillRef idx="0"/>
+    <cs:effectRef idx="0"/>
+    <cs:fontRef idx="minor">
+      <a:schemeClr val="tx1"/>
+    </cs:fontRef>
+  </cs:plotArea3D>
+  <cs:seriesAxis>
+    <cs:lnRef idx="0"/>
+    <cs:fillRef idx="0"/>
+    <cs:effectRef idx="0"/>
+    <cs:fontRef idx="minor">
+      <a:schemeClr val="tx1">
+        <a:lumMod val="65000"/>
+        <a:lumOff val="35000"/>
+      </a:schemeClr>
+    </cs:fontRef>
+    <cs:defRPr sz="1197" kern="1200"/>
+  </cs:seriesAxis>
+  <cs:seriesLine>
+    <cs:lnRef idx="0"/>
+    <cs:fillRef idx="0"/>
+    <cs:effectRef idx="0"/>
+    <cs:fontRef idx="minor">
+      <a:schemeClr val="tx1"/>
+    </cs:fontRef>
+    <cs:spPr>
+      <a:ln w="9525" cap="flat" cmpd="sng" algn="ctr">
+        <a:solidFill>
+          <a:schemeClr val="tx1">
+            <a:lumMod val="35000"/>
+            <a:lumOff val="65000"/>
+          </a:schemeClr>
+        </a:solidFill>
+        <a:round/>
+      </a:ln>
+    </cs:spPr>
+  </cs:seriesLine>
+  <cs:title>
+    <cs:lnRef idx="0"/>
+    <cs:fillRef idx="0"/>
+    <cs:effectRef idx="0"/>
+    <cs:fontRef idx="minor">
+      <a:schemeClr val="tx1">
+        <a:lumMod val="65000"/>
+        <a:lumOff val="35000"/>
+      </a:schemeClr>
+    </cs:fontRef>
+    <cs:defRPr sz="1862" b="1" i="0" kern="1200" cap="all" spc="50" baseline="0"/>
+  </cs:title>
+  <cs:trendline>
+    <cs:lnRef idx="0">
+      <cs:styleClr val="auto"/>
+    </cs:lnRef>
+    <cs:fillRef idx="0"/>
+    <cs:effectRef idx="0"/>
+    <cs:fontRef idx="minor">
+      <a:schemeClr val="tx1"/>
+    </cs:fontRef>
+    <cs:spPr>
+      <a:ln w="19050" cap="rnd">
+        <a:solidFill>
+          <a:schemeClr val="phClr"/>
+        </a:solidFill>
+        <a:prstDash val="sysDash"/>
+      </a:ln>
+    </cs:spPr>
+  </cs:trendline>
+  <cs:trendlineLabel>
+    <cs:lnRef idx="0"/>
+    <cs:fillRef idx="0"/>
+    <cs:effectRef idx="0"/>
+    <cs:fontRef idx="minor">
+      <a:schemeClr val="tx1">
+        <a:lumMod val="65000"/>
+        <a:lumOff val="35000"/>
+      </a:schemeClr>
+    </cs:fontRef>
+    <cs:defRPr sz="1197" kern="1200"/>
+  </cs:trendlineLabel>
+  <cs:upBar>
+    <cs:lnRef idx="0"/>
+    <cs:fillRef idx="0"/>
+    <cs:effectRef idx="0"/>
+    <cs:fontRef idx="minor">
+      <a:schemeClr val="tx1"/>
+    </cs:fontRef>
+    <cs:spPr>
+      <a:solidFill>
+        <a:schemeClr val="lt1"/>
+      </a:solidFill>
+      <a:ln w="9525" cap="flat" cmpd="sng" algn="ctr">
+        <a:solidFill>
+          <a:schemeClr val="tx1">
+            <a:lumMod val="65000"/>
+            <a:lumOff val="35000"/>
+          </a:schemeClr>
+        </a:solidFill>
+        <a:round/>
+      </a:ln>
+    </cs:spPr>
+  </cs:upBar>
+  <cs:valueAxis>
+    <cs:lnRef idx="0"/>
+    <cs:fillRef idx="0"/>
+    <cs:effectRef idx="0"/>
+    <cs:fontRef idx="minor">
+      <a:schemeClr val="tx1">
+        <a:lumMod val="65000"/>
+        <a:lumOff val="35000"/>
+      </a:schemeClr>
+    </cs:fontRef>
+    <cs:defRPr sz="1197" kern="1200"/>
+  </cs:valueAxis>
+  <cs:wall>
+    <cs:lnRef idx="0"/>
+    <cs:fillRef idx="0"/>
+    <cs:effectRef idx="0"/>
+    <cs:fontRef idx="minor">
+      <a:schemeClr val="tx1"/>
+    </cs:fontRef>
+    <cs:spPr>
+      <a:noFill/>
+      <a:ln>
+        <a:noFill/>
+      </a:ln>
+    </cs:spPr>
+  </cs:wall>
+</cs:chartStyle>
+</file>
+
+<file path=ppt/charts/style8.xml><?xml version="1.0" encoding="utf-8"?>
+<cs:chartStyle xmlns:cs="http://schemas.microsoft.com/office/drawing/2012/chartStyle" xmlns:a="http://schemas.openxmlformats.org/drawingml/2006/main" id="344">
+  <cs:axisTitle>
+    <cs:lnRef idx="0"/>
+    <cs:fillRef idx="0"/>
+    <cs:effectRef idx="0"/>
+    <cs:fontRef idx="minor">
+      <a:schemeClr val="tx1">
+        <a:lumMod val="65000"/>
+        <a:lumOff val="35000"/>
+      </a:schemeClr>
+    </cs:fontRef>
+    <cs:defRPr sz="1197" kern="1200"/>
+  </cs:axisTitle>
+  <cs:categoryAxis>
+    <cs:lnRef idx="0"/>
+    <cs:fillRef idx="0"/>
+    <cs:effectRef idx="0"/>
+    <cs:fontRef idx="minor">
+      <a:schemeClr val="tx1">
+        <a:lumMod val="65000"/>
+        <a:lumOff val="35000"/>
+      </a:schemeClr>
+    </cs:fontRef>
+    <cs:spPr>
+      <a:ln w="12700" cap="flat" cmpd="sng" algn="ctr">
+        <a:solidFill>
+          <a:schemeClr val="tx1">
+            <a:lumMod val="15000"/>
+            <a:lumOff val="85000"/>
+          </a:schemeClr>
+        </a:solidFill>
+        <a:round/>
+      </a:ln>
+    </cs:spPr>
+    <cs:defRPr sz="1197" kern="1200"/>
+  </cs:categoryAxis>
+  <cs:chartArea mods="allowNoFillOverride allowNoLineOverride">
+    <cs:lnRef idx="0"/>
+    <cs:fillRef idx="0"/>
+    <cs:effectRef idx="0"/>
+    <cs:fontRef idx="minor">
+      <a:schemeClr val="tx2"/>
+    </cs:fontRef>
+    <cs:spPr>
+      <a:solidFill>
+        <a:schemeClr val="bg1"/>
+      </a:solidFill>
+      <a:ln w="9525" cap="flat" cmpd="sng" algn="ctr">
+        <a:solidFill>
+          <a:schemeClr val="tx1">
+            <a:lumMod val="15000"/>
+            <a:lumOff val="85000"/>
+          </a:schemeClr>
+        </a:solidFill>
+        <a:round/>
+      </a:ln>
+    </cs:spPr>
+    <cs:defRPr sz="1197" kern="1200"/>
+  </cs:chartArea>
+  <cs:dataLabel>
+    <cs:lnRef idx="0"/>
+    <cs:fillRef idx="0"/>
+    <cs:effectRef idx="0"/>
+    <cs:fontRef idx="minor">
+      <a:schemeClr val="tx1">
+        <a:lumMod val="75000"/>
+        <a:lumOff val="25000"/>
+      </a:schemeClr>
+    </cs:fontRef>
+    <cs:defRPr sz="1197" kern="1200"/>
+  </cs:dataLabel>
+  <cs:dataLabelCallout>
+    <cs:lnRef idx="0"/>
+    <cs:fillRef idx="0"/>
+    <cs:effectRef idx="0"/>
+    <cs:fontRef idx="minor">
+      <a:schemeClr val="dk1">
+        <a:lumMod val="65000"/>
+        <a:lumOff val="35000"/>
+      </a:schemeClr>
+    </cs:fontRef>
+    <cs:spPr>
+      <a:solidFill>
+        <a:schemeClr val="lt1"/>
+      </a:solidFill>
+      <a:ln>
+        <a:solidFill>
+          <a:schemeClr val="dk1">
+            <a:lumMod val="25000"/>
+            <a:lumOff val="75000"/>
+          </a:schemeClr>
+        </a:solidFill>
+      </a:ln>
+    </cs:spPr>
+    <cs:defRPr sz="1197" kern="1200"/>
+    <cs:bodyPr rot="0" spcFirstLastPara="1" vertOverflow="clip" horzOverflow="clip" vert="horz" wrap="square" lIns="36576" tIns="18288" rIns="36576" bIns="18288" anchor="ctr" anchorCtr="1">
+      <a:spAutoFit/>
+    </cs:bodyPr>
+  </cs:dataLabelCallout>
+  <cs:dataPoint>
+    <cs:lnRef idx="0"/>
+    <cs:fillRef idx="3">
+      <cs:styleClr val="auto"/>
+    </cs:fillRef>
+    <cs:effectRef idx="3"/>
+    <cs:fontRef idx="minor">
+      <a:schemeClr val="tx1"/>
+    </cs:fontRef>
+  </cs:dataPoint>
+  <cs:dataPoint3D>
+    <cs:lnRef idx="0"/>
+    <cs:fillRef idx="3">
+      <cs:styleClr val="auto"/>
+    </cs:fillRef>
+    <cs:effectRef idx="3"/>
+    <cs:fontRef idx="minor">
+      <a:schemeClr val="tx1"/>
+    </cs:fontRef>
+  </cs:dataPoint3D>
+  <cs:dataPointLine>
+    <cs:lnRef idx="0">
+      <cs:styleClr val="auto"/>
+    </cs:lnRef>
+    <cs:fillRef idx="3"/>
+    <cs:effectRef idx="3"/>
+    <cs:fontRef idx="minor">
+      <a:schemeClr val="tx1"/>
+    </cs:fontRef>
+    <cs:spPr>
+      <a:ln w="34925" cap="rnd">
+        <a:solidFill>
+          <a:schemeClr val="phClr"/>
+        </a:solidFill>
+        <a:round/>
+      </a:ln>
+    </cs:spPr>
+  </cs:dataPointLine>
+  <cs:dataPointMarker>
+    <cs:lnRef idx="0">
+      <cs:styleClr val="auto"/>
+    </cs:lnRef>
+    <cs:fillRef idx="3">
+      <cs:styleClr val="auto"/>
+    </cs:fillRef>
+    <cs:effectRef idx="3"/>
+    <cs:fontRef idx="minor">
+      <a:schemeClr val="tx1"/>
+    </cs:fontRef>
+    <cs:spPr>
+      <a:ln w="9525">
+        <a:solidFill>
+          <a:schemeClr val="phClr"/>
+        </a:solidFill>
+        <a:round/>
+      </a:ln>
+    </cs:spPr>
+  </cs:dataPointMarker>
+  <cs:dataPointMarkerLayout symbol="circle" size="6"/>
+  <cs:dataPointWireframe>
+    <cs:lnRef idx="0">
+      <cs:styleClr val="auto"/>
+    </cs:lnRef>
+    <cs:fillRef idx="3"/>
+    <cs:effectRef idx="3"/>
+    <cs:fontRef idx="minor">
+      <a:schemeClr val="tx1"/>
+    </cs:fontRef>
+    <cs:spPr>
+      <a:ln w="9525" cap="rnd">
+        <a:solidFill>
+          <a:schemeClr val="phClr"/>
+        </a:solidFill>
+        <a:round/>
+      </a:ln>
+    </cs:spPr>
+  </cs:dataPointWireframe>
+  <cs:dataTable>
+    <cs:lnRef idx="0"/>
+    <cs:fillRef idx="0"/>
+    <cs:effectRef idx="0"/>
+    <cs:fontRef idx="minor">
+      <a:schemeClr val="tx1">
+        <a:lumMod val="65000"/>
+        <a:lumOff val="35000"/>
+      </a:schemeClr>
+    </cs:fontRef>
+    <cs:spPr>
+      <a:noFill/>
+      <a:ln w="9525" cap="flat" cmpd="sng" algn="ctr">
+        <a:solidFill>
+          <a:schemeClr val="tx1">
+            <a:lumMod val="15000"/>
+            <a:lumOff val="85000"/>
+          </a:schemeClr>
+        </a:solidFill>
+        <a:round/>
+      </a:ln>
+    </cs:spPr>
+    <cs:defRPr sz="1197" kern="1200"/>
+  </cs:dataTable>
+  <cs:downBar>
+    <cs:lnRef idx="0"/>
+    <cs:fillRef idx="0"/>
+    <cs:effectRef idx="0"/>
+    <cs:fontRef idx="minor">
+      <a:schemeClr val="dk1"/>
+    </cs:fontRef>
+    <cs:spPr>
+      <a:solidFill>
+        <a:schemeClr val="dk1">
+          <a:lumMod val="65000"/>
+          <a:lumOff val="35000"/>
+        </a:schemeClr>
+      </a:solidFill>
+      <a:ln w="9525">
+        <a:solidFill>
+          <a:schemeClr val="tx1">
+            <a:lumMod val="65000"/>
+            <a:lumOff val="35000"/>
+          </a:schemeClr>
+        </a:solidFill>
+      </a:ln>
+    </cs:spPr>
+  </cs:downBar>
+  <cs:dropLine>
+    <cs:lnRef idx="0"/>
+    <cs:fillRef idx="0"/>
+    <cs:effectRef idx="0"/>
+    <cs:fontRef idx="minor">
+      <a:schemeClr val="tx1"/>
+    </cs:fontRef>
+    <cs:spPr>
+      <a:ln w="9525" cap="flat" cmpd="sng" algn="ctr">
+        <a:solidFill>
+          <a:schemeClr val="tx1">
+            <a:lumMod val="35000"/>
+            <a:lumOff val="65000"/>
+          </a:schemeClr>
+        </a:solidFill>
+        <a:round/>
+      </a:ln>
+    </cs:spPr>
+  </cs:dropLine>
+  <cs:errorBar>
+    <cs:lnRef idx="0"/>
+    <cs:fillRef idx="0"/>
+    <cs:effectRef idx="0"/>
+    <cs:fontRef idx="minor">
+      <a:schemeClr val="tx1"/>
+    </cs:fontRef>
+    <cs:spPr>
+      <a:ln w="9525" cap="flat" cmpd="sng" algn="ctr">
+        <a:solidFill>
+          <a:schemeClr val="tx1">
+            <a:lumMod val="65000"/>
+            <a:lumOff val="35000"/>
+          </a:schemeClr>
+        </a:solidFill>
+        <a:round/>
+      </a:ln>
+    </cs:spPr>
+  </cs:errorBar>
+  <cs:floor>
+    <cs:lnRef idx="0"/>
+    <cs:fillRef idx="0"/>
+    <cs:effectRef idx="0"/>
+    <cs:fontRef idx="minor">
+      <a:schemeClr val="lt1"/>
+    </cs:fontRef>
+  </cs:floor>
+  <cs:gridlineMajor>
+    <cs:lnRef idx="0"/>
+    <cs:fillRef idx="0"/>
+    <cs:effectRef idx="0"/>
+    <cs:fontRef idx="minor">
+      <a:schemeClr val="tx1"/>
+    </cs:fontRef>
+    <cs:spPr>
+      <a:ln w="9525" cap="flat" cmpd="sng" algn="ctr">
+        <a:solidFill>
+          <a:schemeClr val="tx1">
+            <a:lumMod val="15000"/>
+            <a:lumOff val="85000"/>
+          </a:schemeClr>
+        </a:solidFill>
+        <a:round/>
+      </a:ln>
+    </cs:spPr>
+  </cs:gridlineMajor>
+  <cs:gridlineMinor>
+    <cs:lnRef idx="0"/>
+    <cs:fillRef idx="0"/>
+    <cs:effectRef idx="0"/>
+    <cs:fontRef idx="minor">
+      <a:schemeClr val="tx1"/>
+    </cs:fontRef>
+    <cs:spPr>
+      <a:ln w="9525" cap="flat" cmpd="sng" algn="ctr">
+        <a:solidFill>
+          <a:schemeClr val="tx1">
+            <a:lumMod val="5000"/>
+            <a:lumOff val="95000"/>
+          </a:schemeClr>
+        </a:solidFill>
+        <a:round/>
+      </a:ln>
+    </cs:spPr>
+  </cs:gridlineMinor>
+  <cs:hiLoLine>
+    <cs:lnRef idx="0"/>
+    <cs:fillRef idx="0"/>
+    <cs:effectRef idx="0"/>
+    <cs:fontRef idx="minor">
+      <a:schemeClr val="tx1"/>
+    </cs:fontRef>
+    <cs:spPr>
+      <a:ln w="9525" cap="flat" cmpd="sng" algn="ctr">
+        <a:solidFill>
+          <a:schemeClr val="tx1">
+            <a:lumMod val="75000"/>
+            <a:lumOff val="25000"/>
+          </a:schemeClr>
+        </a:solidFill>
+        <a:round/>
+      </a:ln>
+    </cs:spPr>
+  </cs:hiLoLine>
+  <cs:leaderLine>
+    <cs:lnRef idx="0"/>
+    <cs:fillRef idx="0"/>
+    <cs:effectRef idx="0"/>
+    <cs:fontRef idx="minor">
+      <a:schemeClr val="tx1"/>
+    </cs:fontRef>
+    <cs:spPr>
+      <a:ln w="9525" cap="flat" cmpd="sng" algn="ctr">
+        <a:solidFill>
+          <a:schemeClr val="tx1">
+            <a:lumMod val="35000"/>
+            <a:lumOff val="65000"/>
+          </a:schemeClr>
+        </a:solidFill>
+        <a:round/>
+      </a:ln>
+    </cs:spPr>
+  </cs:leaderLine>
+  <cs:legend>
+    <cs:lnRef idx="0"/>
+    <cs:fillRef idx="0"/>
+    <cs:effectRef idx="0"/>
+    <cs:fontRef idx="minor">
+      <a:schemeClr val="tx1">
+        <a:lumMod val="65000"/>
+        <a:lumOff val="35000"/>
+      </a:schemeClr>
+    </cs:fontRef>
+    <cs:defRPr sz="1197" kern="1200"/>
+  </cs:legend>
+  <cs:plotArea>
+    <cs:lnRef idx="0"/>
+    <cs:fillRef idx="0"/>
+    <cs:effectRef idx="0"/>
+    <cs:fontRef idx="minor">
+      <a:schemeClr val="lt1"/>
+    </cs:fontRef>
+  </cs:plotArea>
+  <cs:plotArea3D>
+    <cs:lnRef idx="0"/>
+    <cs:fillRef idx="0"/>
+    <cs:effectRef idx="0"/>
+    <cs:fontRef idx="minor">
+      <a:schemeClr val="lt1"/>
+    </cs:fontRef>
+  </cs:plotArea3D>
+  <cs:seriesAxis>
+    <cs:lnRef idx="0"/>
+    <cs:fillRef idx="0"/>
+    <cs:effectRef idx="0"/>
+    <cs:fontRef idx="minor">
+      <a:schemeClr val="tx1">
+        <a:lumMod val="65000"/>
+        <a:lumOff val="35000"/>
+      </a:schemeClr>
+    </cs:fontRef>
+    <cs:spPr>
+      <a:ln w="12700" cap="flat" cmpd="sng" algn="ctr">
+        <a:solidFill>
+          <a:schemeClr val="tx1">
+            <a:lumMod val="15000"/>
+            <a:lumOff val="85000"/>
+          </a:schemeClr>
+        </a:solidFill>
+        <a:round/>
+      </a:ln>
+    </cs:spPr>
+    <cs:defRPr sz="1197" kern="1200"/>
+  </cs:seriesAxis>
+  <cs:seriesLine>
+    <cs:lnRef idx="0"/>
+    <cs:fillRef idx="0"/>
+    <cs:effectRef idx="0"/>
+    <cs:fontRef idx="minor">
+      <a:schemeClr val="tx1"/>
+    </cs:fontRef>
+    <cs:spPr>
+      <a:ln w="9525" cap="flat" cmpd="sng" algn="ctr">
+        <a:solidFill>
+          <a:schemeClr val="tx1">
+            <a:lumMod val="35000"/>
+            <a:lumOff val="65000"/>
+          </a:schemeClr>
+        </a:solidFill>
+        <a:round/>
+      </a:ln>
+    </cs:spPr>
+  </cs:seriesLine>
+  <cs:title>
+    <cs:lnRef idx="0"/>
+    <cs:fillRef idx="0"/>
+    <cs:effectRef idx="0"/>
+    <cs:fontRef idx="minor">
+      <a:schemeClr val="tx1">
+        <a:lumMod val="65000"/>
+        <a:lumOff val="35000"/>
+      </a:schemeClr>
+    </cs:fontRef>
+    <cs:defRPr sz="2128" b="1" kern="1200" baseline="0"/>
+  </cs:title>
+  <cs:trendline>
+    <cs:lnRef idx="0">
+      <cs:styleClr val="auto"/>
+    </cs:lnRef>
+    <cs:fillRef idx="0"/>
+    <cs:effectRef idx="0"/>
+    <cs:fontRef idx="minor">
+      <a:schemeClr val="lt1"/>
+    </cs:fontRef>
+    <cs:spPr>
+      <a:ln w="19050" cap="rnd">
+        <a:solidFill>
+          <a:schemeClr val="phClr"/>
+        </a:solidFill>
+      </a:ln>
+    </cs:spPr>
+  </cs:trendline>
+  <cs:trendlineLabel>
+    <cs:lnRef idx="0"/>
+    <cs:fillRef idx="0"/>
+    <cs:effectRef idx="0"/>
+    <cs:fontRef idx="minor">
+      <a:schemeClr val="tx1">
+        <a:lumMod val="65000"/>
+        <a:lumOff val="35000"/>
+      </a:schemeClr>
+    </cs:fontRef>
+    <cs:defRPr sz="1197" kern="1200"/>
+  </cs:trendlineLabel>
+  <cs:upBar>
+    <cs:lnRef idx="0"/>
+    <cs:fillRef idx="0"/>
+    <cs:effectRef idx="0"/>
+    <cs:fontRef idx="minor">
+      <a:schemeClr val="dk1"/>
+    </cs:fontRef>
+    <cs:spPr>
+      <a:solidFill>
+        <a:schemeClr val="lt1"/>
+      </a:solidFill>
+      <a:ln w="9525">
+        <a:solidFill>
+          <a:schemeClr val="tx1">
+            <a:lumMod val="15000"/>
+            <a:lumOff val="85000"/>
+          </a:schemeClr>
+        </a:solidFill>
+      </a:ln>
+    </cs:spPr>
+  </cs:upBar>
+  <cs:valueAxis>
+    <cs:lnRef idx="0"/>
+    <cs:fillRef idx="0"/>
+    <cs:effectRef idx="0"/>
+    <cs:fontRef idx="minor">
+      <a:schemeClr val="tx1">
+        <a:lumMod val="65000"/>
+        <a:lumOff val="35000"/>
+      </a:schemeClr>
+    </cs:fontRef>
+    <cs:defRPr sz="1197" kern="1200"/>
+  </cs:valueAxis>
+  <cs:wall>
+    <cs:lnRef idx="0"/>
+    <cs:fillRef idx="0"/>
+    <cs:effectRef idx="0"/>
+    <cs:fontRef idx="minor">
+      <a:schemeClr val="lt1"/>
+    </cs:fontRef>
+  </cs:wall>
+</cs:chartStyle>
+</file>
+
 <file path=ppt/notesMasters/notesMaster1.xml><?xml version="1.0" encoding="utf-8"?>
 <p:notesMaster xmlns:a="http://schemas.openxmlformats.org/drawingml/2006/main" xmlns:r="http://schemas.openxmlformats.org/officeDocument/2006/relationships" xmlns:p="http://schemas.openxmlformats.org/presentationml/2006/main">
   <p:cSld>
@@ -6225,7 +8946,7 @@
           <a:p>
             <a:fld id="{BE7CF963-E58D-FC4D-BA9E-60A980752DC6}" type="datetimeFigureOut">
               <a:rPr lang="en-US" smtClean="0"/>
-              <a:t>3/28/2017</a:t>
+              <a:t>3/30/2017</a:t>
             </a:fld>
             <a:endParaRPr lang="en-US"/>
           </a:p>
@@ -6714,7 +9435,7 @@
           <a:p>
             <a:fld id="{B590C078-9131-4E49-8A0D-400FEE8377B5}" type="datetimeFigureOut">
               <a:rPr lang="en-US" smtClean="0"/>
-              <a:t>3/28/2017</a:t>
+              <a:t>3/30/2017</a:t>
             </a:fld>
             <a:endParaRPr lang="en-US"/>
           </a:p>
@@ -10299,7 +13020,7 @@
           <a:p>
             <a:fld id="{B590C078-9131-4E49-8A0D-400FEE8377B5}" type="datetimeFigureOut">
               <a:rPr lang="en-US" smtClean="0"/>
-              <a:t>3/28/2017</a:t>
+              <a:t>3/30/2017</a:t>
             </a:fld>
             <a:endParaRPr lang="en-US"/>
           </a:p>
@@ -14377,7 +17098,7 @@
           <a:p>
             <a:fld id="{B590C078-9131-4E49-8A0D-400FEE8377B5}" type="datetimeFigureOut">
               <a:rPr lang="en-US" smtClean="0"/>
-              <a:t>3/28/2017</a:t>
+              <a:t>3/30/2017</a:t>
             </a:fld>
             <a:endParaRPr lang="en-US"/>
           </a:p>
@@ -18202,7 +20923,7 @@
           <a:p>
             <a:fld id="{B590C078-9131-4E49-8A0D-400FEE8377B5}" type="datetimeFigureOut">
               <a:rPr lang="en-US" smtClean="0"/>
-              <a:t>3/28/2017</a:t>
+              <a:t>3/30/2017</a:t>
             </a:fld>
             <a:endParaRPr lang="en-US"/>
           </a:p>
@@ -18830,8 +21551,8 @@
         </p:nvSpPr>
         <p:spPr>
           <a:xfrm>
-            <a:off x="642730" y="1333500"/>
-            <a:ext cx="10939670" cy="4351338"/>
+            <a:off x="248282" y="1333500"/>
+            <a:ext cx="3157161" cy="4351338"/>
           </a:xfrm>
         </p:spPr>
         <p:txBody>
@@ -18840,15 +21561,16 @@
           </a:bodyPr>
           <a:lstStyle/>
           <a:p>
-            <a:pPr marL="0" indent="0">
+            <a:pPr marL="0" indent="0" algn="r">
               <a:buNone/>
             </a:pPr>
             <a:r>
               <a:rPr lang="en-US" dirty="0"/>
-              <a:t>AXIS					VALUES</a:t>
-            </a:r>
-          </a:p>
-          <a:p>
+              <a:t>AXIS</a:t>
+            </a:r>
+          </a:p>
+          <a:p>
+            <a:pPr algn="r"/>
             <a:r>
               <a:rPr lang="fr-FR" dirty="0">
                 <a:solidFill>
@@ -18861,6 +21583,7 @@
             </a:r>
           </a:p>
           <a:p>
+            <a:pPr algn="r"/>
             <a:r>
               <a:rPr lang="fr-FR" dirty="0">
                 <a:solidFill>
@@ -18871,6 +21594,7 @@
             </a:r>
           </a:p>
           <a:p>
+            <a:pPr algn="r"/>
             <a:endParaRPr lang="fr-FR" dirty="0">
               <a:solidFill>
                 <a:schemeClr val="accent3"/>
@@ -18878,6 +21602,7 @@
             </a:endParaRPr>
           </a:p>
           <a:p>
+            <a:pPr algn="r"/>
             <a:endParaRPr lang="fr-FR" dirty="0">
               <a:solidFill>
                 <a:schemeClr val="accent3"/>
@@ -18885,6 +21610,7 @@
             </a:endParaRPr>
           </a:p>
           <a:p>
+            <a:pPr algn="r"/>
             <a:r>
               <a:rPr lang="fr-FR" dirty="0">
                 <a:solidFill>
@@ -18895,6 +21621,7 @@
             </a:r>
           </a:p>
           <a:p>
+            <a:pPr algn="r"/>
             <a:r>
               <a:rPr lang="fr-FR" dirty="0">
                 <a:solidFill>
@@ -18905,23 +21632,25 @@
             </a:r>
           </a:p>
           <a:p>
+            <a:pPr algn="r"/>
             <a:r>
               <a:rPr lang="fr-FR" dirty="0">
                 <a:solidFill>
                   <a:srgbClr val="00B0F0"/>
                 </a:solidFill>
               </a:rPr>
-              <a:t>VIOLATIONS</a:t>
-            </a:r>
-          </a:p>
-          <a:p>
+              <a:t>VIOLATIONS *</a:t>
+            </a:r>
+          </a:p>
+          <a:p>
+            <a:pPr algn="r"/>
             <a:r>
               <a:rPr lang="fr-FR" dirty="0">
                 <a:solidFill>
                   <a:schemeClr val="accent1"/>
                 </a:solidFill>
               </a:rPr>
-              <a:t>CRITICAL VIOLATIONS</a:t>
+              <a:t>CRITICAL VIOLATIONS *</a:t>
             </a:r>
           </a:p>
         </p:txBody>
@@ -18964,7 +21693,7 @@
         </p:nvSpPr>
         <p:spPr>
           <a:xfrm>
-            <a:off x="3501661" y="1767155"/>
+            <a:off x="3555448" y="1767155"/>
             <a:ext cx="998420" cy="322080"/>
           </a:xfrm>
           <a:prstGeom prst="roundRect">
@@ -19016,7 +21745,7 @@
         </p:nvSpPr>
         <p:spPr>
           <a:xfrm>
-            <a:off x="4564543" y="1767155"/>
+            <a:off x="4618330" y="1767155"/>
             <a:ext cx="1102877" cy="322080"/>
           </a:xfrm>
           <a:prstGeom prst="roundRect">
@@ -19068,7 +21797,7 @@
         </p:nvSpPr>
         <p:spPr>
           <a:xfrm>
-            <a:off x="5731882" y="1767155"/>
+            <a:off x="5785669" y="1767155"/>
             <a:ext cx="719193" cy="322080"/>
           </a:xfrm>
           <a:prstGeom prst="roundRect">
@@ -19120,7 +21849,7 @@
         </p:nvSpPr>
         <p:spPr>
           <a:xfrm>
-            <a:off x="6515537" y="1767155"/>
+            <a:off x="6569324" y="1767155"/>
             <a:ext cx="1510302" cy="322080"/>
           </a:xfrm>
           <a:prstGeom prst="roundRect">
@@ -19172,7 +21901,7 @@
         </p:nvSpPr>
         <p:spPr>
           <a:xfrm>
-            <a:off x="8090301" y="1767155"/>
+            <a:off x="8144088" y="1767155"/>
             <a:ext cx="539991" cy="322080"/>
           </a:xfrm>
           <a:prstGeom prst="roundRect">
@@ -19224,7 +21953,7 @@
         </p:nvSpPr>
         <p:spPr>
           <a:xfrm>
-            <a:off x="3517425" y="2203333"/>
+            <a:off x="3571212" y="2203333"/>
             <a:ext cx="560589" cy="322080"/>
           </a:xfrm>
           <a:prstGeom prst="roundRect">
@@ -19274,7 +22003,7 @@
         </p:nvSpPr>
         <p:spPr>
           <a:xfrm>
-            <a:off x="4145498" y="2203333"/>
+            <a:off x="4199285" y="2203333"/>
             <a:ext cx="1540708" cy="322080"/>
           </a:xfrm>
           <a:prstGeom prst="roundRect">
@@ -19324,7 +22053,7 @@
         </p:nvSpPr>
         <p:spPr>
           <a:xfrm>
-            <a:off x="5753690" y="2203333"/>
+            <a:off x="5807477" y="2203333"/>
             <a:ext cx="1790858" cy="322080"/>
           </a:xfrm>
           <a:prstGeom prst="roundRect">
@@ -19374,7 +22103,7 @@
         </p:nvSpPr>
         <p:spPr>
           <a:xfrm>
-            <a:off x="7612032" y="2203333"/>
+            <a:off x="7665819" y="2203333"/>
             <a:ext cx="1887485" cy="322080"/>
           </a:xfrm>
           <a:prstGeom prst="roundRect">
@@ -19424,7 +22153,7 @@
         </p:nvSpPr>
         <p:spPr>
           <a:xfrm>
-            <a:off x="9567001" y="2203333"/>
+            <a:off x="9620788" y="2203333"/>
             <a:ext cx="1500390" cy="322080"/>
           </a:xfrm>
           <a:prstGeom prst="roundRect">
@@ -19474,7 +22203,7 @@
         </p:nvSpPr>
         <p:spPr>
           <a:xfrm>
-            <a:off x="3517425" y="2607980"/>
+            <a:off x="3571212" y="2607980"/>
             <a:ext cx="1769278" cy="322080"/>
           </a:xfrm>
           <a:prstGeom prst="roundRect">
@@ -19524,7 +22253,7 @@
         </p:nvSpPr>
         <p:spPr>
           <a:xfrm>
-            <a:off x="5348048" y="2607980"/>
+            <a:off x="5401835" y="2607980"/>
             <a:ext cx="1913713" cy="322080"/>
           </a:xfrm>
           <a:prstGeom prst="roundRect">
@@ -19574,7 +22303,7 @@
         </p:nvSpPr>
         <p:spPr>
           <a:xfrm>
-            <a:off x="7323106" y="2607980"/>
+            <a:off x="7376893" y="2607980"/>
             <a:ext cx="1608804" cy="322080"/>
           </a:xfrm>
           <a:prstGeom prst="roundRect">
@@ -19624,7 +22353,7 @@
         </p:nvSpPr>
         <p:spPr>
           <a:xfrm>
-            <a:off x="8993255" y="2607980"/>
+            <a:off x="9047042" y="2607980"/>
             <a:ext cx="1064968" cy="322080"/>
           </a:xfrm>
           <a:prstGeom prst="roundRect">
@@ -19674,7 +22403,7 @@
         </p:nvSpPr>
         <p:spPr>
           <a:xfrm>
-            <a:off x="10119567" y="2607980"/>
+            <a:off x="10173354" y="2607980"/>
             <a:ext cx="1813035" cy="322080"/>
           </a:xfrm>
           <a:prstGeom prst="roundRect">
@@ -19724,7 +22453,7 @@
         </p:nvSpPr>
         <p:spPr>
           <a:xfrm>
-            <a:off x="3517425" y="3020811"/>
+            <a:off x="3571212" y="3020811"/>
             <a:ext cx="1064968" cy="322080"/>
           </a:xfrm>
           <a:prstGeom prst="roundRect">
@@ -19774,7 +22503,7 @@
         </p:nvSpPr>
         <p:spPr>
           <a:xfrm>
-            <a:off x="3520447" y="3507907"/>
+            <a:off x="3574234" y="3507907"/>
             <a:ext cx="998420" cy="322080"/>
           </a:xfrm>
           <a:prstGeom prst="roundRect">
@@ -19824,7 +22553,7 @@
         </p:nvSpPr>
         <p:spPr>
           <a:xfrm>
-            <a:off x="4583329" y="3507907"/>
+            <a:off x="4637116" y="3507907"/>
             <a:ext cx="524699" cy="322080"/>
           </a:xfrm>
           <a:prstGeom prst="roundRect">
@@ -19874,7 +22603,7 @@
         </p:nvSpPr>
         <p:spPr>
           <a:xfrm>
-            <a:off x="3525705" y="3912554"/>
+            <a:off x="3579492" y="3912554"/>
             <a:ext cx="998420" cy="322080"/>
           </a:xfrm>
           <a:prstGeom prst="roundRect">
@@ -19924,7 +22653,7 @@
         </p:nvSpPr>
         <p:spPr>
           <a:xfrm>
-            <a:off x="4588587" y="3912554"/>
+            <a:off x="4642374" y="3912554"/>
             <a:ext cx="524699" cy="322080"/>
           </a:xfrm>
           <a:prstGeom prst="roundRect">
@@ -19974,7 +22703,7 @@
         </p:nvSpPr>
         <p:spPr>
           <a:xfrm>
-            <a:off x="3527358" y="4309398"/>
+            <a:off x="3581145" y="4309398"/>
             <a:ext cx="998420" cy="322080"/>
           </a:xfrm>
           <a:prstGeom prst="roundRect">
@@ -20024,7 +22753,7 @@
         </p:nvSpPr>
         <p:spPr>
           <a:xfrm>
-            <a:off x="4590240" y="4309398"/>
+            <a:off x="4644027" y="4309398"/>
             <a:ext cx="757808" cy="322080"/>
           </a:xfrm>
           <a:prstGeom prst="roundRect">
@@ -20074,7 +22803,7 @@
         </p:nvSpPr>
         <p:spPr>
           <a:xfrm>
-            <a:off x="5414391" y="4309398"/>
+            <a:off x="5468178" y="4309398"/>
             <a:ext cx="1036683" cy="322080"/>
           </a:xfrm>
           <a:prstGeom prst="roundRect">
@@ -20124,7 +22853,7 @@
         </p:nvSpPr>
         <p:spPr>
           <a:xfrm>
-            <a:off x="6515537" y="4300758"/>
+            <a:off x="6569324" y="4300758"/>
             <a:ext cx="484353" cy="322080"/>
           </a:xfrm>
           <a:prstGeom prst="roundRect">
@@ -20174,7 +22903,7 @@
         </p:nvSpPr>
         <p:spPr>
           <a:xfrm>
-            <a:off x="3553635" y="4735063"/>
+            <a:off x="3607422" y="4735063"/>
             <a:ext cx="998420" cy="322080"/>
           </a:xfrm>
           <a:prstGeom prst="roundRect">
@@ -20224,7 +22953,7 @@
         </p:nvSpPr>
         <p:spPr>
           <a:xfrm>
-            <a:off x="4616517" y="4735063"/>
+            <a:off x="4670304" y="4735063"/>
             <a:ext cx="757808" cy="322080"/>
           </a:xfrm>
           <a:prstGeom prst="roundRect">
@@ -20274,7 +23003,7 @@
         </p:nvSpPr>
         <p:spPr>
           <a:xfrm>
-            <a:off x="5440668" y="4735063"/>
+            <a:off x="5494455" y="4735063"/>
             <a:ext cx="1036683" cy="322080"/>
           </a:xfrm>
           <a:prstGeom prst="roundRect">
@@ -20324,7 +23053,7 @@
         </p:nvSpPr>
         <p:spPr>
           <a:xfrm>
-            <a:off x="6541814" y="4726423"/>
+            <a:off x="6595601" y="4726423"/>
             <a:ext cx="484353" cy="322080"/>
           </a:xfrm>
           <a:prstGeom prst="roundRect">
@@ -20363,6 +23092,260 @@
               <a:t>ALL</a:t>
             </a:r>
             <a:endParaRPr lang="en-US" dirty="0"/>
+          </a:p>
+        </p:txBody>
+      </p:sp>
+      <p:sp>
+        <p:nvSpPr>
+          <p:cNvPr id="46" name="TextBox 45"/>
+          <p:cNvSpPr txBox="1"/>
+          <p:nvPr/>
+        </p:nvSpPr>
+        <p:spPr>
+          <a:xfrm>
+            <a:off x="726141" y="6257364"/>
+            <a:ext cx="10703859" cy="367553"/>
+          </a:xfrm>
+          <a:prstGeom prst="rect">
+            <a:avLst/>
+          </a:prstGeom>
+        </p:spPr>
+        <p:txBody>
+          <a:bodyPr vert="horz" wrap="square" lIns="91440" tIns="45720" rIns="91440" bIns="45720" rtlCol="0" anchor="t">
+            <a:noAutofit/>
+          </a:bodyPr>
+          <a:lstStyle/>
+          <a:p>
+            <a:r>
+              <a:rPr lang="en-US" sz="1200" dirty="0">
+                <a:solidFill>
+                  <a:schemeClr val="tx1">
+                    <a:lumMod val="50000"/>
+                    <a:lumOff val="50000"/>
+                  </a:schemeClr>
+                </a:solidFill>
+              </a:rPr>
+              <a:t>* To get results on violations or critical violations on a specific metrics, add the axis “METRICS=M” where M is a metric id from quality model (</a:t>
+            </a:r>
+            <a:r>
+              <a:rPr lang="en-US" sz="1200" dirty="0" err="1">
+                <a:solidFill>
+                  <a:schemeClr val="tx1">
+                    <a:lumMod val="50000"/>
+                    <a:lumOff val="50000"/>
+                  </a:schemeClr>
+                </a:solidFill>
+              </a:rPr>
+              <a:t>eg</a:t>
+            </a:r>
+            <a:r>
+              <a:rPr lang="en-US" sz="1200" dirty="0">
+                <a:solidFill>
+                  <a:schemeClr val="tx1">
+                    <a:lumMod val="50000"/>
+                    <a:lumOff val="50000"/>
+                  </a:schemeClr>
+                </a:solidFill>
+              </a:rPr>
+              <a:t> slide 6)</a:t>
+            </a:r>
+          </a:p>
+        </p:txBody>
+      </p:sp>
+      <p:sp>
+        <p:nvSpPr>
+          <p:cNvPr id="47" name="Text Placeholder 7"/>
+          <p:cNvSpPr txBox="1">
+            <a:spLocks/>
+          </p:cNvSpPr>
+          <p:nvPr/>
+        </p:nvSpPr>
+        <p:spPr>
+          <a:xfrm>
+            <a:off x="3488443" y="1333500"/>
+            <a:ext cx="2790752" cy="4351338"/>
+          </a:xfrm>
+          <a:prstGeom prst="rect">
+            <a:avLst/>
+          </a:prstGeom>
+        </p:spPr>
+        <p:txBody>
+          <a:bodyPr vert="horz" lIns="91440" tIns="45720" rIns="91440" bIns="45720" rtlCol="0">
+            <a:normAutofit/>
+          </a:bodyPr>
+          <a:lstStyle>
+            <a:lvl1pPr marL="285750" indent="-285750" algn="l" defTabSz="457200" rtl="0" eaLnBrk="1" latinLnBrk="0" hangingPunct="1">
+              <a:lnSpc>
+                <a:spcPct val="100000"/>
+              </a:lnSpc>
+              <a:spcBef>
+                <a:spcPts val="1200"/>
+              </a:spcBef>
+              <a:buFont typeface="Arial" panose="020B0604020202020204" pitchFamily="34" charset="0"/>
+              <a:buChar char="•"/>
+              <a:defRPr sz="1800" kern="1200">
+                <a:solidFill>
+                  <a:schemeClr val="tx1"/>
+                </a:solidFill>
+                <a:latin typeface="+mn-lt"/>
+                <a:ea typeface="+mn-ea"/>
+                <a:cs typeface="+mn-cs"/>
+              </a:defRPr>
+            </a:lvl1pPr>
+            <a:lvl2pPr marL="685800" indent="-228600" algn="l" defTabSz="457200" rtl="0" eaLnBrk="1" latinLnBrk="0" hangingPunct="1">
+              <a:lnSpc>
+                <a:spcPct val="100000"/>
+              </a:lnSpc>
+              <a:spcBef>
+                <a:spcPts val="600"/>
+              </a:spcBef>
+              <a:buFont typeface="Arial" panose="020B0604020202020204" pitchFamily="34" charset="0"/>
+              <a:buChar char="−"/>
+              <a:defRPr sz="1800" kern="1200">
+                <a:solidFill>
+                  <a:schemeClr val="tx1"/>
+                </a:solidFill>
+                <a:latin typeface="+mn-lt"/>
+                <a:ea typeface="+mn-ea"/>
+                <a:cs typeface="+mn-cs"/>
+              </a:defRPr>
+            </a:lvl2pPr>
+            <a:lvl3pPr marL="1143000" indent="-228600" algn="l" defTabSz="457200" rtl="0" eaLnBrk="1" latinLnBrk="0" hangingPunct="1">
+              <a:lnSpc>
+                <a:spcPct val="100000"/>
+              </a:lnSpc>
+              <a:spcBef>
+                <a:spcPts val="600"/>
+              </a:spcBef>
+              <a:buFont typeface="Courier New" panose="02070309020205020404" pitchFamily="49" charset="0"/>
+              <a:buChar char="o"/>
+              <a:defRPr sz="1800" kern="1200">
+                <a:solidFill>
+                  <a:schemeClr val="tx1"/>
+                </a:solidFill>
+                <a:latin typeface="+mn-lt"/>
+                <a:ea typeface="+mn-ea"/>
+                <a:cs typeface="+mn-cs"/>
+              </a:defRPr>
+            </a:lvl3pPr>
+            <a:lvl4pPr marL="1600200" indent="-228600" algn="l" defTabSz="457200" rtl="0" eaLnBrk="1" latinLnBrk="0" hangingPunct="1">
+              <a:lnSpc>
+                <a:spcPct val="100000"/>
+              </a:lnSpc>
+              <a:spcBef>
+                <a:spcPts val="600"/>
+              </a:spcBef>
+              <a:buFont typeface="Wingdings" panose="05000000000000000000" pitchFamily="2" charset="2"/>
+              <a:buChar char="§"/>
+              <a:defRPr sz="1800" kern="1200">
+                <a:solidFill>
+                  <a:schemeClr val="tx1"/>
+                </a:solidFill>
+                <a:latin typeface="+mn-lt"/>
+                <a:ea typeface="+mn-ea"/>
+                <a:cs typeface="+mn-cs"/>
+              </a:defRPr>
+            </a:lvl4pPr>
+            <a:lvl5pPr marL="2057400" indent="-228600" algn="l" defTabSz="457200" rtl="0" eaLnBrk="1" latinLnBrk="0" hangingPunct="1">
+              <a:lnSpc>
+                <a:spcPct val="100000"/>
+              </a:lnSpc>
+              <a:spcBef>
+                <a:spcPts val="600"/>
+              </a:spcBef>
+              <a:buFont typeface="Wingdings" charset="2"/>
+              <a:buChar char="§"/>
+              <a:defRPr sz="1800" kern="1200">
+                <a:solidFill>
+                  <a:schemeClr val="tx1"/>
+                </a:solidFill>
+                <a:latin typeface="+mn-lt"/>
+                <a:ea typeface="+mn-ea"/>
+                <a:cs typeface="+mn-cs"/>
+              </a:defRPr>
+            </a:lvl5pPr>
+            <a:lvl6pPr marL="2514600" indent="-228600" algn="l" defTabSz="914400" rtl="0" eaLnBrk="1" latinLnBrk="0" hangingPunct="1">
+              <a:lnSpc>
+                <a:spcPct val="90000"/>
+              </a:lnSpc>
+              <a:spcBef>
+                <a:spcPts val="500"/>
+              </a:spcBef>
+              <a:buFont typeface="Arial"/>
+              <a:buChar char="•"/>
+              <a:defRPr sz="1800" kern="1200">
+                <a:solidFill>
+                  <a:schemeClr val="tx1"/>
+                </a:solidFill>
+                <a:latin typeface="+mn-lt"/>
+                <a:ea typeface="+mn-ea"/>
+                <a:cs typeface="+mn-cs"/>
+              </a:defRPr>
+            </a:lvl6pPr>
+            <a:lvl7pPr marL="2971800" indent="-228600" algn="l" defTabSz="914400" rtl="0" eaLnBrk="1" latinLnBrk="0" hangingPunct="1">
+              <a:lnSpc>
+                <a:spcPct val="90000"/>
+              </a:lnSpc>
+              <a:spcBef>
+                <a:spcPts val="500"/>
+              </a:spcBef>
+              <a:buFont typeface="Arial"/>
+              <a:buChar char="•"/>
+              <a:defRPr sz="1800" kern="1200">
+                <a:solidFill>
+                  <a:schemeClr val="tx1"/>
+                </a:solidFill>
+                <a:latin typeface="+mn-lt"/>
+                <a:ea typeface="+mn-ea"/>
+                <a:cs typeface="+mn-cs"/>
+              </a:defRPr>
+            </a:lvl7pPr>
+            <a:lvl8pPr marL="3429000" indent="-228600" algn="l" defTabSz="914400" rtl="0" eaLnBrk="1" latinLnBrk="0" hangingPunct="1">
+              <a:lnSpc>
+                <a:spcPct val="90000"/>
+              </a:lnSpc>
+              <a:spcBef>
+                <a:spcPts val="500"/>
+              </a:spcBef>
+              <a:buFont typeface="Arial"/>
+              <a:buChar char="•"/>
+              <a:defRPr sz="1800" kern="1200">
+                <a:solidFill>
+                  <a:schemeClr val="tx1"/>
+                </a:solidFill>
+                <a:latin typeface="+mn-lt"/>
+                <a:ea typeface="+mn-ea"/>
+                <a:cs typeface="+mn-cs"/>
+              </a:defRPr>
+            </a:lvl8pPr>
+            <a:lvl9pPr marL="3886200" indent="-228600" algn="l" defTabSz="914400" rtl="0" eaLnBrk="1" latinLnBrk="0" hangingPunct="1">
+              <a:lnSpc>
+                <a:spcPct val="90000"/>
+              </a:lnSpc>
+              <a:spcBef>
+                <a:spcPts val="500"/>
+              </a:spcBef>
+              <a:buFont typeface="Arial"/>
+              <a:buChar char="•"/>
+              <a:defRPr sz="1800" kern="1200">
+                <a:solidFill>
+                  <a:schemeClr val="tx1"/>
+                </a:solidFill>
+                <a:latin typeface="+mn-lt"/>
+                <a:ea typeface="+mn-ea"/>
+                <a:cs typeface="+mn-cs"/>
+              </a:defRPr>
+            </a:lvl9pPr>
+          </a:lstStyle>
+          <a:p>
+            <a:pPr marL="0" indent="0">
+              <a:buFont typeface="Arial" panose="020B0604020202020204" pitchFamily="34" charset="0"/>
+              <a:buNone/>
+            </a:pPr>
+            <a:r>
+              <a:rPr lang="en-US" dirty="0"/>
+              <a:t>VALUES</a:t>
+            </a:r>
           </a:p>
         </p:txBody>
       </p:sp>
@@ -21339,7 +24322,7 @@
           <p:nvPr>
             <p:extLst>
               <p:ext uri="{D42A27DB-BD31-4B8C-83A1-F6EECF244321}">
-                <p14:modId xmlns:p14="http://schemas.microsoft.com/office/powerpoint/2010/main" val="1246914078"/>
+                <p14:modId xmlns:p14="http://schemas.microsoft.com/office/powerpoint/2010/main" val="220951250"/>
               </p:ext>
             </p:extLst>
           </p:nvPr>
@@ -21440,7 +24423,7 @@
           <p:nvPr>
             <p:extLst>
               <p:ext uri="{D42A27DB-BD31-4B8C-83A1-F6EECF244321}">
-                <p14:modId xmlns:p14="http://schemas.microsoft.com/office/powerpoint/2010/main" val="751507710"/>
+                <p14:modId xmlns:p14="http://schemas.microsoft.com/office/powerpoint/2010/main" val="749429139"/>
               </p:ext>
             </p:extLst>
           </p:nvPr>
@@ -21534,28 +24517,6 @@
           </a:p>
         </p:txBody>
       </p:sp>
-      <p:graphicFrame>
-        <p:nvGraphicFramePr>
-          <p:cNvPr id="5" name="Chart 4" descr="GRAPH;GENERIC_GRAPH;COL1=METRICS,ROW1=CRITICAL_VIOLATIONS,METRICS=60017,CRITICAL_VIOLATIONS=ADDED|REMOVED"/>
-          <p:cNvGraphicFramePr/>
-          <p:nvPr>
-            <p:extLst>
-              <p:ext uri="{D42A27DB-BD31-4B8C-83A1-F6EECF244321}">
-                <p14:modId xmlns:p14="http://schemas.microsoft.com/office/powerpoint/2010/main" val="602402099"/>
-              </p:ext>
-            </p:extLst>
-          </p:nvPr>
-        </p:nvGraphicFramePr>
-        <p:xfrm>
-          <a:off x="1924424" y="1986455"/>
-          <a:ext cx="7440293" cy="4680796"/>
-        </p:xfrm>
-        <a:graphic>
-          <a:graphicData uri="http://schemas.openxmlformats.org/drawingml/2006/chart">
-            <c:chart xmlns:c="http://schemas.openxmlformats.org/drawingml/2006/chart" xmlns:r="http://schemas.openxmlformats.org/officeDocument/2006/relationships" r:id="rId2"/>
-          </a:graphicData>
-        </a:graphic>
-      </p:graphicFrame>
       <p:sp>
         <p:nvSpPr>
           <p:cNvPr id="4" name="Text Placeholder 2"/>
@@ -21568,21 +24529,51 @@
         </p:nvSpPr>
         <p:spPr>
           <a:xfrm>
-            <a:off x="642730" y="1123294"/>
-            <a:ext cx="10939670" cy="633788"/>
+            <a:off x="642730" y="980148"/>
+            <a:ext cx="10939670" cy="901204"/>
           </a:xfrm>
         </p:spPr>
         <p:txBody>
-          <a:bodyPr/>
+          <a:bodyPr>
+            <a:normAutofit/>
+          </a:bodyPr>
           <a:lstStyle/>
           <a:p>
             <a:r>
-              <a:rPr lang="en-US" sz="1400" dirty="0"/>
-              <a:t>GRAPH;GENERIC_GRAPH;COL1=METRICS,ROW1=CRITICAL_VIOLATIONS,METRICS=60017,CRITICAL_VIOLATIONS=ADDED|REMOVED</a:t>
+              <a:rPr lang="en-US" sz="1200" dirty="0"/>
+              <a:t>GRAPH;GENERIC_GRAPH;COL1=CRITICAL_VIOLATIONS,ROW1=MODULES,MODULES=ALL,CRITICAL_VIOLATIONS=ALL,METRICS=60013</a:t>
+            </a:r>
+          </a:p>
+          <a:p>
+            <a:r>
+              <a:rPr lang="en-US" sz="1200" dirty="0"/>
+              <a:t>In case of Critical violation or violations, a parameter can be added to define a unique metric id.</a:t>
             </a:r>
           </a:p>
         </p:txBody>
       </p:sp>
+      <p:graphicFrame>
+        <p:nvGraphicFramePr>
+          <p:cNvPr id="6" name="Chart 5" descr="GRAPH;GENERIC_GRAPH;COL1=CRITICAL_VIOLATIONS,ROW1=MODULES,MODULES=ALL,CRITICAL_VIOLATIONS=ALL,METRICS=60013;"/>
+          <p:cNvGraphicFramePr/>
+          <p:nvPr>
+            <p:extLst>
+              <p:ext uri="{D42A27DB-BD31-4B8C-83A1-F6EECF244321}">
+                <p14:modId xmlns:p14="http://schemas.microsoft.com/office/powerpoint/2010/main" val="611062237"/>
+              </p:ext>
+            </p:extLst>
+          </p:nvPr>
+        </p:nvGraphicFramePr>
+        <p:xfrm>
+          <a:off x="3030070" y="2207640"/>
+          <a:ext cx="5486399" cy="3081535"/>
+        </p:xfrm>
+        <a:graphic>
+          <a:graphicData uri="http://schemas.openxmlformats.org/drawingml/2006/chart">
+            <c:chart xmlns:c="http://schemas.openxmlformats.org/drawingml/2006/chart" xmlns:r="http://schemas.openxmlformats.org/officeDocument/2006/relationships" r:id="rId2"/>
+          </a:graphicData>
+        </a:graphic>
+      </p:graphicFrame>
     </p:spTree>
     <p:extLst>
       <p:ext uri="{BB962C8B-B14F-4D97-AF65-F5344CB8AC3E}">
@@ -21642,14 +24633,14 @@
           <p:nvPr>
             <p:extLst>
               <p:ext uri="{D42A27DB-BD31-4B8C-83A1-F6EECF244321}">
-                <p14:modId xmlns:p14="http://schemas.microsoft.com/office/powerpoint/2010/main" val="3193825376"/>
+                <p14:modId xmlns:p14="http://schemas.microsoft.com/office/powerpoint/2010/main" val="2326200689"/>
               </p:ext>
             </p:extLst>
           </p:nvPr>
         </p:nvGraphicFramePr>
         <p:xfrm>
-          <a:off x="1924424" y="2081048"/>
-          <a:ext cx="7314169" cy="4586203"/>
+          <a:off x="2208202" y="2196663"/>
+          <a:ext cx="7314169" cy="3755885"/>
         </p:xfrm>
         <a:graphic>
           <a:graphicData uri="http://schemas.openxmlformats.org/drawingml/2006/chart">
@@ -21674,13 +24665,16 @@
           </a:xfrm>
         </p:spPr>
         <p:txBody>
-          <a:bodyPr/>
+          <a:bodyPr>
+            <a:normAutofit/>
+          </a:bodyPr>
           <a:lstStyle/>
           <a:p>
             <a:r>
               <a:rPr lang="en-US" sz="1400" dirty="0"/>
-              <a:t>GRAPH;GENERIC_GRAPH;COL1=METRICS,ROW1=CRITICAL_VIOLATIONS,METRICS=60017,CRITICAL_VIOLATIONS=ADDED|REMOVED</a:t>
-            </a:r>
+              <a:t>GRAPH;GENERIC_GRAPH;COL1=CRITICAL_VIOLATIONS,ROW1=METRICS,METRICS=HEALTH_FACTOR,CRITICAL_VIOLATIONS=ADDED|REMOVED</a:t>
+            </a:r>
+            <a:endParaRPr lang="en-US" sz="1600" dirty="0"/>
           </a:p>
         </p:txBody>
       </p:sp>
@@ -21743,14 +24737,14 @@
           <p:nvPr>
             <p:extLst>
               <p:ext uri="{D42A27DB-BD31-4B8C-83A1-F6EECF244321}">
-                <p14:modId xmlns:p14="http://schemas.microsoft.com/office/powerpoint/2010/main" val="1769131459"/>
+                <p14:modId xmlns:p14="http://schemas.microsoft.com/office/powerpoint/2010/main" val="2128251537"/>
               </p:ext>
             </p:extLst>
           </p:nvPr>
         </p:nvGraphicFramePr>
         <p:xfrm>
-          <a:off x="1969247" y="2081048"/>
-          <a:ext cx="6817401" cy="4326226"/>
+          <a:off x="844640" y="2291255"/>
+          <a:ext cx="5345953" cy="3674584"/>
         </p:xfrm>
         <a:graphic>
           <a:graphicData uri="http://schemas.openxmlformats.org/drawingml/2006/chart">
@@ -21785,6 +24779,28 @@
           </a:p>
         </p:txBody>
       </p:sp>
+      <p:graphicFrame>
+        <p:nvGraphicFramePr>
+          <p:cNvPr id="5" name="Chart 4" descr="GRAPH;GENERIC_GRAPH;COL1=SNAPSHOTS,ROW1=METRICS,METRICS=66033|66031|66032,SNAPSHOTS=CURRENT|PREVIOUS"/>
+          <p:cNvGraphicFramePr/>
+          <p:nvPr>
+            <p:extLst>
+              <p:ext uri="{D42A27DB-BD31-4B8C-83A1-F6EECF244321}">
+                <p14:modId xmlns:p14="http://schemas.microsoft.com/office/powerpoint/2010/main" val="3826702414"/>
+              </p:ext>
+            </p:extLst>
+          </p:nvPr>
+        </p:nvGraphicFramePr>
+        <p:xfrm>
+          <a:off x="6112565" y="2291255"/>
+          <a:ext cx="5345953" cy="3674584"/>
+        </p:xfrm>
+        <a:graphic>
+          <a:graphicData uri="http://schemas.openxmlformats.org/drawingml/2006/chart">
+            <c:chart xmlns:c="http://schemas.openxmlformats.org/drawingml/2006/chart" xmlns:r="http://schemas.openxmlformats.org/officeDocument/2006/relationships" r:id="rId3"/>
+          </a:graphicData>
+        </a:graphic>
+      </p:graphicFrame>
     </p:spTree>
     <p:extLst>
       <p:ext uri="{BB962C8B-B14F-4D97-AF65-F5344CB8AC3E}">
@@ -21839,7 +24855,7 @@
       </p:sp>
       <p:sp>
         <p:nvSpPr>
-          <p:cNvPr id="4" name="Text Placeholder 2"/>
+          <p:cNvPr id="3" name="Text Placeholder 2"/>
           <p:cNvSpPr>
             <a:spLocks noGrp="1"/>
           </p:cNvSpPr>
@@ -21849,8 +24865,8 @@
         </p:nvSpPr>
         <p:spPr>
           <a:xfrm>
-            <a:off x="642730" y="1123294"/>
-            <a:ext cx="10939670" cy="526830"/>
+            <a:off x="642730" y="1081253"/>
+            <a:ext cx="10939670" cy="4351338"/>
           </a:xfrm>
         </p:spPr>
         <p:txBody>
@@ -21858,27 +24874,36 @@
           <a:lstStyle/>
           <a:p>
             <a:r>
-              <a:rPr lang="en-US" sz="1400" dirty="0"/>
+              <a:rPr lang="en-US" sz="1200" dirty="0"/>
               <a:t>GRAPH;GENERIC_GRAPH;ROW1=TECHNOLOGIES,COL1=METRICS,TECHNOLOGIES=ALL,METRICS=10151</a:t>
             </a:r>
+          </a:p>
+          <a:p>
+            <a:r>
+              <a:rPr lang="en-US" sz="1200" dirty="0"/>
+              <a:t>GRAPH;GENERIC_GRAPH;ROW1=MODULES,COL1=METRICS,MODULES=ALL,METRICS=10151</a:t>
+            </a:r>
+          </a:p>
+          <a:p>
+            <a:endParaRPr lang="en-US" dirty="0"/>
           </a:p>
         </p:txBody>
       </p:sp>
       <p:graphicFrame>
         <p:nvGraphicFramePr>
-          <p:cNvPr id="7" name="Chart 6" descr="GRAPH;GENERIC_GRAPH;ROW1=TECHNOLOGIES,COL1=METRICS,TECHNOLOGIES=ALL,METRICS=10151"/>
+          <p:cNvPr id="4" name="Chart 3" descr="GRAPH;GENERIC_GRAPH;ROW1=TECHNOLOGIES,COL1=METRICS,TECHNOLOGIES=ALL,METRICS=10151"/>
           <p:cNvGraphicFramePr/>
           <p:nvPr>
             <p:extLst>
               <p:ext uri="{D42A27DB-BD31-4B8C-83A1-F6EECF244321}">
-                <p14:modId xmlns:p14="http://schemas.microsoft.com/office/powerpoint/2010/main" val="3637487911"/>
+                <p14:modId xmlns:p14="http://schemas.microsoft.com/office/powerpoint/2010/main" val="3288610499"/>
               </p:ext>
             </p:extLst>
           </p:nvPr>
         </p:nvGraphicFramePr>
         <p:xfrm>
-          <a:off x="2032000" y="1909482"/>
-          <a:ext cx="7040282" cy="4228851"/>
+          <a:off x="642730" y="2089269"/>
+          <a:ext cx="5337656" cy="3828055"/>
         </p:xfrm>
         <a:graphic>
           <a:graphicData uri="http://schemas.openxmlformats.org/drawingml/2006/chart">
@@ -21886,10 +24911,32 @@
           </a:graphicData>
         </a:graphic>
       </p:graphicFrame>
+      <p:graphicFrame>
+        <p:nvGraphicFramePr>
+          <p:cNvPr id="5" name="Chart 4" descr="GRAPH;GENERIC_GRAPH;ROW1=MODULES,COL1=METRICS,MODULES=ALL,METRICS=10151"/>
+          <p:cNvGraphicFramePr/>
+          <p:nvPr>
+            <p:extLst>
+              <p:ext uri="{D42A27DB-BD31-4B8C-83A1-F6EECF244321}">
+                <p14:modId xmlns:p14="http://schemas.microsoft.com/office/powerpoint/2010/main" val="2724615435"/>
+              </p:ext>
+            </p:extLst>
+          </p:nvPr>
+        </p:nvGraphicFramePr>
+        <p:xfrm>
+          <a:off x="5900529" y="2089269"/>
+          <a:ext cx="5524215" cy="3691421"/>
+        </p:xfrm>
+        <a:graphic>
+          <a:graphicData uri="http://schemas.openxmlformats.org/drawingml/2006/chart">
+            <c:chart xmlns:c="http://schemas.openxmlformats.org/drawingml/2006/chart" xmlns:r="http://schemas.openxmlformats.org/officeDocument/2006/relationships" r:id="rId3"/>
+          </a:graphicData>
+        </a:graphic>
+      </p:graphicFrame>
     </p:spTree>
     <p:extLst>
       <p:ext uri="{BB962C8B-B14F-4D97-AF65-F5344CB8AC3E}">
-        <p14:creationId xmlns:p14="http://schemas.microsoft.com/office/powerpoint/2010/main" val="1071100562"/>
+        <p14:creationId xmlns:p14="http://schemas.microsoft.com/office/powerpoint/2010/main" val="792657900"/>
       </p:ext>
     </p:extLst>
   </p:cSld>

</xml_diff>

<commit_message>
REPORTGEN-234 : fix template for generic graph
</commit_message>
<xml_diff>
--- a/CastReporting.Reporting/TemplatesFiles/Generic Graph Definition.pptx
+++ b/CastReporting.Reporting/TemplatesFiles/Generic Graph Definition.pptx
@@ -132,6 +132,10 @@
     </p:ext>
   </p:extLst>
 </p:presentation>
+</file>
+
+<file path=ppt/revisionInfo.xml><?xml version="1.0" encoding="utf-8"?>
+<p1510:revInfo xmlns:a="http://schemas.openxmlformats.org/drawingml/2006/main" xmlns:r="http://schemas.openxmlformats.org/officeDocument/2006/relationships" xmlns:p1510="http://schemas.microsoft.com/office/powerpoint/2015/10/main"/>
 </file>
 
 <file path=ppt/charts/chart1.xml><?xml version="1.0" encoding="utf-8"?>
@@ -1275,28 +1279,10 @@
               </a:defRPr>
             </a:pPr>
             <a:r>
-              <a:rPr lang="fr-FR" sz="1000" b="1" dirty="0">
+              <a:rPr lang="fr-FR" sz="1000" b="1">
                 <a:effectLst/>
               </a:rPr>
-              <a:t>ROBUSTNESS</a:t>
-            </a:r>
-            <a:r>
-              <a:rPr lang="fr-FR" sz="1000" b="1" baseline="0" dirty="0">
-                <a:effectLst/>
-              </a:rPr>
-              <a:t> - </a:t>
-            </a:r>
-            <a:r>
-              <a:rPr lang="fr-FR" sz="1000" b="1" dirty="0">
-                <a:effectLst/>
-              </a:rPr>
-              <a:t>CRITICAL VIOLATIONS OVERVIEW BY</a:t>
-            </a:r>
-            <a:r>
-              <a:rPr lang="fr-FR" sz="1000" b="1" baseline="0" dirty="0">
-                <a:effectLst/>
-              </a:rPr>
-              <a:t> MODULE</a:t>
+              <a:t>ADDED AND REMOVED CRITICAL VIOLATIONS BY MODULE</a:t>
             </a:r>
             <a:endParaRPr lang="en-US" sz="1000" b="1" dirty="0">
               <a:effectLst/>
@@ -8946,7 +8932,7 @@
           <a:p>
             <a:fld id="{BE7CF963-E58D-FC4D-BA9E-60A980752DC6}" type="datetimeFigureOut">
               <a:rPr lang="en-US" smtClean="0"/>
-              <a:t>3/30/2017</a:t>
+              <a:t>5/2/2017</a:t>
             </a:fld>
             <a:endParaRPr lang="en-US"/>
           </a:p>
@@ -9435,7 +9421,7 @@
           <a:p>
             <a:fld id="{B590C078-9131-4E49-8A0D-400FEE8377B5}" type="datetimeFigureOut">
               <a:rPr lang="en-US" smtClean="0"/>
-              <a:t>3/30/2017</a:t>
+              <a:t>5/2/2017</a:t>
             </a:fld>
             <a:endParaRPr lang="en-US"/>
           </a:p>
@@ -13020,7 +13006,7 @@
           <a:p>
             <a:fld id="{B590C078-9131-4E49-8A0D-400FEE8377B5}" type="datetimeFigureOut">
               <a:rPr lang="en-US" smtClean="0"/>
-              <a:t>3/30/2017</a:t>
+              <a:t>5/2/2017</a:t>
             </a:fld>
             <a:endParaRPr lang="en-US"/>
           </a:p>
@@ -17098,7 +17084,7 @@
           <a:p>
             <a:fld id="{B590C078-9131-4E49-8A0D-400FEE8377B5}" type="datetimeFigureOut">
               <a:rPr lang="en-US" smtClean="0"/>
-              <a:t>3/30/2017</a:t>
+              <a:t>5/2/2017</a:t>
             </a:fld>
             <a:endParaRPr lang="en-US"/>
           </a:p>
@@ -20923,7 +20909,7 @@
           <a:p>
             <a:fld id="{B590C078-9131-4E49-8A0D-400FEE8377B5}" type="datetimeFigureOut">
               <a:rPr lang="en-US" smtClean="0"/>
-              <a:t>3/30/2017</a:t>
+              <a:t>5/2/2017</a:t>
             </a:fld>
             <a:endParaRPr lang="en-US"/>
           </a:p>
@@ -24559,7 +24545,7 @@
           <p:nvPr>
             <p:extLst>
               <p:ext uri="{D42A27DB-BD31-4B8C-83A1-F6EECF244321}">
-                <p14:modId xmlns:p14="http://schemas.microsoft.com/office/powerpoint/2010/main" val="611062237"/>
+                <p14:modId xmlns:p14="http://schemas.microsoft.com/office/powerpoint/2010/main" val="1043579304"/>
               </p:ext>
             </p:extLst>
           </p:nvPr>

</xml_diff>

<commit_message>
REPORTGEN-277 : Report Generator : small issues to correct in slide 2
</commit_message>
<xml_diff>
--- a/CastReporting.Reporting/TemplatesFiles/Generic Graph Definition.pptx
+++ b/CastReporting.Reporting/TemplatesFiles/Generic Graph Definition.pptx
@@ -8932,7 +8932,7 @@
           <a:p>
             <a:fld id="{BE7CF963-E58D-FC4D-BA9E-60A980752DC6}" type="datetimeFigureOut">
               <a:rPr lang="en-US" smtClean="0"/>
-              <a:t>5/2/2017</a:t>
+              <a:t>7/4/2017</a:t>
             </a:fld>
             <a:endParaRPr lang="en-US"/>
           </a:p>
@@ -9421,7 +9421,7 @@
           <a:p>
             <a:fld id="{B590C078-9131-4E49-8A0D-400FEE8377B5}" type="datetimeFigureOut">
               <a:rPr lang="en-US" smtClean="0"/>
-              <a:t>5/2/2017</a:t>
+              <a:t>7/4/2017</a:t>
             </a:fld>
             <a:endParaRPr lang="en-US"/>
           </a:p>
@@ -13006,7 +13006,7 @@
           <a:p>
             <a:fld id="{B590C078-9131-4E49-8A0D-400FEE8377B5}" type="datetimeFigureOut">
               <a:rPr lang="en-US" smtClean="0"/>
-              <a:t>5/2/2017</a:t>
+              <a:t>7/4/2017</a:t>
             </a:fld>
             <a:endParaRPr lang="en-US"/>
           </a:p>
@@ -17084,7 +17084,7 @@
           <a:p>
             <a:fld id="{B590C078-9131-4E49-8A0D-400FEE8377B5}" type="datetimeFigureOut">
               <a:rPr lang="en-US" smtClean="0"/>
-              <a:t>5/2/2017</a:t>
+              <a:t>7/4/2017</a:t>
             </a:fld>
             <a:endParaRPr lang="en-US"/>
           </a:p>
@@ -20909,7 +20909,7 @@
           <a:p>
             <a:fld id="{B590C078-9131-4E49-8A0D-400FEE8377B5}" type="datetimeFigureOut">
               <a:rPr lang="en-US" smtClean="0"/>
-              <a:t>5/2/2017</a:t>
+              <a:t>7/4/2017</a:t>
             </a:fld>
             <a:endParaRPr lang="en-US"/>
           </a:p>
@@ -21525,122 +21525,6 @@
           </a:p>
         </p:txBody>
       </p:sp>
-      <p:sp>
-        <p:nvSpPr>
-          <p:cNvPr id="8" name="Text Placeholder 7"/>
-          <p:cNvSpPr>
-            <a:spLocks noGrp="1"/>
-          </p:cNvSpPr>
-          <p:nvPr>
-            <p:ph type="body" sz="quarter" idx="13"/>
-          </p:nvPr>
-        </p:nvSpPr>
-        <p:spPr>
-          <a:xfrm>
-            <a:off x="248282" y="1333500"/>
-            <a:ext cx="3157161" cy="4351338"/>
-          </a:xfrm>
-        </p:spPr>
-        <p:txBody>
-          <a:bodyPr>
-            <a:normAutofit/>
-          </a:bodyPr>
-          <a:lstStyle/>
-          <a:p>
-            <a:pPr marL="0" indent="0" algn="r">
-              <a:buNone/>
-            </a:pPr>
-            <a:r>
-              <a:rPr lang="en-US" dirty="0"/>
-              <a:t>AXIS</a:t>
-            </a:r>
-          </a:p>
-          <a:p>
-            <a:pPr algn="r"/>
-            <a:r>
-              <a:rPr lang="fr-FR" dirty="0">
-                <a:solidFill>
-                  <a:schemeClr val="accent5">
-                    <a:lumMod val="75000"/>
-                  </a:schemeClr>
-                </a:solidFill>
-              </a:rPr>
-              <a:t>SNAPSHOTS</a:t>
-            </a:r>
-          </a:p>
-          <a:p>
-            <a:pPr algn="r"/>
-            <a:r>
-              <a:rPr lang="fr-FR" dirty="0">
-                <a:solidFill>
-                  <a:schemeClr val="accent2"/>
-                </a:solidFill>
-              </a:rPr>
-              <a:t>METRICS</a:t>
-            </a:r>
-          </a:p>
-          <a:p>
-            <a:pPr algn="r"/>
-            <a:endParaRPr lang="fr-FR" dirty="0">
-              <a:solidFill>
-                <a:schemeClr val="accent3"/>
-              </a:solidFill>
-            </a:endParaRPr>
-          </a:p>
-          <a:p>
-            <a:pPr algn="r"/>
-            <a:endParaRPr lang="fr-FR" dirty="0">
-              <a:solidFill>
-                <a:schemeClr val="accent3"/>
-              </a:solidFill>
-            </a:endParaRPr>
-          </a:p>
-          <a:p>
-            <a:pPr algn="r"/>
-            <a:r>
-              <a:rPr lang="fr-FR" dirty="0">
-                <a:solidFill>
-                  <a:schemeClr val="accent3"/>
-                </a:solidFill>
-              </a:rPr>
-              <a:t>MODULES</a:t>
-            </a:r>
-          </a:p>
-          <a:p>
-            <a:pPr algn="r"/>
-            <a:r>
-              <a:rPr lang="fr-FR" dirty="0">
-                <a:solidFill>
-                  <a:schemeClr val="accent6"/>
-                </a:solidFill>
-              </a:rPr>
-              <a:t>TECHNOLOGIES</a:t>
-            </a:r>
-          </a:p>
-          <a:p>
-            <a:pPr algn="r"/>
-            <a:r>
-              <a:rPr lang="fr-FR" dirty="0">
-                <a:solidFill>
-                  <a:srgbClr val="00B0F0"/>
-                </a:solidFill>
-              </a:rPr>
-              <a:t>VIOLATIONS *</a:t>
-            </a:r>
-          </a:p>
-          <a:p>
-            <a:pPr algn="r"/>
-            <a:r>
-              <a:rPr lang="fr-FR" dirty="0">
-                <a:solidFill>
-                  <a:schemeClr val="accent1"/>
-                </a:solidFill>
-              </a:rPr>
-              <a:t>CRITICAL VIOLATIONS *</a:t>
-            </a:r>
-          </a:p>
-        </p:txBody>
-      </p:sp>
       <p:pic>
         <p:nvPicPr>
           <p:cNvPr id="12" name="Picture 11"/>
@@ -21673,13 +21557,210 @@
       </p:pic>
       <p:sp>
         <p:nvSpPr>
-          <p:cNvPr id="4" name="Rectangle: Rounded Corners 3"/>
+          <p:cNvPr id="46" name="TextBox 45"/>
+          <p:cNvSpPr txBox="1"/>
+          <p:nvPr/>
+        </p:nvSpPr>
+        <p:spPr>
+          <a:xfrm>
+            <a:off x="726141" y="6257364"/>
+            <a:ext cx="10703859" cy="367553"/>
+          </a:xfrm>
+          <a:prstGeom prst="rect">
+            <a:avLst/>
+          </a:prstGeom>
+        </p:spPr>
+        <p:txBody>
+          <a:bodyPr vert="horz" wrap="square" lIns="91440" tIns="45720" rIns="91440" bIns="45720" rtlCol="0" anchor="t">
+            <a:noAutofit/>
+          </a:bodyPr>
+          <a:lstStyle/>
+          <a:p>
+            <a:r>
+              <a:rPr lang="en-US" sz="1200" dirty="0">
+                <a:solidFill>
+                  <a:schemeClr val="tx1">
+                    <a:lumMod val="50000"/>
+                    <a:lumOff val="50000"/>
+                  </a:schemeClr>
+                </a:solidFill>
+              </a:rPr>
+              <a:t>* To get results on violations or critical violations on a specific metrics, add the axis “METRICS=M” where M is a metric id from quality model (</a:t>
+            </a:r>
+            <a:r>
+              <a:rPr lang="en-US" sz="1200" dirty="0" err="1">
+                <a:solidFill>
+                  <a:schemeClr val="tx1">
+                    <a:lumMod val="50000"/>
+                    <a:lumOff val="50000"/>
+                  </a:schemeClr>
+                </a:solidFill>
+              </a:rPr>
+              <a:t>eg</a:t>
+            </a:r>
+            <a:r>
+              <a:rPr lang="en-US" sz="1200" dirty="0">
+                <a:solidFill>
+                  <a:schemeClr val="tx1">
+                    <a:lumMod val="50000"/>
+                    <a:lumOff val="50000"/>
+                  </a:schemeClr>
+                </a:solidFill>
+              </a:rPr>
+              <a:t> slide 6)</a:t>
+            </a:r>
+          </a:p>
+        </p:txBody>
+      </p:sp>
+      <p:sp>
+        <p:nvSpPr>
+          <p:cNvPr id="78" name="Text Placeholder 7">
+            <a:extLst>
+              <a:ext uri="{FF2B5EF4-FFF2-40B4-BE49-F238E27FC236}">
+                <a16:creationId xmlns:a16="http://schemas.microsoft.com/office/drawing/2014/main" id="{80A017E8-33DB-41EC-AE7A-579049F6551F}"/>
+              </a:ext>
+            </a:extLst>
+          </p:cNvPr>
+          <p:cNvSpPr>
+            <a:spLocks noGrp="1"/>
+          </p:cNvSpPr>
+          <p:nvPr>
+            <p:ph type="body" sz="quarter" idx="13"/>
+          </p:nvPr>
+        </p:nvSpPr>
+        <p:spPr>
+          <a:xfrm>
+            <a:off x="328706" y="1333500"/>
+            <a:ext cx="11253694" cy="4351338"/>
+          </a:xfrm>
+        </p:spPr>
+        <p:txBody>
+          <a:bodyPr>
+            <a:normAutofit/>
+          </a:bodyPr>
+          <a:lstStyle/>
+          <a:p>
+            <a:pPr marL="0" indent="0">
+              <a:buNone/>
+            </a:pPr>
+            <a:r>
+              <a:rPr lang="en-US" dirty="0"/>
+              <a:t>AXIS					VALUES</a:t>
+            </a:r>
+          </a:p>
+          <a:p>
+            <a:r>
+              <a:rPr lang="fr-FR" dirty="0">
+                <a:solidFill>
+                  <a:schemeClr val="accent5">
+                    <a:lumMod val="75000"/>
+                  </a:schemeClr>
+                </a:solidFill>
+              </a:rPr>
+              <a:t>SNAPSHOTS</a:t>
+            </a:r>
+          </a:p>
+          <a:p>
+            <a:r>
+              <a:rPr lang="fr-FR" dirty="0">
+                <a:solidFill>
+                  <a:schemeClr val="accent2"/>
+                </a:solidFill>
+              </a:rPr>
+              <a:t>METRICS</a:t>
+            </a:r>
+          </a:p>
+          <a:p>
+            <a:endParaRPr lang="fr-FR" dirty="0">
+              <a:solidFill>
+                <a:schemeClr val="accent3"/>
+              </a:solidFill>
+            </a:endParaRPr>
+          </a:p>
+          <a:p>
+            <a:endParaRPr lang="fr-FR" dirty="0">
+              <a:solidFill>
+                <a:schemeClr val="accent3"/>
+              </a:solidFill>
+            </a:endParaRPr>
+          </a:p>
+          <a:p>
+            <a:endParaRPr lang="fr-FR" dirty="0">
+              <a:solidFill>
+                <a:schemeClr val="accent3"/>
+              </a:solidFill>
+            </a:endParaRPr>
+          </a:p>
+          <a:p>
+            <a:r>
+              <a:rPr lang="fr-FR" dirty="0">
+                <a:solidFill>
+                  <a:schemeClr val="accent3"/>
+                </a:solidFill>
+              </a:rPr>
+              <a:t>MODULES</a:t>
+            </a:r>
+          </a:p>
+          <a:p>
+            <a:r>
+              <a:rPr lang="fr-FR" dirty="0">
+                <a:solidFill>
+                  <a:schemeClr val="accent6"/>
+                </a:solidFill>
+              </a:rPr>
+              <a:t>TECHNOLOGIES</a:t>
+            </a:r>
+          </a:p>
+          <a:p>
+            <a:r>
+              <a:rPr lang="fr-FR" dirty="0">
+                <a:solidFill>
+                  <a:srgbClr val="00B0F0"/>
+                </a:solidFill>
+              </a:rPr>
+              <a:t>VIOLATIONS *</a:t>
+            </a:r>
+          </a:p>
+          <a:p>
+            <a:r>
+              <a:rPr lang="fr-FR" dirty="0">
+                <a:solidFill>
+                  <a:schemeClr val="accent1"/>
+                </a:solidFill>
+              </a:rPr>
+              <a:t>CRITICAL</a:t>
+            </a:r>
+            <a:r>
+              <a:rPr lang="fr-FR">
+                <a:solidFill>
+                  <a:schemeClr val="accent1"/>
+                </a:solidFill>
+              </a:rPr>
+              <a:t>_VIOLATIONS *</a:t>
+            </a:r>
+            <a:endParaRPr lang="fr-FR" dirty="0">
+              <a:solidFill>
+                <a:schemeClr val="accent1"/>
+              </a:solidFill>
+            </a:endParaRPr>
+          </a:p>
+        </p:txBody>
+      </p:sp>
+      <p:sp>
+        <p:nvSpPr>
+          <p:cNvPr id="79" name="Rectangle: Rounded Corners 78">
+            <a:extLst>
+              <a:ext uri="{FF2B5EF4-FFF2-40B4-BE49-F238E27FC236}">
+                <a16:creationId xmlns:a16="http://schemas.microsoft.com/office/drawing/2014/main" id="{6E8B87D7-9672-4F2D-B43F-5595AB3F26D2}"/>
+              </a:ext>
+            </a:extLst>
+          </p:cNvPr>
           <p:cNvSpPr/>
           <p:nvPr/>
         </p:nvSpPr>
         <p:spPr>
           <a:xfrm>
-            <a:off x="3555448" y="1767155"/>
+            <a:off x="3477775" y="1767155"/>
             <a:ext cx="998420" cy="322080"/>
           </a:xfrm>
           <a:prstGeom prst="roundRect">
@@ -21725,13 +21806,19 @@
       </p:sp>
       <p:sp>
         <p:nvSpPr>
-          <p:cNvPr id="14" name="Rectangle: Rounded Corners 13"/>
+          <p:cNvPr id="80" name="Rectangle: Rounded Corners 79">
+            <a:extLst>
+              <a:ext uri="{FF2B5EF4-FFF2-40B4-BE49-F238E27FC236}">
+                <a16:creationId xmlns:a16="http://schemas.microsoft.com/office/drawing/2014/main" id="{3EAB9C92-F859-404A-93E3-CD517D6F3A04}"/>
+              </a:ext>
+            </a:extLst>
+          </p:cNvPr>
           <p:cNvSpPr/>
           <p:nvPr/>
         </p:nvSpPr>
         <p:spPr>
           <a:xfrm>
-            <a:off x="4618330" y="1767155"/>
+            <a:off x="4540657" y="1767155"/>
             <a:ext cx="1102877" cy="322080"/>
           </a:xfrm>
           <a:prstGeom prst="roundRect">
@@ -21777,13 +21864,19 @@
       </p:sp>
       <p:sp>
         <p:nvSpPr>
-          <p:cNvPr id="15" name="Rectangle: Rounded Corners 14"/>
+          <p:cNvPr id="81" name="Rectangle: Rounded Corners 80">
+            <a:extLst>
+              <a:ext uri="{FF2B5EF4-FFF2-40B4-BE49-F238E27FC236}">
+                <a16:creationId xmlns:a16="http://schemas.microsoft.com/office/drawing/2014/main" id="{30A1E25A-633F-4213-9AFC-C65F1F14D91A}"/>
+              </a:ext>
+            </a:extLst>
+          </p:cNvPr>
           <p:cNvSpPr/>
           <p:nvPr/>
         </p:nvSpPr>
         <p:spPr>
           <a:xfrm>
-            <a:off x="5785669" y="1767155"/>
+            <a:off x="5707996" y="1767155"/>
             <a:ext cx="719193" cy="322080"/>
           </a:xfrm>
           <a:prstGeom prst="roundRect">
@@ -21829,13 +21922,19 @@
       </p:sp>
       <p:sp>
         <p:nvSpPr>
-          <p:cNvPr id="16" name="Rectangle: Rounded Corners 15"/>
+          <p:cNvPr id="82" name="Rectangle: Rounded Corners 81">
+            <a:extLst>
+              <a:ext uri="{FF2B5EF4-FFF2-40B4-BE49-F238E27FC236}">
+                <a16:creationId xmlns:a16="http://schemas.microsoft.com/office/drawing/2014/main" id="{4E4267A8-32FB-43E5-B770-A93DEECEAF01}"/>
+              </a:ext>
+            </a:extLst>
+          </p:cNvPr>
           <p:cNvSpPr/>
           <p:nvPr/>
         </p:nvSpPr>
         <p:spPr>
           <a:xfrm>
-            <a:off x="6569324" y="1767155"/>
+            <a:off x="6491651" y="1767155"/>
             <a:ext cx="1510302" cy="322080"/>
           </a:xfrm>
           <a:prstGeom prst="roundRect">
@@ -21881,13 +21980,19 @@
       </p:sp>
       <p:sp>
         <p:nvSpPr>
-          <p:cNvPr id="17" name="Rectangle: Rounded Corners 16"/>
+          <p:cNvPr id="83" name="Rectangle: Rounded Corners 82">
+            <a:extLst>
+              <a:ext uri="{FF2B5EF4-FFF2-40B4-BE49-F238E27FC236}">
+                <a16:creationId xmlns:a16="http://schemas.microsoft.com/office/drawing/2014/main" id="{37232080-FB84-4CD3-B308-5466BF6CA5D4}"/>
+              </a:ext>
+            </a:extLst>
+          </p:cNvPr>
           <p:cNvSpPr/>
           <p:nvPr/>
         </p:nvSpPr>
         <p:spPr>
           <a:xfrm>
-            <a:off x="8144088" y="1767155"/>
+            <a:off x="8066415" y="1767155"/>
             <a:ext cx="539991" cy="322080"/>
           </a:xfrm>
           <a:prstGeom prst="roundRect">
@@ -21933,13 +22038,19 @@
       </p:sp>
       <p:sp>
         <p:nvSpPr>
-          <p:cNvPr id="18" name="Rectangle: Rounded Corners 17"/>
+          <p:cNvPr id="84" name="Rectangle: Rounded Corners 83">
+            <a:extLst>
+              <a:ext uri="{FF2B5EF4-FFF2-40B4-BE49-F238E27FC236}">
+                <a16:creationId xmlns:a16="http://schemas.microsoft.com/office/drawing/2014/main" id="{42432481-377F-47D3-AB95-6ADCE249D7AF}"/>
+              </a:ext>
+            </a:extLst>
+          </p:cNvPr>
           <p:cNvSpPr/>
           <p:nvPr/>
         </p:nvSpPr>
         <p:spPr>
           <a:xfrm>
-            <a:off x="3571212" y="2203333"/>
+            <a:off x="3493539" y="2203333"/>
             <a:ext cx="560589" cy="322080"/>
           </a:xfrm>
           <a:prstGeom prst="roundRect">
@@ -21983,13 +22094,19 @@
       </p:sp>
       <p:sp>
         <p:nvSpPr>
-          <p:cNvPr id="19" name="Rectangle: Rounded Corners 18"/>
+          <p:cNvPr id="85" name="Rectangle: Rounded Corners 84">
+            <a:extLst>
+              <a:ext uri="{FF2B5EF4-FFF2-40B4-BE49-F238E27FC236}">
+                <a16:creationId xmlns:a16="http://schemas.microsoft.com/office/drawing/2014/main" id="{757AA775-0A19-4D90-AAE6-B71F47E08E16}"/>
+              </a:ext>
+            </a:extLst>
+          </p:cNvPr>
           <p:cNvSpPr/>
           <p:nvPr/>
         </p:nvSpPr>
         <p:spPr>
           <a:xfrm>
-            <a:off x="4199285" y="2203333"/>
+            <a:off x="4121612" y="2203333"/>
             <a:ext cx="1540708" cy="322080"/>
           </a:xfrm>
           <a:prstGeom prst="roundRect">
@@ -22033,13 +22150,19 @@
       </p:sp>
       <p:sp>
         <p:nvSpPr>
-          <p:cNvPr id="20" name="Rectangle: Rounded Corners 19"/>
+          <p:cNvPr id="86" name="Rectangle: Rounded Corners 85">
+            <a:extLst>
+              <a:ext uri="{FF2B5EF4-FFF2-40B4-BE49-F238E27FC236}">
+                <a16:creationId xmlns:a16="http://schemas.microsoft.com/office/drawing/2014/main" id="{B16D7162-1C5E-4F2D-B4D9-3DF736727E59}"/>
+              </a:ext>
+            </a:extLst>
+          </p:cNvPr>
           <p:cNvSpPr/>
           <p:nvPr/>
         </p:nvSpPr>
         <p:spPr>
           <a:xfrm>
-            <a:off x="5807477" y="2203333"/>
+            <a:off x="5729804" y="2203333"/>
             <a:ext cx="1790858" cy="322080"/>
           </a:xfrm>
           <a:prstGeom prst="roundRect">
@@ -22083,13 +22206,19 @@
       </p:sp>
       <p:sp>
         <p:nvSpPr>
-          <p:cNvPr id="21" name="Rectangle: Rounded Corners 20"/>
+          <p:cNvPr id="87" name="Rectangle: Rounded Corners 86">
+            <a:extLst>
+              <a:ext uri="{FF2B5EF4-FFF2-40B4-BE49-F238E27FC236}">
+                <a16:creationId xmlns:a16="http://schemas.microsoft.com/office/drawing/2014/main" id="{54AF79F4-FBBC-427E-AF8B-0132AD716EAF}"/>
+              </a:ext>
+            </a:extLst>
+          </p:cNvPr>
           <p:cNvSpPr/>
           <p:nvPr/>
         </p:nvSpPr>
         <p:spPr>
           <a:xfrm>
-            <a:off x="7665819" y="2203333"/>
+            <a:off x="7588146" y="2203333"/>
             <a:ext cx="1887485" cy="322080"/>
           </a:xfrm>
           <a:prstGeom prst="roundRect">
@@ -22133,13 +22262,19 @@
       </p:sp>
       <p:sp>
         <p:nvSpPr>
-          <p:cNvPr id="22" name="Rectangle: Rounded Corners 21"/>
+          <p:cNvPr id="88" name="Rectangle: Rounded Corners 87">
+            <a:extLst>
+              <a:ext uri="{FF2B5EF4-FFF2-40B4-BE49-F238E27FC236}">
+                <a16:creationId xmlns:a16="http://schemas.microsoft.com/office/drawing/2014/main" id="{20439B51-02B3-46C4-BE31-E104F5532CB1}"/>
+              </a:ext>
+            </a:extLst>
+          </p:cNvPr>
           <p:cNvSpPr/>
           <p:nvPr/>
         </p:nvSpPr>
         <p:spPr>
           <a:xfrm>
-            <a:off x="9620788" y="2203333"/>
+            <a:off x="3505085" y="2639376"/>
             <a:ext cx="1500390" cy="322080"/>
           </a:xfrm>
           <a:prstGeom prst="roundRect">
@@ -22183,13 +22318,19 @@
       </p:sp>
       <p:sp>
         <p:nvSpPr>
-          <p:cNvPr id="28" name="Rectangle: Rounded Corners 27"/>
+          <p:cNvPr id="89" name="Rectangle: Rounded Corners 88">
+            <a:extLst>
+              <a:ext uri="{FF2B5EF4-FFF2-40B4-BE49-F238E27FC236}">
+                <a16:creationId xmlns:a16="http://schemas.microsoft.com/office/drawing/2014/main" id="{FD68F2ED-20F6-4E64-9F72-DE4D9EB81091}"/>
+              </a:ext>
+            </a:extLst>
+          </p:cNvPr>
           <p:cNvSpPr/>
           <p:nvPr/>
         </p:nvSpPr>
         <p:spPr>
           <a:xfrm>
-            <a:off x="3571212" y="2607980"/>
+            <a:off x="3505706" y="3074009"/>
             <a:ext cx="1769278" cy="322080"/>
           </a:xfrm>
           <a:prstGeom prst="roundRect">
@@ -22233,13 +22374,19 @@
       </p:sp>
       <p:sp>
         <p:nvSpPr>
-          <p:cNvPr id="29" name="Rectangle: Rounded Corners 28"/>
+          <p:cNvPr id="90" name="Rectangle: Rounded Corners 89">
+            <a:extLst>
+              <a:ext uri="{FF2B5EF4-FFF2-40B4-BE49-F238E27FC236}">
+                <a16:creationId xmlns:a16="http://schemas.microsoft.com/office/drawing/2014/main" id="{27EA5D50-65CA-4F98-A47C-52B1C6490B2F}"/>
+              </a:ext>
+            </a:extLst>
+          </p:cNvPr>
           <p:cNvSpPr/>
           <p:nvPr/>
         </p:nvSpPr>
         <p:spPr>
           <a:xfrm>
-            <a:off x="5401835" y="2607980"/>
+            <a:off x="5336329" y="3074009"/>
             <a:ext cx="1913713" cy="322080"/>
           </a:xfrm>
           <a:prstGeom prst="roundRect">
@@ -22283,13 +22430,19 @@
       </p:sp>
       <p:sp>
         <p:nvSpPr>
-          <p:cNvPr id="30" name="Rectangle: Rounded Corners 29"/>
+          <p:cNvPr id="91" name="Rectangle: Rounded Corners 90">
+            <a:extLst>
+              <a:ext uri="{FF2B5EF4-FFF2-40B4-BE49-F238E27FC236}">
+                <a16:creationId xmlns:a16="http://schemas.microsoft.com/office/drawing/2014/main" id="{05E700DC-47B1-40D3-BC32-A4D061685618}"/>
+              </a:ext>
+            </a:extLst>
+          </p:cNvPr>
           <p:cNvSpPr/>
           <p:nvPr/>
         </p:nvSpPr>
         <p:spPr>
           <a:xfrm>
-            <a:off x="7376893" y="2607980"/>
+            <a:off x="7311387" y="3074009"/>
             <a:ext cx="1608804" cy="322080"/>
           </a:xfrm>
           <a:prstGeom prst="roundRect">
@@ -22333,13 +22486,19 @@
       </p:sp>
       <p:sp>
         <p:nvSpPr>
-          <p:cNvPr id="31" name="Rectangle: Rounded Corners 30"/>
+          <p:cNvPr id="92" name="Rectangle: Rounded Corners 91">
+            <a:extLst>
+              <a:ext uri="{FF2B5EF4-FFF2-40B4-BE49-F238E27FC236}">
+                <a16:creationId xmlns:a16="http://schemas.microsoft.com/office/drawing/2014/main" id="{F8B2B9A8-84CB-437A-A734-C7F9A7A53841}"/>
+              </a:ext>
+            </a:extLst>
+          </p:cNvPr>
           <p:cNvSpPr/>
           <p:nvPr/>
         </p:nvSpPr>
         <p:spPr>
           <a:xfrm>
-            <a:off x="9047042" y="2607980"/>
+            <a:off x="8981536" y="3074009"/>
             <a:ext cx="1064968" cy="322080"/>
           </a:xfrm>
           <a:prstGeom prst="roundRect">
@@ -22383,13 +22542,19 @@
       </p:sp>
       <p:sp>
         <p:nvSpPr>
-          <p:cNvPr id="32" name="Rectangle: Rounded Corners 31"/>
+          <p:cNvPr id="93" name="Rectangle: Rounded Corners 92">
+            <a:extLst>
+              <a:ext uri="{FF2B5EF4-FFF2-40B4-BE49-F238E27FC236}">
+                <a16:creationId xmlns:a16="http://schemas.microsoft.com/office/drawing/2014/main" id="{5B5D7B95-9610-480E-8B66-273596C5A78C}"/>
+              </a:ext>
+            </a:extLst>
+          </p:cNvPr>
           <p:cNvSpPr/>
           <p:nvPr/>
         </p:nvSpPr>
         <p:spPr>
           <a:xfrm>
-            <a:off x="10173354" y="2607980"/>
+            <a:off x="10107848" y="3074009"/>
             <a:ext cx="1813035" cy="322080"/>
           </a:xfrm>
           <a:prstGeom prst="roundRect">
@@ -22433,13 +22598,19 @@
       </p:sp>
       <p:sp>
         <p:nvSpPr>
-          <p:cNvPr id="33" name="Rectangle: Rounded Corners 32"/>
+          <p:cNvPr id="94" name="Rectangle: Rounded Corners 93">
+            <a:extLst>
+              <a:ext uri="{FF2B5EF4-FFF2-40B4-BE49-F238E27FC236}">
+                <a16:creationId xmlns:a16="http://schemas.microsoft.com/office/drawing/2014/main" id="{B331BD88-E1A4-4529-B289-E70E95DAC8BC}"/>
+              </a:ext>
+            </a:extLst>
+          </p:cNvPr>
           <p:cNvSpPr/>
           <p:nvPr/>
         </p:nvSpPr>
         <p:spPr>
           <a:xfrm>
-            <a:off x="3571212" y="3020811"/>
+            <a:off x="3505706" y="3486840"/>
             <a:ext cx="1064968" cy="322080"/>
           </a:xfrm>
           <a:prstGeom prst="roundRect">
@@ -22483,13 +22654,19 @@
       </p:sp>
       <p:sp>
         <p:nvSpPr>
-          <p:cNvPr id="34" name="Rectangle: Rounded Corners 33"/>
+          <p:cNvPr id="95" name="Rectangle: Rounded Corners 94">
+            <a:extLst>
+              <a:ext uri="{FF2B5EF4-FFF2-40B4-BE49-F238E27FC236}">
+                <a16:creationId xmlns:a16="http://schemas.microsoft.com/office/drawing/2014/main" id="{E3243A06-0F4F-49B9-8868-0D08F048E206}"/>
+              </a:ext>
+            </a:extLst>
+          </p:cNvPr>
           <p:cNvSpPr/>
           <p:nvPr/>
         </p:nvSpPr>
         <p:spPr>
           <a:xfrm>
-            <a:off x="3574234" y="3507907"/>
+            <a:off x="3502534" y="3978678"/>
             <a:ext cx="998420" cy="322080"/>
           </a:xfrm>
           <a:prstGeom prst="roundRect">
@@ -22533,13 +22710,19 @@
       </p:sp>
       <p:sp>
         <p:nvSpPr>
-          <p:cNvPr id="35" name="Rectangle: Rounded Corners 34"/>
+          <p:cNvPr id="96" name="Rectangle: Rounded Corners 95">
+            <a:extLst>
+              <a:ext uri="{FF2B5EF4-FFF2-40B4-BE49-F238E27FC236}">
+                <a16:creationId xmlns:a16="http://schemas.microsoft.com/office/drawing/2014/main" id="{43E95E54-B0B3-4879-A37D-9FA81C9D2711}"/>
+              </a:ext>
+            </a:extLst>
+          </p:cNvPr>
           <p:cNvSpPr/>
           <p:nvPr/>
         </p:nvSpPr>
         <p:spPr>
           <a:xfrm>
-            <a:off x="4637116" y="3507907"/>
+            <a:off x="4565416" y="3978678"/>
             <a:ext cx="524699" cy="322080"/>
           </a:xfrm>
           <a:prstGeom prst="roundRect">
@@ -22583,13 +22766,19 @@
       </p:sp>
       <p:sp>
         <p:nvSpPr>
-          <p:cNvPr id="36" name="Rectangle: Rounded Corners 35"/>
+          <p:cNvPr id="97" name="Rectangle: Rounded Corners 96">
+            <a:extLst>
+              <a:ext uri="{FF2B5EF4-FFF2-40B4-BE49-F238E27FC236}">
+                <a16:creationId xmlns:a16="http://schemas.microsoft.com/office/drawing/2014/main" id="{0A64C557-7AFB-43E7-A7DA-F16DEC5B8D52}"/>
+              </a:ext>
+            </a:extLst>
+          </p:cNvPr>
           <p:cNvSpPr/>
           <p:nvPr/>
         </p:nvSpPr>
         <p:spPr>
           <a:xfrm>
-            <a:off x="3579492" y="3912554"/>
+            <a:off x="3507792" y="4383325"/>
             <a:ext cx="998420" cy="322080"/>
           </a:xfrm>
           <a:prstGeom prst="roundRect">
@@ -22633,13 +22822,19 @@
       </p:sp>
       <p:sp>
         <p:nvSpPr>
-          <p:cNvPr id="37" name="Rectangle: Rounded Corners 36"/>
+          <p:cNvPr id="98" name="Rectangle: Rounded Corners 97">
+            <a:extLst>
+              <a:ext uri="{FF2B5EF4-FFF2-40B4-BE49-F238E27FC236}">
+                <a16:creationId xmlns:a16="http://schemas.microsoft.com/office/drawing/2014/main" id="{59A55421-CBF8-4F4A-AE0D-88ED23180E5E}"/>
+              </a:ext>
+            </a:extLst>
+          </p:cNvPr>
           <p:cNvSpPr/>
           <p:nvPr/>
         </p:nvSpPr>
         <p:spPr>
           <a:xfrm>
-            <a:off x="4642374" y="3912554"/>
+            <a:off x="4570674" y="4383325"/>
             <a:ext cx="524699" cy="322080"/>
           </a:xfrm>
           <a:prstGeom prst="roundRect">
@@ -22683,13 +22878,19 @@
       </p:sp>
       <p:sp>
         <p:nvSpPr>
-          <p:cNvPr id="38" name="Rectangle: Rounded Corners 37"/>
+          <p:cNvPr id="99" name="Rectangle: Rounded Corners 98">
+            <a:extLst>
+              <a:ext uri="{FF2B5EF4-FFF2-40B4-BE49-F238E27FC236}">
+                <a16:creationId xmlns:a16="http://schemas.microsoft.com/office/drawing/2014/main" id="{0BA8A691-B80B-4EA2-B63B-55156A4C3532}"/>
+              </a:ext>
+            </a:extLst>
+          </p:cNvPr>
           <p:cNvSpPr/>
           <p:nvPr/>
         </p:nvSpPr>
         <p:spPr>
           <a:xfrm>
-            <a:off x="3581145" y="4309398"/>
+            <a:off x="3509445" y="4780169"/>
             <a:ext cx="998420" cy="322080"/>
           </a:xfrm>
           <a:prstGeom prst="roundRect">
@@ -22733,13 +22934,19 @@
       </p:sp>
       <p:sp>
         <p:nvSpPr>
-          <p:cNvPr id="39" name="Rectangle: Rounded Corners 38"/>
+          <p:cNvPr id="100" name="Rectangle: Rounded Corners 99">
+            <a:extLst>
+              <a:ext uri="{FF2B5EF4-FFF2-40B4-BE49-F238E27FC236}">
+                <a16:creationId xmlns:a16="http://schemas.microsoft.com/office/drawing/2014/main" id="{E95954FF-BE49-43F9-BAF9-AC926EAA17C7}"/>
+              </a:ext>
+            </a:extLst>
+          </p:cNvPr>
           <p:cNvSpPr/>
           <p:nvPr/>
         </p:nvSpPr>
         <p:spPr>
           <a:xfrm>
-            <a:off x="4644027" y="4309398"/>
+            <a:off x="4572327" y="4780169"/>
             <a:ext cx="757808" cy="322080"/>
           </a:xfrm>
           <a:prstGeom prst="roundRect">
@@ -22783,13 +22990,19 @@
       </p:sp>
       <p:sp>
         <p:nvSpPr>
-          <p:cNvPr id="40" name="Rectangle: Rounded Corners 39"/>
+          <p:cNvPr id="101" name="Rectangle: Rounded Corners 100">
+            <a:extLst>
+              <a:ext uri="{FF2B5EF4-FFF2-40B4-BE49-F238E27FC236}">
+                <a16:creationId xmlns:a16="http://schemas.microsoft.com/office/drawing/2014/main" id="{69C342D9-809D-4A99-A064-F22BC7F5D708}"/>
+              </a:ext>
+            </a:extLst>
+          </p:cNvPr>
           <p:cNvSpPr/>
           <p:nvPr/>
         </p:nvSpPr>
         <p:spPr>
           <a:xfrm>
-            <a:off x="5468178" y="4309398"/>
+            <a:off x="5396478" y="4780169"/>
             <a:ext cx="1036683" cy="322080"/>
           </a:xfrm>
           <a:prstGeom prst="roundRect">
@@ -22833,13 +23046,19 @@
       </p:sp>
       <p:sp>
         <p:nvSpPr>
-          <p:cNvPr id="41" name="Rectangle: Rounded Corners 40"/>
+          <p:cNvPr id="102" name="Rectangle: Rounded Corners 101">
+            <a:extLst>
+              <a:ext uri="{FF2B5EF4-FFF2-40B4-BE49-F238E27FC236}">
+                <a16:creationId xmlns:a16="http://schemas.microsoft.com/office/drawing/2014/main" id="{F5CC31FC-362C-4AB5-A409-038FAD8BFBB2}"/>
+              </a:ext>
+            </a:extLst>
+          </p:cNvPr>
           <p:cNvSpPr/>
           <p:nvPr/>
         </p:nvSpPr>
         <p:spPr>
           <a:xfrm>
-            <a:off x="6569324" y="4300758"/>
+            <a:off x="6497624" y="4771529"/>
             <a:ext cx="484353" cy="322080"/>
           </a:xfrm>
           <a:prstGeom prst="roundRect">
@@ -22883,13 +23102,19 @@
       </p:sp>
       <p:sp>
         <p:nvSpPr>
-          <p:cNvPr id="42" name="Rectangle: Rounded Corners 41"/>
+          <p:cNvPr id="103" name="Rectangle: Rounded Corners 102">
+            <a:extLst>
+              <a:ext uri="{FF2B5EF4-FFF2-40B4-BE49-F238E27FC236}">
+                <a16:creationId xmlns:a16="http://schemas.microsoft.com/office/drawing/2014/main" id="{3BE1BA3F-13EC-4FF7-AF16-DD98992BAD4D}"/>
+              </a:ext>
+            </a:extLst>
+          </p:cNvPr>
           <p:cNvSpPr/>
           <p:nvPr/>
         </p:nvSpPr>
         <p:spPr>
           <a:xfrm>
-            <a:off x="3607422" y="4735063"/>
+            <a:off x="3502534" y="5201640"/>
             <a:ext cx="998420" cy="322080"/>
           </a:xfrm>
           <a:prstGeom prst="roundRect">
@@ -22933,13 +23158,19 @@
       </p:sp>
       <p:sp>
         <p:nvSpPr>
-          <p:cNvPr id="43" name="Rectangle: Rounded Corners 42"/>
+          <p:cNvPr id="104" name="Rectangle: Rounded Corners 103">
+            <a:extLst>
+              <a:ext uri="{FF2B5EF4-FFF2-40B4-BE49-F238E27FC236}">
+                <a16:creationId xmlns:a16="http://schemas.microsoft.com/office/drawing/2014/main" id="{73C4F50B-C244-4E55-87DB-8537FCAC54C2}"/>
+              </a:ext>
+            </a:extLst>
+          </p:cNvPr>
           <p:cNvSpPr/>
           <p:nvPr/>
         </p:nvSpPr>
         <p:spPr>
           <a:xfrm>
-            <a:off x="4670304" y="4735063"/>
+            <a:off x="4565416" y="5201640"/>
             <a:ext cx="757808" cy="322080"/>
           </a:xfrm>
           <a:prstGeom prst="roundRect">
@@ -22983,13 +23214,19 @@
       </p:sp>
       <p:sp>
         <p:nvSpPr>
-          <p:cNvPr id="44" name="Rectangle: Rounded Corners 43"/>
+          <p:cNvPr id="105" name="Rectangle: Rounded Corners 104">
+            <a:extLst>
+              <a:ext uri="{FF2B5EF4-FFF2-40B4-BE49-F238E27FC236}">
+                <a16:creationId xmlns:a16="http://schemas.microsoft.com/office/drawing/2014/main" id="{72607859-AE95-4EF6-BD2B-D37727AF2584}"/>
+              </a:ext>
+            </a:extLst>
+          </p:cNvPr>
           <p:cNvSpPr/>
           <p:nvPr/>
         </p:nvSpPr>
         <p:spPr>
           <a:xfrm>
-            <a:off x="5494455" y="4735063"/>
+            <a:off x="5389567" y="5201640"/>
             <a:ext cx="1036683" cy="322080"/>
           </a:xfrm>
           <a:prstGeom prst="roundRect">
@@ -23033,13 +23270,19 @@
       </p:sp>
       <p:sp>
         <p:nvSpPr>
-          <p:cNvPr id="45" name="Rectangle: Rounded Corners 44"/>
+          <p:cNvPr id="106" name="Rectangle: Rounded Corners 105">
+            <a:extLst>
+              <a:ext uri="{FF2B5EF4-FFF2-40B4-BE49-F238E27FC236}">
+                <a16:creationId xmlns:a16="http://schemas.microsoft.com/office/drawing/2014/main" id="{742411D3-552E-40C9-8C86-3427A7C9437B}"/>
+              </a:ext>
+            </a:extLst>
+          </p:cNvPr>
           <p:cNvSpPr/>
           <p:nvPr/>
         </p:nvSpPr>
         <p:spPr>
           <a:xfrm>
-            <a:off x="6595601" y="4726423"/>
+            <a:off x="6490713" y="5193000"/>
             <a:ext cx="484353" cy="322080"/>
           </a:xfrm>
           <a:prstGeom prst="roundRect">
@@ -23083,255 +23326,57 @@
       </p:sp>
       <p:sp>
         <p:nvSpPr>
-          <p:cNvPr id="46" name="TextBox 45"/>
-          <p:cNvSpPr txBox="1"/>
+          <p:cNvPr id="107" name="Rectangle: Rounded Corners 106">
+            <a:extLst>
+              <a:ext uri="{FF2B5EF4-FFF2-40B4-BE49-F238E27FC236}">
+                <a16:creationId xmlns:a16="http://schemas.microsoft.com/office/drawing/2014/main" id="{6119B75E-7226-4451-B935-7256C1393CEC}"/>
+              </a:ext>
+            </a:extLst>
+          </p:cNvPr>
+          <p:cNvSpPr/>
           <p:nvPr/>
         </p:nvSpPr>
         <p:spPr>
           <a:xfrm>
-            <a:off x="726141" y="6257364"/>
-            <a:ext cx="10703859" cy="367553"/>
+            <a:off x="5122359" y="2649570"/>
+            <a:ext cx="2296753" cy="322080"/>
           </a:xfrm>
-          <a:prstGeom prst="rect">
+          <a:prstGeom prst="roundRect">
             <a:avLst/>
           </a:prstGeom>
+          <a:solidFill>
+            <a:schemeClr val="accent2"/>
+          </a:solidFill>
+          <a:ln>
+            <a:noFill/>
+          </a:ln>
         </p:spPr>
+        <p:style>
+          <a:lnRef idx="2">
+            <a:schemeClr val="accent1">
+              <a:shade val="50000"/>
+            </a:schemeClr>
+          </a:lnRef>
+          <a:fillRef idx="1">
+            <a:schemeClr val="accent1"/>
+          </a:fillRef>
+          <a:effectRef idx="0">
+            <a:schemeClr val="accent1"/>
+          </a:effectRef>
+          <a:fontRef idx="minor">
+            <a:schemeClr val="lt1"/>
+          </a:fontRef>
+        </p:style>
         <p:txBody>
-          <a:bodyPr vert="horz" wrap="square" lIns="91440" tIns="45720" rIns="91440" bIns="45720" rtlCol="0" anchor="t">
-            <a:noAutofit/>
-          </a:bodyPr>
+          <a:bodyPr rtlCol="0" anchor="ctr"/>
           <a:lstStyle/>
           <a:p>
-            <a:r>
-              <a:rPr lang="en-US" sz="1200" dirty="0">
-                <a:solidFill>
-                  <a:schemeClr val="tx1">
-                    <a:lumMod val="50000"/>
-                    <a:lumOff val="50000"/>
-                  </a:schemeClr>
-                </a:solidFill>
-              </a:rPr>
-              <a:t>* To get results on violations or critical violations on a specific metrics, add the axis “METRICS=M” where M is a metric id from quality model (</a:t>
-            </a:r>
-            <a:r>
-              <a:rPr lang="en-US" sz="1200" dirty="0" err="1">
-                <a:solidFill>
-                  <a:schemeClr val="tx1">
-                    <a:lumMod val="50000"/>
-                    <a:lumOff val="50000"/>
-                  </a:schemeClr>
-                </a:solidFill>
-              </a:rPr>
-              <a:t>eg</a:t>
-            </a:r>
-            <a:r>
-              <a:rPr lang="en-US" sz="1200" dirty="0">
-                <a:solidFill>
-                  <a:schemeClr val="tx1">
-                    <a:lumMod val="50000"/>
-                    <a:lumOff val="50000"/>
-                  </a:schemeClr>
-                </a:solidFill>
-              </a:rPr>
-              <a:t> slide 6)</a:t>
-            </a:r>
-          </a:p>
-        </p:txBody>
-      </p:sp>
-      <p:sp>
-        <p:nvSpPr>
-          <p:cNvPr id="47" name="Text Placeholder 7"/>
-          <p:cNvSpPr txBox="1">
-            <a:spLocks/>
-          </p:cNvSpPr>
-          <p:nvPr/>
-        </p:nvSpPr>
-        <p:spPr>
-          <a:xfrm>
-            <a:off x="3488443" y="1333500"/>
-            <a:ext cx="2790752" cy="4351338"/>
-          </a:xfrm>
-          <a:prstGeom prst="rect">
-            <a:avLst/>
-          </a:prstGeom>
-        </p:spPr>
-        <p:txBody>
-          <a:bodyPr vert="horz" lIns="91440" tIns="45720" rIns="91440" bIns="45720" rtlCol="0">
-            <a:normAutofit/>
-          </a:bodyPr>
-          <a:lstStyle>
-            <a:lvl1pPr marL="285750" indent="-285750" algn="l" defTabSz="457200" rtl="0" eaLnBrk="1" latinLnBrk="0" hangingPunct="1">
-              <a:lnSpc>
-                <a:spcPct val="100000"/>
-              </a:lnSpc>
-              <a:spcBef>
-                <a:spcPts val="1200"/>
-              </a:spcBef>
-              <a:buFont typeface="Arial" panose="020B0604020202020204" pitchFamily="34" charset="0"/>
-              <a:buChar char="•"/>
-              <a:defRPr sz="1800" kern="1200">
-                <a:solidFill>
-                  <a:schemeClr val="tx1"/>
-                </a:solidFill>
-                <a:latin typeface="+mn-lt"/>
-                <a:ea typeface="+mn-ea"/>
-                <a:cs typeface="+mn-cs"/>
-              </a:defRPr>
-            </a:lvl1pPr>
-            <a:lvl2pPr marL="685800" indent="-228600" algn="l" defTabSz="457200" rtl="0" eaLnBrk="1" latinLnBrk="0" hangingPunct="1">
-              <a:lnSpc>
-                <a:spcPct val="100000"/>
-              </a:lnSpc>
-              <a:spcBef>
-                <a:spcPts val="600"/>
-              </a:spcBef>
-              <a:buFont typeface="Arial" panose="020B0604020202020204" pitchFamily="34" charset="0"/>
-              <a:buChar char="−"/>
-              <a:defRPr sz="1800" kern="1200">
-                <a:solidFill>
-                  <a:schemeClr val="tx1"/>
-                </a:solidFill>
-                <a:latin typeface="+mn-lt"/>
-                <a:ea typeface="+mn-ea"/>
-                <a:cs typeface="+mn-cs"/>
-              </a:defRPr>
-            </a:lvl2pPr>
-            <a:lvl3pPr marL="1143000" indent="-228600" algn="l" defTabSz="457200" rtl="0" eaLnBrk="1" latinLnBrk="0" hangingPunct="1">
-              <a:lnSpc>
-                <a:spcPct val="100000"/>
-              </a:lnSpc>
-              <a:spcBef>
-                <a:spcPts val="600"/>
-              </a:spcBef>
-              <a:buFont typeface="Courier New" panose="02070309020205020404" pitchFamily="49" charset="0"/>
-              <a:buChar char="o"/>
-              <a:defRPr sz="1800" kern="1200">
-                <a:solidFill>
-                  <a:schemeClr val="tx1"/>
-                </a:solidFill>
-                <a:latin typeface="+mn-lt"/>
-                <a:ea typeface="+mn-ea"/>
-                <a:cs typeface="+mn-cs"/>
-              </a:defRPr>
-            </a:lvl3pPr>
-            <a:lvl4pPr marL="1600200" indent="-228600" algn="l" defTabSz="457200" rtl="0" eaLnBrk="1" latinLnBrk="0" hangingPunct="1">
-              <a:lnSpc>
-                <a:spcPct val="100000"/>
-              </a:lnSpc>
-              <a:spcBef>
-                <a:spcPts val="600"/>
-              </a:spcBef>
-              <a:buFont typeface="Wingdings" panose="05000000000000000000" pitchFamily="2" charset="2"/>
-              <a:buChar char="§"/>
-              <a:defRPr sz="1800" kern="1200">
-                <a:solidFill>
-                  <a:schemeClr val="tx1"/>
-                </a:solidFill>
-                <a:latin typeface="+mn-lt"/>
-                <a:ea typeface="+mn-ea"/>
-                <a:cs typeface="+mn-cs"/>
-              </a:defRPr>
-            </a:lvl4pPr>
-            <a:lvl5pPr marL="2057400" indent="-228600" algn="l" defTabSz="457200" rtl="0" eaLnBrk="1" latinLnBrk="0" hangingPunct="1">
-              <a:lnSpc>
-                <a:spcPct val="100000"/>
-              </a:lnSpc>
-              <a:spcBef>
-                <a:spcPts val="600"/>
-              </a:spcBef>
-              <a:buFont typeface="Wingdings" charset="2"/>
-              <a:buChar char="§"/>
-              <a:defRPr sz="1800" kern="1200">
-                <a:solidFill>
-                  <a:schemeClr val="tx1"/>
-                </a:solidFill>
-                <a:latin typeface="+mn-lt"/>
-                <a:ea typeface="+mn-ea"/>
-                <a:cs typeface="+mn-cs"/>
-              </a:defRPr>
-            </a:lvl5pPr>
-            <a:lvl6pPr marL="2514600" indent="-228600" algn="l" defTabSz="914400" rtl="0" eaLnBrk="1" latinLnBrk="0" hangingPunct="1">
-              <a:lnSpc>
-                <a:spcPct val="90000"/>
-              </a:lnSpc>
-              <a:spcBef>
-                <a:spcPts val="500"/>
-              </a:spcBef>
-              <a:buFont typeface="Arial"/>
-              <a:buChar char="•"/>
-              <a:defRPr sz="1800" kern="1200">
-                <a:solidFill>
-                  <a:schemeClr val="tx1"/>
-                </a:solidFill>
-                <a:latin typeface="+mn-lt"/>
-                <a:ea typeface="+mn-ea"/>
-                <a:cs typeface="+mn-cs"/>
-              </a:defRPr>
-            </a:lvl6pPr>
-            <a:lvl7pPr marL="2971800" indent="-228600" algn="l" defTabSz="914400" rtl="0" eaLnBrk="1" latinLnBrk="0" hangingPunct="1">
-              <a:lnSpc>
-                <a:spcPct val="90000"/>
-              </a:lnSpc>
-              <a:spcBef>
-                <a:spcPts val="500"/>
-              </a:spcBef>
-              <a:buFont typeface="Arial"/>
-              <a:buChar char="•"/>
-              <a:defRPr sz="1800" kern="1200">
-                <a:solidFill>
-                  <a:schemeClr val="tx1"/>
-                </a:solidFill>
-                <a:latin typeface="+mn-lt"/>
-                <a:ea typeface="+mn-ea"/>
-                <a:cs typeface="+mn-cs"/>
-              </a:defRPr>
-            </a:lvl7pPr>
-            <a:lvl8pPr marL="3429000" indent="-228600" algn="l" defTabSz="914400" rtl="0" eaLnBrk="1" latinLnBrk="0" hangingPunct="1">
-              <a:lnSpc>
-                <a:spcPct val="90000"/>
-              </a:lnSpc>
-              <a:spcBef>
-                <a:spcPts val="500"/>
-              </a:spcBef>
-              <a:buFont typeface="Arial"/>
-              <a:buChar char="•"/>
-              <a:defRPr sz="1800" kern="1200">
-                <a:solidFill>
-                  <a:schemeClr val="tx1"/>
-                </a:solidFill>
-                <a:latin typeface="+mn-lt"/>
-                <a:ea typeface="+mn-ea"/>
-                <a:cs typeface="+mn-cs"/>
-              </a:defRPr>
-            </a:lvl8pPr>
-            <a:lvl9pPr marL="3886200" indent="-228600" algn="l" defTabSz="914400" rtl="0" eaLnBrk="1" latinLnBrk="0" hangingPunct="1">
-              <a:lnSpc>
-                <a:spcPct val="90000"/>
-              </a:lnSpc>
-              <a:spcBef>
-                <a:spcPts val="500"/>
-              </a:spcBef>
-              <a:buFont typeface="Arial"/>
-              <a:buChar char="•"/>
-              <a:defRPr sz="1800" kern="1200">
-                <a:solidFill>
-                  <a:schemeClr val="tx1"/>
-                </a:solidFill>
-                <a:latin typeface="+mn-lt"/>
-                <a:ea typeface="+mn-ea"/>
-                <a:cs typeface="+mn-cs"/>
-              </a:defRPr>
-            </a:lvl9pPr>
-          </a:lstStyle>
-          <a:p>
-            <a:pPr marL="0" indent="0">
-              <a:buFont typeface="Arial" panose="020B0604020202020204" pitchFamily="34" charset="0"/>
-              <a:buNone/>
-            </a:pPr>
-            <a:r>
-              <a:rPr lang="en-US" dirty="0"/>
-              <a:t>VALUES</a:t>
-            </a:r>
+            <a:pPr algn="ctr"/>
+            <a:r>
+              <a:rPr lang="en-US" sz="1200" dirty="0"/>
+              <a:t>CRITICAL_QUALITY_RULES</a:t>
+            </a:r>
+            <a:endParaRPr lang="en-US" dirty="0"/>
           </a:p>
         </p:txBody>
       </p:sp>

</xml_diff>

<commit_message>
REPORTGEN-277 : improve templates
</commit_message>
<xml_diff>
--- a/CastReporting.Reporting/TemplatesFiles/Generic Graph Definition.pptx
+++ b/CastReporting.Reporting/TemplatesFiles/Generic Graph Definition.pptx
@@ -8932,7 +8932,7 @@
           <a:p>
             <a:fld id="{BE7CF963-E58D-FC4D-BA9E-60A980752DC6}" type="datetimeFigureOut">
               <a:rPr lang="en-US" smtClean="0"/>
-              <a:t>5/2/2017</a:t>
+              <a:t>7/4/2017</a:t>
             </a:fld>
             <a:endParaRPr lang="en-US"/>
           </a:p>
@@ -9421,7 +9421,7 @@
           <a:p>
             <a:fld id="{B590C078-9131-4E49-8A0D-400FEE8377B5}" type="datetimeFigureOut">
               <a:rPr lang="en-US" smtClean="0"/>
-              <a:t>5/2/2017</a:t>
+              <a:t>7/4/2017</a:t>
             </a:fld>
             <a:endParaRPr lang="en-US"/>
           </a:p>
@@ -13006,7 +13006,7 @@
           <a:p>
             <a:fld id="{B590C078-9131-4E49-8A0D-400FEE8377B5}" type="datetimeFigureOut">
               <a:rPr lang="en-US" smtClean="0"/>
-              <a:t>5/2/2017</a:t>
+              <a:t>7/4/2017</a:t>
             </a:fld>
             <a:endParaRPr lang="en-US"/>
           </a:p>
@@ -17084,7 +17084,7 @@
           <a:p>
             <a:fld id="{B590C078-9131-4E49-8A0D-400FEE8377B5}" type="datetimeFigureOut">
               <a:rPr lang="en-US" smtClean="0"/>
-              <a:t>5/2/2017</a:t>
+              <a:t>7/4/2017</a:t>
             </a:fld>
             <a:endParaRPr lang="en-US"/>
           </a:p>
@@ -20909,7 +20909,7 @@
           <a:p>
             <a:fld id="{B590C078-9131-4E49-8A0D-400FEE8377B5}" type="datetimeFigureOut">
               <a:rPr lang="en-US" smtClean="0"/>
-              <a:t>5/2/2017</a:t>
+              <a:t>7/4/2017</a:t>
             </a:fld>
             <a:endParaRPr lang="en-US"/>
           </a:p>
@@ -21525,122 +21525,6 @@
           </a:p>
         </p:txBody>
       </p:sp>
-      <p:sp>
-        <p:nvSpPr>
-          <p:cNvPr id="8" name="Text Placeholder 7"/>
-          <p:cNvSpPr>
-            <a:spLocks noGrp="1"/>
-          </p:cNvSpPr>
-          <p:nvPr>
-            <p:ph type="body" sz="quarter" idx="13"/>
-          </p:nvPr>
-        </p:nvSpPr>
-        <p:spPr>
-          <a:xfrm>
-            <a:off x="248282" y="1333500"/>
-            <a:ext cx="3157161" cy="4351338"/>
-          </a:xfrm>
-        </p:spPr>
-        <p:txBody>
-          <a:bodyPr>
-            <a:normAutofit/>
-          </a:bodyPr>
-          <a:lstStyle/>
-          <a:p>
-            <a:pPr marL="0" indent="0" algn="r">
-              <a:buNone/>
-            </a:pPr>
-            <a:r>
-              <a:rPr lang="en-US" dirty="0"/>
-              <a:t>AXIS</a:t>
-            </a:r>
-          </a:p>
-          <a:p>
-            <a:pPr algn="r"/>
-            <a:r>
-              <a:rPr lang="fr-FR" dirty="0">
-                <a:solidFill>
-                  <a:schemeClr val="accent5">
-                    <a:lumMod val="75000"/>
-                  </a:schemeClr>
-                </a:solidFill>
-              </a:rPr>
-              <a:t>SNAPSHOTS</a:t>
-            </a:r>
-          </a:p>
-          <a:p>
-            <a:pPr algn="r"/>
-            <a:r>
-              <a:rPr lang="fr-FR" dirty="0">
-                <a:solidFill>
-                  <a:schemeClr val="accent2"/>
-                </a:solidFill>
-              </a:rPr>
-              <a:t>METRICS</a:t>
-            </a:r>
-          </a:p>
-          <a:p>
-            <a:pPr algn="r"/>
-            <a:endParaRPr lang="fr-FR" dirty="0">
-              <a:solidFill>
-                <a:schemeClr val="accent3"/>
-              </a:solidFill>
-            </a:endParaRPr>
-          </a:p>
-          <a:p>
-            <a:pPr algn="r"/>
-            <a:endParaRPr lang="fr-FR" dirty="0">
-              <a:solidFill>
-                <a:schemeClr val="accent3"/>
-              </a:solidFill>
-            </a:endParaRPr>
-          </a:p>
-          <a:p>
-            <a:pPr algn="r"/>
-            <a:r>
-              <a:rPr lang="fr-FR" dirty="0">
-                <a:solidFill>
-                  <a:schemeClr val="accent3"/>
-                </a:solidFill>
-              </a:rPr>
-              <a:t>MODULES</a:t>
-            </a:r>
-          </a:p>
-          <a:p>
-            <a:pPr algn="r"/>
-            <a:r>
-              <a:rPr lang="fr-FR" dirty="0">
-                <a:solidFill>
-                  <a:schemeClr val="accent6"/>
-                </a:solidFill>
-              </a:rPr>
-              <a:t>TECHNOLOGIES</a:t>
-            </a:r>
-          </a:p>
-          <a:p>
-            <a:pPr algn="r"/>
-            <a:r>
-              <a:rPr lang="fr-FR" dirty="0">
-                <a:solidFill>
-                  <a:srgbClr val="00B0F0"/>
-                </a:solidFill>
-              </a:rPr>
-              <a:t>VIOLATIONS *</a:t>
-            </a:r>
-          </a:p>
-          <a:p>
-            <a:pPr algn="r"/>
-            <a:r>
-              <a:rPr lang="fr-FR" dirty="0">
-                <a:solidFill>
-                  <a:schemeClr val="accent1"/>
-                </a:solidFill>
-              </a:rPr>
-              <a:t>CRITICAL VIOLATIONS *</a:t>
-            </a:r>
-          </a:p>
-        </p:txBody>
-      </p:sp>
       <p:pic>
         <p:nvPicPr>
           <p:cNvPr id="12" name="Picture 11"/>
@@ -21673,13 +21557,210 @@
       </p:pic>
       <p:sp>
         <p:nvSpPr>
-          <p:cNvPr id="4" name="Rectangle: Rounded Corners 3"/>
+          <p:cNvPr id="46" name="TextBox 45"/>
+          <p:cNvSpPr txBox="1"/>
+          <p:nvPr/>
+        </p:nvSpPr>
+        <p:spPr>
+          <a:xfrm>
+            <a:off x="726141" y="6257364"/>
+            <a:ext cx="10703859" cy="367553"/>
+          </a:xfrm>
+          <a:prstGeom prst="rect">
+            <a:avLst/>
+          </a:prstGeom>
+        </p:spPr>
+        <p:txBody>
+          <a:bodyPr vert="horz" wrap="square" lIns="91440" tIns="45720" rIns="91440" bIns="45720" rtlCol="0" anchor="t">
+            <a:noAutofit/>
+          </a:bodyPr>
+          <a:lstStyle/>
+          <a:p>
+            <a:r>
+              <a:rPr lang="en-US" sz="1200" dirty="0">
+                <a:solidFill>
+                  <a:schemeClr val="tx1">
+                    <a:lumMod val="50000"/>
+                    <a:lumOff val="50000"/>
+                  </a:schemeClr>
+                </a:solidFill>
+              </a:rPr>
+              <a:t>* To get results on violations or critical violations on a specific metrics, add the axis “METRICS=M” where M is a metric id from quality model (</a:t>
+            </a:r>
+            <a:r>
+              <a:rPr lang="en-US" sz="1200" dirty="0" err="1">
+                <a:solidFill>
+                  <a:schemeClr val="tx1">
+                    <a:lumMod val="50000"/>
+                    <a:lumOff val="50000"/>
+                  </a:schemeClr>
+                </a:solidFill>
+              </a:rPr>
+              <a:t>eg</a:t>
+            </a:r>
+            <a:r>
+              <a:rPr lang="en-US" sz="1200" dirty="0">
+                <a:solidFill>
+                  <a:schemeClr val="tx1">
+                    <a:lumMod val="50000"/>
+                    <a:lumOff val="50000"/>
+                  </a:schemeClr>
+                </a:solidFill>
+              </a:rPr>
+              <a:t> slide 6)</a:t>
+            </a:r>
+          </a:p>
+        </p:txBody>
+      </p:sp>
+      <p:sp>
+        <p:nvSpPr>
+          <p:cNvPr id="78" name="Text Placeholder 7">
+            <a:extLst>
+              <a:ext uri="{FF2B5EF4-FFF2-40B4-BE49-F238E27FC236}">
+                <a16:creationId xmlns:a16="http://schemas.microsoft.com/office/drawing/2014/main" id="{80A017E8-33DB-41EC-AE7A-579049F6551F}"/>
+              </a:ext>
+            </a:extLst>
+          </p:cNvPr>
+          <p:cNvSpPr>
+            <a:spLocks noGrp="1"/>
+          </p:cNvSpPr>
+          <p:nvPr>
+            <p:ph type="body" sz="quarter" idx="13"/>
+          </p:nvPr>
+        </p:nvSpPr>
+        <p:spPr>
+          <a:xfrm>
+            <a:off x="328706" y="1333500"/>
+            <a:ext cx="11253694" cy="4351338"/>
+          </a:xfrm>
+        </p:spPr>
+        <p:txBody>
+          <a:bodyPr>
+            <a:normAutofit/>
+          </a:bodyPr>
+          <a:lstStyle/>
+          <a:p>
+            <a:pPr marL="0" indent="0">
+              <a:buNone/>
+            </a:pPr>
+            <a:r>
+              <a:rPr lang="en-US" dirty="0"/>
+              <a:t>AXIS					VALUES</a:t>
+            </a:r>
+          </a:p>
+          <a:p>
+            <a:r>
+              <a:rPr lang="fr-FR" dirty="0">
+                <a:solidFill>
+                  <a:schemeClr val="accent5">
+                    <a:lumMod val="75000"/>
+                  </a:schemeClr>
+                </a:solidFill>
+              </a:rPr>
+              <a:t>SNAPSHOTS</a:t>
+            </a:r>
+          </a:p>
+          <a:p>
+            <a:r>
+              <a:rPr lang="fr-FR" dirty="0">
+                <a:solidFill>
+                  <a:schemeClr val="accent2"/>
+                </a:solidFill>
+              </a:rPr>
+              <a:t>METRICS</a:t>
+            </a:r>
+          </a:p>
+          <a:p>
+            <a:endParaRPr lang="fr-FR" dirty="0">
+              <a:solidFill>
+                <a:schemeClr val="accent3"/>
+              </a:solidFill>
+            </a:endParaRPr>
+          </a:p>
+          <a:p>
+            <a:endParaRPr lang="fr-FR" dirty="0">
+              <a:solidFill>
+                <a:schemeClr val="accent3"/>
+              </a:solidFill>
+            </a:endParaRPr>
+          </a:p>
+          <a:p>
+            <a:endParaRPr lang="fr-FR" dirty="0">
+              <a:solidFill>
+                <a:schemeClr val="accent3"/>
+              </a:solidFill>
+            </a:endParaRPr>
+          </a:p>
+          <a:p>
+            <a:r>
+              <a:rPr lang="fr-FR" dirty="0">
+                <a:solidFill>
+                  <a:schemeClr val="accent3"/>
+                </a:solidFill>
+              </a:rPr>
+              <a:t>MODULES</a:t>
+            </a:r>
+          </a:p>
+          <a:p>
+            <a:r>
+              <a:rPr lang="fr-FR" dirty="0">
+                <a:solidFill>
+                  <a:schemeClr val="accent6"/>
+                </a:solidFill>
+              </a:rPr>
+              <a:t>TECHNOLOGIES</a:t>
+            </a:r>
+          </a:p>
+          <a:p>
+            <a:r>
+              <a:rPr lang="fr-FR" dirty="0">
+                <a:solidFill>
+                  <a:srgbClr val="00B0F0"/>
+                </a:solidFill>
+              </a:rPr>
+              <a:t>VIOLATIONS *</a:t>
+            </a:r>
+          </a:p>
+          <a:p>
+            <a:r>
+              <a:rPr lang="fr-FR" dirty="0">
+                <a:solidFill>
+                  <a:schemeClr val="accent1"/>
+                </a:solidFill>
+              </a:rPr>
+              <a:t>CRITICAL</a:t>
+            </a:r>
+            <a:r>
+              <a:rPr lang="fr-FR">
+                <a:solidFill>
+                  <a:schemeClr val="accent1"/>
+                </a:solidFill>
+              </a:rPr>
+              <a:t>_VIOLATIONS *</a:t>
+            </a:r>
+            <a:endParaRPr lang="fr-FR" dirty="0">
+              <a:solidFill>
+                <a:schemeClr val="accent1"/>
+              </a:solidFill>
+            </a:endParaRPr>
+          </a:p>
+        </p:txBody>
+      </p:sp>
+      <p:sp>
+        <p:nvSpPr>
+          <p:cNvPr id="79" name="Rectangle: Rounded Corners 78">
+            <a:extLst>
+              <a:ext uri="{FF2B5EF4-FFF2-40B4-BE49-F238E27FC236}">
+                <a16:creationId xmlns:a16="http://schemas.microsoft.com/office/drawing/2014/main" id="{6E8B87D7-9672-4F2D-B43F-5595AB3F26D2}"/>
+              </a:ext>
+            </a:extLst>
+          </p:cNvPr>
           <p:cNvSpPr/>
           <p:nvPr/>
         </p:nvSpPr>
         <p:spPr>
           <a:xfrm>
-            <a:off x="3555448" y="1767155"/>
+            <a:off x="3477775" y="1767155"/>
             <a:ext cx="998420" cy="322080"/>
           </a:xfrm>
           <a:prstGeom prst="roundRect">
@@ -21725,13 +21806,19 @@
       </p:sp>
       <p:sp>
         <p:nvSpPr>
-          <p:cNvPr id="14" name="Rectangle: Rounded Corners 13"/>
+          <p:cNvPr id="80" name="Rectangle: Rounded Corners 79">
+            <a:extLst>
+              <a:ext uri="{FF2B5EF4-FFF2-40B4-BE49-F238E27FC236}">
+                <a16:creationId xmlns:a16="http://schemas.microsoft.com/office/drawing/2014/main" id="{3EAB9C92-F859-404A-93E3-CD517D6F3A04}"/>
+              </a:ext>
+            </a:extLst>
+          </p:cNvPr>
           <p:cNvSpPr/>
           <p:nvPr/>
         </p:nvSpPr>
         <p:spPr>
           <a:xfrm>
-            <a:off x="4618330" y="1767155"/>
+            <a:off x="4540657" y="1767155"/>
             <a:ext cx="1102877" cy="322080"/>
           </a:xfrm>
           <a:prstGeom prst="roundRect">
@@ -21777,13 +21864,19 @@
       </p:sp>
       <p:sp>
         <p:nvSpPr>
-          <p:cNvPr id="15" name="Rectangle: Rounded Corners 14"/>
+          <p:cNvPr id="81" name="Rectangle: Rounded Corners 80">
+            <a:extLst>
+              <a:ext uri="{FF2B5EF4-FFF2-40B4-BE49-F238E27FC236}">
+                <a16:creationId xmlns:a16="http://schemas.microsoft.com/office/drawing/2014/main" id="{30A1E25A-633F-4213-9AFC-C65F1F14D91A}"/>
+              </a:ext>
+            </a:extLst>
+          </p:cNvPr>
           <p:cNvSpPr/>
           <p:nvPr/>
         </p:nvSpPr>
         <p:spPr>
           <a:xfrm>
-            <a:off x="5785669" y="1767155"/>
+            <a:off x="5707996" y="1767155"/>
             <a:ext cx="719193" cy="322080"/>
           </a:xfrm>
           <a:prstGeom prst="roundRect">
@@ -21829,13 +21922,19 @@
       </p:sp>
       <p:sp>
         <p:nvSpPr>
-          <p:cNvPr id="16" name="Rectangle: Rounded Corners 15"/>
+          <p:cNvPr id="82" name="Rectangle: Rounded Corners 81">
+            <a:extLst>
+              <a:ext uri="{FF2B5EF4-FFF2-40B4-BE49-F238E27FC236}">
+                <a16:creationId xmlns:a16="http://schemas.microsoft.com/office/drawing/2014/main" id="{4E4267A8-32FB-43E5-B770-A93DEECEAF01}"/>
+              </a:ext>
+            </a:extLst>
+          </p:cNvPr>
           <p:cNvSpPr/>
           <p:nvPr/>
         </p:nvSpPr>
         <p:spPr>
           <a:xfrm>
-            <a:off x="6569324" y="1767155"/>
+            <a:off x="6491651" y="1767155"/>
             <a:ext cx="1510302" cy="322080"/>
           </a:xfrm>
           <a:prstGeom prst="roundRect">
@@ -21881,13 +21980,19 @@
       </p:sp>
       <p:sp>
         <p:nvSpPr>
-          <p:cNvPr id="17" name="Rectangle: Rounded Corners 16"/>
+          <p:cNvPr id="83" name="Rectangle: Rounded Corners 82">
+            <a:extLst>
+              <a:ext uri="{FF2B5EF4-FFF2-40B4-BE49-F238E27FC236}">
+                <a16:creationId xmlns:a16="http://schemas.microsoft.com/office/drawing/2014/main" id="{37232080-FB84-4CD3-B308-5466BF6CA5D4}"/>
+              </a:ext>
+            </a:extLst>
+          </p:cNvPr>
           <p:cNvSpPr/>
           <p:nvPr/>
         </p:nvSpPr>
         <p:spPr>
           <a:xfrm>
-            <a:off x="8144088" y="1767155"/>
+            <a:off x="8066415" y="1767155"/>
             <a:ext cx="539991" cy="322080"/>
           </a:xfrm>
           <a:prstGeom prst="roundRect">
@@ -21933,13 +22038,19 @@
       </p:sp>
       <p:sp>
         <p:nvSpPr>
-          <p:cNvPr id="18" name="Rectangle: Rounded Corners 17"/>
+          <p:cNvPr id="84" name="Rectangle: Rounded Corners 83">
+            <a:extLst>
+              <a:ext uri="{FF2B5EF4-FFF2-40B4-BE49-F238E27FC236}">
+                <a16:creationId xmlns:a16="http://schemas.microsoft.com/office/drawing/2014/main" id="{42432481-377F-47D3-AB95-6ADCE249D7AF}"/>
+              </a:ext>
+            </a:extLst>
+          </p:cNvPr>
           <p:cNvSpPr/>
           <p:nvPr/>
         </p:nvSpPr>
         <p:spPr>
           <a:xfrm>
-            <a:off x="3571212" y="2203333"/>
+            <a:off x="3493539" y="2203333"/>
             <a:ext cx="560589" cy="322080"/>
           </a:xfrm>
           <a:prstGeom prst="roundRect">
@@ -21983,13 +22094,19 @@
       </p:sp>
       <p:sp>
         <p:nvSpPr>
-          <p:cNvPr id="19" name="Rectangle: Rounded Corners 18"/>
+          <p:cNvPr id="85" name="Rectangle: Rounded Corners 84">
+            <a:extLst>
+              <a:ext uri="{FF2B5EF4-FFF2-40B4-BE49-F238E27FC236}">
+                <a16:creationId xmlns:a16="http://schemas.microsoft.com/office/drawing/2014/main" id="{757AA775-0A19-4D90-AAE6-B71F47E08E16}"/>
+              </a:ext>
+            </a:extLst>
+          </p:cNvPr>
           <p:cNvSpPr/>
           <p:nvPr/>
         </p:nvSpPr>
         <p:spPr>
           <a:xfrm>
-            <a:off x="4199285" y="2203333"/>
+            <a:off x="4121612" y="2203333"/>
             <a:ext cx="1540708" cy="322080"/>
           </a:xfrm>
           <a:prstGeom prst="roundRect">
@@ -22033,13 +22150,19 @@
       </p:sp>
       <p:sp>
         <p:nvSpPr>
-          <p:cNvPr id="20" name="Rectangle: Rounded Corners 19"/>
+          <p:cNvPr id="86" name="Rectangle: Rounded Corners 85">
+            <a:extLst>
+              <a:ext uri="{FF2B5EF4-FFF2-40B4-BE49-F238E27FC236}">
+                <a16:creationId xmlns:a16="http://schemas.microsoft.com/office/drawing/2014/main" id="{B16D7162-1C5E-4F2D-B4D9-3DF736727E59}"/>
+              </a:ext>
+            </a:extLst>
+          </p:cNvPr>
           <p:cNvSpPr/>
           <p:nvPr/>
         </p:nvSpPr>
         <p:spPr>
           <a:xfrm>
-            <a:off x="5807477" y="2203333"/>
+            <a:off x="5729804" y="2203333"/>
             <a:ext cx="1790858" cy="322080"/>
           </a:xfrm>
           <a:prstGeom prst="roundRect">
@@ -22083,13 +22206,19 @@
       </p:sp>
       <p:sp>
         <p:nvSpPr>
-          <p:cNvPr id="21" name="Rectangle: Rounded Corners 20"/>
+          <p:cNvPr id="87" name="Rectangle: Rounded Corners 86">
+            <a:extLst>
+              <a:ext uri="{FF2B5EF4-FFF2-40B4-BE49-F238E27FC236}">
+                <a16:creationId xmlns:a16="http://schemas.microsoft.com/office/drawing/2014/main" id="{54AF79F4-FBBC-427E-AF8B-0132AD716EAF}"/>
+              </a:ext>
+            </a:extLst>
+          </p:cNvPr>
           <p:cNvSpPr/>
           <p:nvPr/>
         </p:nvSpPr>
         <p:spPr>
           <a:xfrm>
-            <a:off x="7665819" y="2203333"/>
+            <a:off x="7588146" y="2203333"/>
             <a:ext cx="1887485" cy="322080"/>
           </a:xfrm>
           <a:prstGeom prst="roundRect">
@@ -22133,13 +22262,19 @@
       </p:sp>
       <p:sp>
         <p:nvSpPr>
-          <p:cNvPr id="22" name="Rectangle: Rounded Corners 21"/>
+          <p:cNvPr id="88" name="Rectangle: Rounded Corners 87">
+            <a:extLst>
+              <a:ext uri="{FF2B5EF4-FFF2-40B4-BE49-F238E27FC236}">
+                <a16:creationId xmlns:a16="http://schemas.microsoft.com/office/drawing/2014/main" id="{20439B51-02B3-46C4-BE31-E104F5532CB1}"/>
+              </a:ext>
+            </a:extLst>
+          </p:cNvPr>
           <p:cNvSpPr/>
           <p:nvPr/>
         </p:nvSpPr>
         <p:spPr>
           <a:xfrm>
-            <a:off x="9620788" y="2203333"/>
+            <a:off x="3505085" y="2639376"/>
             <a:ext cx="1500390" cy="322080"/>
           </a:xfrm>
           <a:prstGeom prst="roundRect">
@@ -22183,13 +22318,19 @@
       </p:sp>
       <p:sp>
         <p:nvSpPr>
-          <p:cNvPr id="28" name="Rectangle: Rounded Corners 27"/>
+          <p:cNvPr id="89" name="Rectangle: Rounded Corners 88">
+            <a:extLst>
+              <a:ext uri="{FF2B5EF4-FFF2-40B4-BE49-F238E27FC236}">
+                <a16:creationId xmlns:a16="http://schemas.microsoft.com/office/drawing/2014/main" id="{FD68F2ED-20F6-4E64-9F72-DE4D9EB81091}"/>
+              </a:ext>
+            </a:extLst>
+          </p:cNvPr>
           <p:cNvSpPr/>
           <p:nvPr/>
         </p:nvSpPr>
         <p:spPr>
           <a:xfrm>
-            <a:off x="3571212" y="2607980"/>
+            <a:off x="3505706" y="3074009"/>
             <a:ext cx="1769278" cy="322080"/>
           </a:xfrm>
           <a:prstGeom prst="roundRect">
@@ -22233,13 +22374,19 @@
       </p:sp>
       <p:sp>
         <p:nvSpPr>
-          <p:cNvPr id="29" name="Rectangle: Rounded Corners 28"/>
+          <p:cNvPr id="90" name="Rectangle: Rounded Corners 89">
+            <a:extLst>
+              <a:ext uri="{FF2B5EF4-FFF2-40B4-BE49-F238E27FC236}">
+                <a16:creationId xmlns:a16="http://schemas.microsoft.com/office/drawing/2014/main" id="{27EA5D50-65CA-4F98-A47C-52B1C6490B2F}"/>
+              </a:ext>
+            </a:extLst>
+          </p:cNvPr>
           <p:cNvSpPr/>
           <p:nvPr/>
         </p:nvSpPr>
         <p:spPr>
           <a:xfrm>
-            <a:off x="5401835" y="2607980"/>
+            <a:off x="5336329" y="3074009"/>
             <a:ext cx="1913713" cy="322080"/>
           </a:xfrm>
           <a:prstGeom prst="roundRect">
@@ -22283,13 +22430,19 @@
       </p:sp>
       <p:sp>
         <p:nvSpPr>
-          <p:cNvPr id="30" name="Rectangle: Rounded Corners 29"/>
+          <p:cNvPr id="91" name="Rectangle: Rounded Corners 90">
+            <a:extLst>
+              <a:ext uri="{FF2B5EF4-FFF2-40B4-BE49-F238E27FC236}">
+                <a16:creationId xmlns:a16="http://schemas.microsoft.com/office/drawing/2014/main" id="{05E700DC-47B1-40D3-BC32-A4D061685618}"/>
+              </a:ext>
+            </a:extLst>
+          </p:cNvPr>
           <p:cNvSpPr/>
           <p:nvPr/>
         </p:nvSpPr>
         <p:spPr>
           <a:xfrm>
-            <a:off x="7376893" y="2607980"/>
+            <a:off x="7311387" y="3074009"/>
             <a:ext cx="1608804" cy="322080"/>
           </a:xfrm>
           <a:prstGeom prst="roundRect">
@@ -22333,13 +22486,19 @@
       </p:sp>
       <p:sp>
         <p:nvSpPr>
-          <p:cNvPr id="31" name="Rectangle: Rounded Corners 30"/>
+          <p:cNvPr id="92" name="Rectangle: Rounded Corners 91">
+            <a:extLst>
+              <a:ext uri="{FF2B5EF4-FFF2-40B4-BE49-F238E27FC236}">
+                <a16:creationId xmlns:a16="http://schemas.microsoft.com/office/drawing/2014/main" id="{F8B2B9A8-84CB-437A-A734-C7F9A7A53841}"/>
+              </a:ext>
+            </a:extLst>
+          </p:cNvPr>
           <p:cNvSpPr/>
           <p:nvPr/>
         </p:nvSpPr>
         <p:spPr>
           <a:xfrm>
-            <a:off x="9047042" y="2607980"/>
+            <a:off x="8981536" y="3074009"/>
             <a:ext cx="1064968" cy="322080"/>
           </a:xfrm>
           <a:prstGeom prst="roundRect">
@@ -22383,13 +22542,19 @@
       </p:sp>
       <p:sp>
         <p:nvSpPr>
-          <p:cNvPr id="32" name="Rectangle: Rounded Corners 31"/>
+          <p:cNvPr id="93" name="Rectangle: Rounded Corners 92">
+            <a:extLst>
+              <a:ext uri="{FF2B5EF4-FFF2-40B4-BE49-F238E27FC236}">
+                <a16:creationId xmlns:a16="http://schemas.microsoft.com/office/drawing/2014/main" id="{5B5D7B95-9610-480E-8B66-273596C5A78C}"/>
+              </a:ext>
+            </a:extLst>
+          </p:cNvPr>
           <p:cNvSpPr/>
           <p:nvPr/>
         </p:nvSpPr>
         <p:spPr>
           <a:xfrm>
-            <a:off x="10173354" y="2607980"/>
+            <a:off x="10107848" y="3074009"/>
             <a:ext cx="1813035" cy="322080"/>
           </a:xfrm>
           <a:prstGeom prst="roundRect">
@@ -22433,13 +22598,19 @@
       </p:sp>
       <p:sp>
         <p:nvSpPr>
-          <p:cNvPr id="33" name="Rectangle: Rounded Corners 32"/>
+          <p:cNvPr id="94" name="Rectangle: Rounded Corners 93">
+            <a:extLst>
+              <a:ext uri="{FF2B5EF4-FFF2-40B4-BE49-F238E27FC236}">
+                <a16:creationId xmlns:a16="http://schemas.microsoft.com/office/drawing/2014/main" id="{B331BD88-E1A4-4529-B289-E70E95DAC8BC}"/>
+              </a:ext>
+            </a:extLst>
+          </p:cNvPr>
           <p:cNvSpPr/>
           <p:nvPr/>
         </p:nvSpPr>
         <p:spPr>
           <a:xfrm>
-            <a:off x="3571212" y="3020811"/>
+            <a:off x="3505706" y="3486840"/>
             <a:ext cx="1064968" cy="322080"/>
           </a:xfrm>
           <a:prstGeom prst="roundRect">
@@ -22483,13 +22654,19 @@
       </p:sp>
       <p:sp>
         <p:nvSpPr>
-          <p:cNvPr id="34" name="Rectangle: Rounded Corners 33"/>
+          <p:cNvPr id="95" name="Rectangle: Rounded Corners 94">
+            <a:extLst>
+              <a:ext uri="{FF2B5EF4-FFF2-40B4-BE49-F238E27FC236}">
+                <a16:creationId xmlns:a16="http://schemas.microsoft.com/office/drawing/2014/main" id="{E3243A06-0F4F-49B9-8868-0D08F048E206}"/>
+              </a:ext>
+            </a:extLst>
+          </p:cNvPr>
           <p:cNvSpPr/>
           <p:nvPr/>
         </p:nvSpPr>
         <p:spPr>
           <a:xfrm>
-            <a:off x="3574234" y="3507907"/>
+            <a:off x="3502534" y="3978678"/>
             <a:ext cx="998420" cy="322080"/>
           </a:xfrm>
           <a:prstGeom prst="roundRect">
@@ -22533,13 +22710,19 @@
       </p:sp>
       <p:sp>
         <p:nvSpPr>
-          <p:cNvPr id="35" name="Rectangle: Rounded Corners 34"/>
+          <p:cNvPr id="96" name="Rectangle: Rounded Corners 95">
+            <a:extLst>
+              <a:ext uri="{FF2B5EF4-FFF2-40B4-BE49-F238E27FC236}">
+                <a16:creationId xmlns:a16="http://schemas.microsoft.com/office/drawing/2014/main" id="{43E95E54-B0B3-4879-A37D-9FA81C9D2711}"/>
+              </a:ext>
+            </a:extLst>
+          </p:cNvPr>
           <p:cNvSpPr/>
           <p:nvPr/>
         </p:nvSpPr>
         <p:spPr>
           <a:xfrm>
-            <a:off x="4637116" y="3507907"/>
+            <a:off x="4565416" y="3978678"/>
             <a:ext cx="524699" cy="322080"/>
           </a:xfrm>
           <a:prstGeom prst="roundRect">
@@ -22583,13 +22766,19 @@
       </p:sp>
       <p:sp>
         <p:nvSpPr>
-          <p:cNvPr id="36" name="Rectangle: Rounded Corners 35"/>
+          <p:cNvPr id="97" name="Rectangle: Rounded Corners 96">
+            <a:extLst>
+              <a:ext uri="{FF2B5EF4-FFF2-40B4-BE49-F238E27FC236}">
+                <a16:creationId xmlns:a16="http://schemas.microsoft.com/office/drawing/2014/main" id="{0A64C557-7AFB-43E7-A7DA-F16DEC5B8D52}"/>
+              </a:ext>
+            </a:extLst>
+          </p:cNvPr>
           <p:cNvSpPr/>
           <p:nvPr/>
         </p:nvSpPr>
         <p:spPr>
           <a:xfrm>
-            <a:off x="3579492" y="3912554"/>
+            <a:off x="3507792" y="4383325"/>
             <a:ext cx="998420" cy="322080"/>
           </a:xfrm>
           <a:prstGeom prst="roundRect">
@@ -22633,13 +22822,19 @@
       </p:sp>
       <p:sp>
         <p:nvSpPr>
-          <p:cNvPr id="37" name="Rectangle: Rounded Corners 36"/>
+          <p:cNvPr id="98" name="Rectangle: Rounded Corners 97">
+            <a:extLst>
+              <a:ext uri="{FF2B5EF4-FFF2-40B4-BE49-F238E27FC236}">
+                <a16:creationId xmlns:a16="http://schemas.microsoft.com/office/drawing/2014/main" id="{59A55421-CBF8-4F4A-AE0D-88ED23180E5E}"/>
+              </a:ext>
+            </a:extLst>
+          </p:cNvPr>
           <p:cNvSpPr/>
           <p:nvPr/>
         </p:nvSpPr>
         <p:spPr>
           <a:xfrm>
-            <a:off x="4642374" y="3912554"/>
+            <a:off x="4570674" y="4383325"/>
             <a:ext cx="524699" cy="322080"/>
           </a:xfrm>
           <a:prstGeom prst="roundRect">
@@ -22683,13 +22878,19 @@
       </p:sp>
       <p:sp>
         <p:nvSpPr>
-          <p:cNvPr id="38" name="Rectangle: Rounded Corners 37"/>
+          <p:cNvPr id="99" name="Rectangle: Rounded Corners 98">
+            <a:extLst>
+              <a:ext uri="{FF2B5EF4-FFF2-40B4-BE49-F238E27FC236}">
+                <a16:creationId xmlns:a16="http://schemas.microsoft.com/office/drawing/2014/main" id="{0BA8A691-B80B-4EA2-B63B-55156A4C3532}"/>
+              </a:ext>
+            </a:extLst>
+          </p:cNvPr>
           <p:cNvSpPr/>
           <p:nvPr/>
         </p:nvSpPr>
         <p:spPr>
           <a:xfrm>
-            <a:off x="3581145" y="4309398"/>
+            <a:off x="3509445" y="4780169"/>
             <a:ext cx="998420" cy="322080"/>
           </a:xfrm>
           <a:prstGeom prst="roundRect">
@@ -22733,13 +22934,19 @@
       </p:sp>
       <p:sp>
         <p:nvSpPr>
-          <p:cNvPr id="39" name="Rectangle: Rounded Corners 38"/>
+          <p:cNvPr id="100" name="Rectangle: Rounded Corners 99">
+            <a:extLst>
+              <a:ext uri="{FF2B5EF4-FFF2-40B4-BE49-F238E27FC236}">
+                <a16:creationId xmlns:a16="http://schemas.microsoft.com/office/drawing/2014/main" id="{E95954FF-BE49-43F9-BAF9-AC926EAA17C7}"/>
+              </a:ext>
+            </a:extLst>
+          </p:cNvPr>
           <p:cNvSpPr/>
           <p:nvPr/>
         </p:nvSpPr>
         <p:spPr>
           <a:xfrm>
-            <a:off x="4644027" y="4309398"/>
+            <a:off x="4572327" y="4780169"/>
             <a:ext cx="757808" cy="322080"/>
           </a:xfrm>
           <a:prstGeom prst="roundRect">
@@ -22783,13 +22990,19 @@
       </p:sp>
       <p:sp>
         <p:nvSpPr>
-          <p:cNvPr id="40" name="Rectangle: Rounded Corners 39"/>
+          <p:cNvPr id="101" name="Rectangle: Rounded Corners 100">
+            <a:extLst>
+              <a:ext uri="{FF2B5EF4-FFF2-40B4-BE49-F238E27FC236}">
+                <a16:creationId xmlns:a16="http://schemas.microsoft.com/office/drawing/2014/main" id="{69C342D9-809D-4A99-A064-F22BC7F5D708}"/>
+              </a:ext>
+            </a:extLst>
+          </p:cNvPr>
           <p:cNvSpPr/>
           <p:nvPr/>
         </p:nvSpPr>
         <p:spPr>
           <a:xfrm>
-            <a:off x="5468178" y="4309398"/>
+            <a:off x="5396478" y="4780169"/>
             <a:ext cx="1036683" cy="322080"/>
           </a:xfrm>
           <a:prstGeom prst="roundRect">
@@ -22833,13 +23046,19 @@
       </p:sp>
       <p:sp>
         <p:nvSpPr>
-          <p:cNvPr id="41" name="Rectangle: Rounded Corners 40"/>
+          <p:cNvPr id="102" name="Rectangle: Rounded Corners 101">
+            <a:extLst>
+              <a:ext uri="{FF2B5EF4-FFF2-40B4-BE49-F238E27FC236}">
+                <a16:creationId xmlns:a16="http://schemas.microsoft.com/office/drawing/2014/main" id="{F5CC31FC-362C-4AB5-A409-038FAD8BFBB2}"/>
+              </a:ext>
+            </a:extLst>
+          </p:cNvPr>
           <p:cNvSpPr/>
           <p:nvPr/>
         </p:nvSpPr>
         <p:spPr>
           <a:xfrm>
-            <a:off x="6569324" y="4300758"/>
+            <a:off x="6497624" y="4771529"/>
             <a:ext cx="484353" cy="322080"/>
           </a:xfrm>
           <a:prstGeom prst="roundRect">
@@ -22883,13 +23102,19 @@
       </p:sp>
       <p:sp>
         <p:nvSpPr>
-          <p:cNvPr id="42" name="Rectangle: Rounded Corners 41"/>
+          <p:cNvPr id="103" name="Rectangle: Rounded Corners 102">
+            <a:extLst>
+              <a:ext uri="{FF2B5EF4-FFF2-40B4-BE49-F238E27FC236}">
+                <a16:creationId xmlns:a16="http://schemas.microsoft.com/office/drawing/2014/main" id="{3BE1BA3F-13EC-4FF7-AF16-DD98992BAD4D}"/>
+              </a:ext>
+            </a:extLst>
+          </p:cNvPr>
           <p:cNvSpPr/>
           <p:nvPr/>
         </p:nvSpPr>
         <p:spPr>
           <a:xfrm>
-            <a:off x="3607422" y="4735063"/>
+            <a:off x="3502534" y="5201640"/>
             <a:ext cx="998420" cy="322080"/>
           </a:xfrm>
           <a:prstGeom prst="roundRect">
@@ -22933,13 +23158,19 @@
       </p:sp>
       <p:sp>
         <p:nvSpPr>
-          <p:cNvPr id="43" name="Rectangle: Rounded Corners 42"/>
+          <p:cNvPr id="104" name="Rectangle: Rounded Corners 103">
+            <a:extLst>
+              <a:ext uri="{FF2B5EF4-FFF2-40B4-BE49-F238E27FC236}">
+                <a16:creationId xmlns:a16="http://schemas.microsoft.com/office/drawing/2014/main" id="{73C4F50B-C244-4E55-87DB-8537FCAC54C2}"/>
+              </a:ext>
+            </a:extLst>
+          </p:cNvPr>
           <p:cNvSpPr/>
           <p:nvPr/>
         </p:nvSpPr>
         <p:spPr>
           <a:xfrm>
-            <a:off x="4670304" y="4735063"/>
+            <a:off x="4565416" y="5201640"/>
             <a:ext cx="757808" cy="322080"/>
           </a:xfrm>
           <a:prstGeom prst="roundRect">
@@ -22983,13 +23214,19 @@
       </p:sp>
       <p:sp>
         <p:nvSpPr>
-          <p:cNvPr id="44" name="Rectangle: Rounded Corners 43"/>
+          <p:cNvPr id="105" name="Rectangle: Rounded Corners 104">
+            <a:extLst>
+              <a:ext uri="{FF2B5EF4-FFF2-40B4-BE49-F238E27FC236}">
+                <a16:creationId xmlns:a16="http://schemas.microsoft.com/office/drawing/2014/main" id="{72607859-AE95-4EF6-BD2B-D37727AF2584}"/>
+              </a:ext>
+            </a:extLst>
+          </p:cNvPr>
           <p:cNvSpPr/>
           <p:nvPr/>
         </p:nvSpPr>
         <p:spPr>
           <a:xfrm>
-            <a:off x="5494455" y="4735063"/>
+            <a:off x="5389567" y="5201640"/>
             <a:ext cx="1036683" cy="322080"/>
           </a:xfrm>
           <a:prstGeom prst="roundRect">
@@ -23033,13 +23270,19 @@
       </p:sp>
       <p:sp>
         <p:nvSpPr>
-          <p:cNvPr id="45" name="Rectangle: Rounded Corners 44"/>
+          <p:cNvPr id="106" name="Rectangle: Rounded Corners 105">
+            <a:extLst>
+              <a:ext uri="{FF2B5EF4-FFF2-40B4-BE49-F238E27FC236}">
+                <a16:creationId xmlns:a16="http://schemas.microsoft.com/office/drawing/2014/main" id="{742411D3-552E-40C9-8C86-3427A7C9437B}"/>
+              </a:ext>
+            </a:extLst>
+          </p:cNvPr>
           <p:cNvSpPr/>
           <p:nvPr/>
         </p:nvSpPr>
         <p:spPr>
           <a:xfrm>
-            <a:off x="6595601" y="4726423"/>
+            <a:off x="6490713" y="5193000"/>
             <a:ext cx="484353" cy="322080"/>
           </a:xfrm>
           <a:prstGeom prst="roundRect">
@@ -23083,255 +23326,57 @@
       </p:sp>
       <p:sp>
         <p:nvSpPr>
-          <p:cNvPr id="46" name="TextBox 45"/>
-          <p:cNvSpPr txBox="1"/>
+          <p:cNvPr id="107" name="Rectangle: Rounded Corners 106">
+            <a:extLst>
+              <a:ext uri="{FF2B5EF4-FFF2-40B4-BE49-F238E27FC236}">
+                <a16:creationId xmlns:a16="http://schemas.microsoft.com/office/drawing/2014/main" id="{6119B75E-7226-4451-B935-7256C1393CEC}"/>
+              </a:ext>
+            </a:extLst>
+          </p:cNvPr>
+          <p:cNvSpPr/>
           <p:nvPr/>
         </p:nvSpPr>
         <p:spPr>
           <a:xfrm>
-            <a:off x="726141" y="6257364"/>
-            <a:ext cx="10703859" cy="367553"/>
+            <a:off x="5122359" y="2649570"/>
+            <a:ext cx="2296753" cy="322080"/>
           </a:xfrm>
-          <a:prstGeom prst="rect">
+          <a:prstGeom prst="roundRect">
             <a:avLst/>
           </a:prstGeom>
+          <a:solidFill>
+            <a:schemeClr val="accent2"/>
+          </a:solidFill>
+          <a:ln>
+            <a:noFill/>
+          </a:ln>
         </p:spPr>
+        <p:style>
+          <a:lnRef idx="2">
+            <a:schemeClr val="accent1">
+              <a:shade val="50000"/>
+            </a:schemeClr>
+          </a:lnRef>
+          <a:fillRef idx="1">
+            <a:schemeClr val="accent1"/>
+          </a:fillRef>
+          <a:effectRef idx="0">
+            <a:schemeClr val="accent1"/>
+          </a:effectRef>
+          <a:fontRef idx="minor">
+            <a:schemeClr val="lt1"/>
+          </a:fontRef>
+        </p:style>
         <p:txBody>
-          <a:bodyPr vert="horz" wrap="square" lIns="91440" tIns="45720" rIns="91440" bIns="45720" rtlCol="0" anchor="t">
-            <a:noAutofit/>
-          </a:bodyPr>
+          <a:bodyPr rtlCol="0" anchor="ctr"/>
           <a:lstStyle/>
           <a:p>
-            <a:r>
-              <a:rPr lang="en-US" sz="1200" dirty="0">
-                <a:solidFill>
-                  <a:schemeClr val="tx1">
-                    <a:lumMod val="50000"/>
-                    <a:lumOff val="50000"/>
-                  </a:schemeClr>
-                </a:solidFill>
-              </a:rPr>
-              <a:t>* To get results on violations or critical violations on a specific metrics, add the axis “METRICS=M” where M is a metric id from quality model (</a:t>
-            </a:r>
-            <a:r>
-              <a:rPr lang="en-US" sz="1200" dirty="0" err="1">
-                <a:solidFill>
-                  <a:schemeClr val="tx1">
-                    <a:lumMod val="50000"/>
-                    <a:lumOff val="50000"/>
-                  </a:schemeClr>
-                </a:solidFill>
-              </a:rPr>
-              <a:t>eg</a:t>
-            </a:r>
-            <a:r>
-              <a:rPr lang="en-US" sz="1200" dirty="0">
-                <a:solidFill>
-                  <a:schemeClr val="tx1">
-                    <a:lumMod val="50000"/>
-                    <a:lumOff val="50000"/>
-                  </a:schemeClr>
-                </a:solidFill>
-              </a:rPr>
-              <a:t> slide 6)</a:t>
-            </a:r>
-          </a:p>
-        </p:txBody>
-      </p:sp>
-      <p:sp>
-        <p:nvSpPr>
-          <p:cNvPr id="47" name="Text Placeholder 7"/>
-          <p:cNvSpPr txBox="1">
-            <a:spLocks/>
-          </p:cNvSpPr>
-          <p:nvPr/>
-        </p:nvSpPr>
-        <p:spPr>
-          <a:xfrm>
-            <a:off x="3488443" y="1333500"/>
-            <a:ext cx="2790752" cy="4351338"/>
-          </a:xfrm>
-          <a:prstGeom prst="rect">
-            <a:avLst/>
-          </a:prstGeom>
-        </p:spPr>
-        <p:txBody>
-          <a:bodyPr vert="horz" lIns="91440" tIns="45720" rIns="91440" bIns="45720" rtlCol="0">
-            <a:normAutofit/>
-          </a:bodyPr>
-          <a:lstStyle>
-            <a:lvl1pPr marL="285750" indent="-285750" algn="l" defTabSz="457200" rtl="0" eaLnBrk="1" latinLnBrk="0" hangingPunct="1">
-              <a:lnSpc>
-                <a:spcPct val="100000"/>
-              </a:lnSpc>
-              <a:spcBef>
-                <a:spcPts val="1200"/>
-              </a:spcBef>
-              <a:buFont typeface="Arial" panose="020B0604020202020204" pitchFamily="34" charset="0"/>
-              <a:buChar char="•"/>
-              <a:defRPr sz="1800" kern="1200">
-                <a:solidFill>
-                  <a:schemeClr val="tx1"/>
-                </a:solidFill>
-                <a:latin typeface="+mn-lt"/>
-                <a:ea typeface="+mn-ea"/>
-                <a:cs typeface="+mn-cs"/>
-              </a:defRPr>
-            </a:lvl1pPr>
-            <a:lvl2pPr marL="685800" indent="-228600" algn="l" defTabSz="457200" rtl="0" eaLnBrk="1" latinLnBrk="0" hangingPunct="1">
-              <a:lnSpc>
-                <a:spcPct val="100000"/>
-              </a:lnSpc>
-              <a:spcBef>
-                <a:spcPts val="600"/>
-              </a:spcBef>
-              <a:buFont typeface="Arial" panose="020B0604020202020204" pitchFamily="34" charset="0"/>
-              <a:buChar char="−"/>
-              <a:defRPr sz="1800" kern="1200">
-                <a:solidFill>
-                  <a:schemeClr val="tx1"/>
-                </a:solidFill>
-                <a:latin typeface="+mn-lt"/>
-                <a:ea typeface="+mn-ea"/>
-                <a:cs typeface="+mn-cs"/>
-              </a:defRPr>
-            </a:lvl2pPr>
-            <a:lvl3pPr marL="1143000" indent="-228600" algn="l" defTabSz="457200" rtl="0" eaLnBrk="1" latinLnBrk="0" hangingPunct="1">
-              <a:lnSpc>
-                <a:spcPct val="100000"/>
-              </a:lnSpc>
-              <a:spcBef>
-                <a:spcPts val="600"/>
-              </a:spcBef>
-              <a:buFont typeface="Courier New" panose="02070309020205020404" pitchFamily="49" charset="0"/>
-              <a:buChar char="o"/>
-              <a:defRPr sz="1800" kern="1200">
-                <a:solidFill>
-                  <a:schemeClr val="tx1"/>
-                </a:solidFill>
-                <a:latin typeface="+mn-lt"/>
-                <a:ea typeface="+mn-ea"/>
-                <a:cs typeface="+mn-cs"/>
-              </a:defRPr>
-            </a:lvl3pPr>
-            <a:lvl4pPr marL="1600200" indent="-228600" algn="l" defTabSz="457200" rtl="0" eaLnBrk="1" latinLnBrk="0" hangingPunct="1">
-              <a:lnSpc>
-                <a:spcPct val="100000"/>
-              </a:lnSpc>
-              <a:spcBef>
-                <a:spcPts val="600"/>
-              </a:spcBef>
-              <a:buFont typeface="Wingdings" panose="05000000000000000000" pitchFamily="2" charset="2"/>
-              <a:buChar char="§"/>
-              <a:defRPr sz="1800" kern="1200">
-                <a:solidFill>
-                  <a:schemeClr val="tx1"/>
-                </a:solidFill>
-                <a:latin typeface="+mn-lt"/>
-                <a:ea typeface="+mn-ea"/>
-                <a:cs typeface="+mn-cs"/>
-              </a:defRPr>
-            </a:lvl4pPr>
-            <a:lvl5pPr marL="2057400" indent="-228600" algn="l" defTabSz="457200" rtl="0" eaLnBrk="1" latinLnBrk="0" hangingPunct="1">
-              <a:lnSpc>
-                <a:spcPct val="100000"/>
-              </a:lnSpc>
-              <a:spcBef>
-                <a:spcPts val="600"/>
-              </a:spcBef>
-              <a:buFont typeface="Wingdings" charset="2"/>
-              <a:buChar char="§"/>
-              <a:defRPr sz="1800" kern="1200">
-                <a:solidFill>
-                  <a:schemeClr val="tx1"/>
-                </a:solidFill>
-                <a:latin typeface="+mn-lt"/>
-                <a:ea typeface="+mn-ea"/>
-                <a:cs typeface="+mn-cs"/>
-              </a:defRPr>
-            </a:lvl5pPr>
-            <a:lvl6pPr marL="2514600" indent="-228600" algn="l" defTabSz="914400" rtl="0" eaLnBrk="1" latinLnBrk="0" hangingPunct="1">
-              <a:lnSpc>
-                <a:spcPct val="90000"/>
-              </a:lnSpc>
-              <a:spcBef>
-                <a:spcPts val="500"/>
-              </a:spcBef>
-              <a:buFont typeface="Arial"/>
-              <a:buChar char="•"/>
-              <a:defRPr sz="1800" kern="1200">
-                <a:solidFill>
-                  <a:schemeClr val="tx1"/>
-                </a:solidFill>
-                <a:latin typeface="+mn-lt"/>
-                <a:ea typeface="+mn-ea"/>
-                <a:cs typeface="+mn-cs"/>
-              </a:defRPr>
-            </a:lvl6pPr>
-            <a:lvl7pPr marL="2971800" indent="-228600" algn="l" defTabSz="914400" rtl="0" eaLnBrk="1" latinLnBrk="0" hangingPunct="1">
-              <a:lnSpc>
-                <a:spcPct val="90000"/>
-              </a:lnSpc>
-              <a:spcBef>
-                <a:spcPts val="500"/>
-              </a:spcBef>
-              <a:buFont typeface="Arial"/>
-              <a:buChar char="•"/>
-              <a:defRPr sz="1800" kern="1200">
-                <a:solidFill>
-                  <a:schemeClr val="tx1"/>
-                </a:solidFill>
-                <a:latin typeface="+mn-lt"/>
-                <a:ea typeface="+mn-ea"/>
-                <a:cs typeface="+mn-cs"/>
-              </a:defRPr>
-            </a:lvl7pPr>
-            <a:lvl8pPr marL="3429000" indent="-228600" algn="l" defTabSz="914400" rtl="0" eaLnBrk="1" latinLnBrk="0" hangingPunct="1">
-              <a:lnSpc>
-                <a:spcPct val="90000"/>
-              </a:lnSpc>
-              <a:spcBef>
-                <a:spcPts val="500"/>
-              </a:spcBef>
-              <a:buFont typeface="Arial"/>
-              <a:buChar char="•"/>
-              <a:defRPr sz="1800" kern="1200">
-                <a:solidFill>
-                  <a:schemeClr val="tx1"/>
-                </a:solidFill>
-                <a:latin typeface="+mn-lt"/>
-                <a:ea typeface="+mn-ea"/>
-                <a:cs typeface="+mn-cs"/>
-              </a:defRPr>
-            </a:lvl8pPr>
-            <a:lvl9pPr marL="3886200" indent="-228600" algn="l" defTabSz="914400" rtl="0" eaLnBrk="1" latinLnBrk="0" hangingPunct="1">
-              <a:lnSpc>
-                <a:spcPct val="90000"/>
-              </a:lnSpc>
-              <a:spcBef>
-                <a:spcPts val="500"/>
-              </a:spcBef>
-              <a:buFont typeface="Arial"/>
-              <a:buChar char="•"/>
-              <a:defRPr sz="1800" kern="1200">
-                <a:solidFill>
-                  <a:schemeClr val="tx1"/>
-                </a:solidFill>
-                <a:latin typeface="+mn-lt"/>
-                <a:ea typeface="+mn-ea"/>
-                <a:cs typeface="+mn-cs"/>
-              </a:defRPr>
-            </a:lvl9pPr>
-          </a:lstStyle>
-          <a:p>
-            <a:pPr marL="0" indent="0">
-              <a:buFont typeface="Arial" panose="020B0604020202020204" pitchFamily="34" charset="0"/>
-              <a:buNone/>
-            </a:pPr>
-            <a:r>
-              <a:rPr lang="en-US" dirty="0"/>
-              <a:t>VALUES</a:t>
-            </a:r>
+            <a:pPr algn="ctr"/>
+            <a:r>
+              <a:rPr lang="en-US" sz="1200" dirty="0"/>
+              <a:t>CRITICAL_QUALITY_RULES</a:t>
+            </a:r>
+            <a:endParaRPr lang="en-US" dirty="0"/>
           </a:p>
         </p:txBody>
       </p:sp>

</xml_diff>

<commit_message>
REPORTGEN-352 : update templates with samples for generic table and graph in word and excel
</commit_message>
<xml_diff>
--- a/CastReporting.Reporting/TemplatesFiles/Generic Graph Definition.pptx
+++ b/CastReporting.Reporting/TemplatesFiles/Generic Graph Definition.pptx
@@ -5,7 +5,7 @@
     <p:sldMasterId id="2147483648" r:id="rId1"/>
   </p:sldMasterIdLst>
   <p:notesMasterIdLst>
-    <p:notesMasterId r:id="rId11"/>
+    <p:notesMasterId r:id="rId12"/>
   </p:notesMasterIdLst>
   <p:sldIdLst>
     <p:sldId id="342" r:id="rId2"/>
@@ -14,9 +14,10 @@
     <p:sldId id="378" r:id="rId5"/>
     <p:sldId id="379" r:id="rId6"/>
     <p:sldId id="380" r:id="rId7"/>
-    <p:sldId id="381" r:id="rId8"/>
-    <p:sldId id="382" r:id="rId9"/>
-    <p:sldId id="385" r:id="rId10"/>
+    <p:sldId id="386" r:id="rId8"/>
+    <p:sldId id="381" r:id="rId9"/>
+    <p:sldId id="382" r:id="rId10"/>
+    <p:sldId id="385" r:id="rId11"/>
   </p:sldIdLst>
   <p:sldSz cx="12192000" cy="6858000"/>
   <p:notesSz cx="6858000" cy="9144000"/>
@@ -132,10 +133,6 @@
     </p:ext>
   </p:extLst>
 </p:presentation>
-</file>
-
-<file path=ppt/revisionInfo.xml><?xml version="1.0" encoding="utf-8"?>
-<p1510:revInfo xmlns:a="http://schemas.openxmlformats.org/drawingml/2006/main" xmlns:r="http://schemas.openxmlformats.org/officeDocument/2006/relationships" xmlns:p1510="http://schemas.microsoft.com/office/powerpoint/2015/10/main"/>
 </file>
 
 <file path=ppt/charts/chart1.xml><?xml version="1.0" encoding="utf-8"?>
@@ -1745,6 +1742,491 @@
           <a:lstStyle/>
           <a:p>
             <a:pPr>
+              <a:defRPr sz="1000" b="1" i="0" u="none" strike="noStrike" kern="1200" spc="0" baseline="0">
+                <a:solidFill>
+                  <a:schemeClr val="tx1">
+                    <a:lumMod val="65000"/>
+                    <a:lumOff val="35000"/>
+                  </a:schemeClr>
+                </a:solidFill>
+                <a:latin typeface="+mn-lt"/>
+                <a:ea typeface="+mn-ea"/>
+                <a:cs typeface="+mn-cs"/>
+              </a:defRPr>
+            </a:pPr>
+            <a:r>
+              <a:rPr lang="fr-FR" sz="1000" b="1" dirty="0">
+                <a:effectLst/>
+              </a:rPr>
+              <a:t>ADDED AND REMOVED VIOLATIONS BY QUALITY</a:t>
+            </a:r>
+            <a:r>
+              <a:rPr lang="fr-FR" sz="1000" b="1" baseline="0" dirty="0">
+                <a:effectLst/>
+              </a:rPr>
+              <a:t> STANDARD</a:t>
+            </a:r>
+            <a:endParaRPr lang="en-US" sz="1000" b="1" dirty="0">
+              <a:effectLst/>
+            </a:endParaRPr>
+          </a:p>
+        </c:rich>
+      </c:tx>
+      <c:overlay val="0"/>
+      <c:spPr>
+        <a:noFill/>
+        <a:ln>
+          <a:noFill/>
+        </a:ln>
+        <a:effectLst/>
+      </c:spPr>
+      <c:txPr>
+        <a:bodyPr rot="0" spcFirstLastPara="1" vertOverflow="ellipsis" vert="horz" wrap="square" anchor="ctr" anchorCtr="1"/>
+        <a:lstStyle/>
+        <a:p>
+          <a:pPr>
+            <a:defRPr sz="1000" b="1" i="0" u="none" strike="noStrike" kern="1200" spc="0" baseline="0">
+              <a:solidFill>
+                <a:schemeClr val="tx1">
+                  <a:lumMod val="65000"/>
+                  <a:lumOff val="35000"/>
+                </a:schemeClr>
+              </a:solidFill>
+              <a:latin typeface="+mn-lt"/>
+              <a:ea typeface="+mn-ea"/>
+              <a:cs typeface="+mn-cs"/>
+            </a:defRPr>
+          </a:pPr>
+          <a:endParaRPr lang="en-US"/>
+        </a:p>
+      </c:txPr>
+    </c:title>
+    <c:autoTitleDeleted val="0"/>
+    <c:plotArea>
+      <c:layout/>
+      <c:barChart>
+        <c:barDir val="bar"/>
+        <c:grouping val="clustered"/>
+        <c:varyColors val="0"/>
+        <c:ser>
+          <c:idx val="0"/>
+          <c:order val="0"/>
+          <c:tx>
+            <c:strRef>
+              <c:f>Sheet1!$B$1</c:f>
+              <c:strCache>
+                <c:ptCount val="1"/>
+                <c:pt idx="0">
+                  <c:v>Total</c:v>
+                </c:pt>
+              </c:strCache>
+            </c:strRef>
+          </c:tx>
+          <c:spPr>
+            <a:solidFill>
+              <a:schemeClr val="accent1"/>
+            </a:solidFill>
+            <a:ln>
+              <a:noFill/>
+            </a:ln>
+            <a:effectLst/>
+          </c:spPr>
+          <c:invertIfNegative val="0"/>
+          <c:cat>
+            <c:strRef>
+              <c:f>Sheet1!$A$2:$A$5</c:f>
+              <c:strCache>
+                <c:ptCount val="4"/>
+                <c:pt idx="0">
+                  <c:v>CWE-78</c:v>
+                </c:pt>
+                <c:pt idx="1">
+                  <c:v>CWE-90</c:v>
+                </c:pt>
+                <c:pt idx="2">
+                  <c:v>CWE-798</c:v>
+                </c:pt>
+                <c:pt idx="3">
+                  <c:v>CWE-501</c:v>
+                </c:pt>
+              </c:strCache>
+            </c:strRef>
+          </c:cat>
+          <c:val>
+            <c:numRef>
+              <c:f>Sheet1!$B$2:$B$5</c:f>
+              <c:numCache>
+                <c:formatCode>General</c:formatCode>
+                <c:ptCount val="4"/>
+                <c:pt idx="0">
+                  <c:v>30</c:v>
+                </c:pt>
+                <c:pt idx="1">
+                  <c:v>30</c:v>
+                </c:pt>
+                <c:pt idx="2">
+                  <c:v>30</c:v>
+                </c:pt>
+                <c:pt idx="3">
+                  <c:v>30</c:v>
+                </c:pt>
+              </c:numCache>
+            </c:numRef>
+          </c:val>
+          <c:extLst>
+            <c:ext xmlns:c16="http://schemas.microsoft.com/office/drawing/2014/chart" uri="{C3380CC4-5D6E-409C-BE32-E72D297353CC}">
+              <c16:uniqueId val="{00000000-3332-4F3C-99BE-F7E77DEDD538}"/>
+            </c:ext>
+          </c:extLst>
+        </c:ser>
+        <c:ser>
+          <c:idx val="1"/>
+          <c:order val="1"/>
+          <c:tx>
+            <c:strRef>
+              <c:f>Sheet1!$C$1</c:f>
+              <c:strCache>
+                <c:ptCount val="1"/>
+                <c:pt idx="0">
+                  <c:v>Added</c:v>
+                </c:pt>
+              </c:strCache>
+            </c:strRef>
+          </c:tx>
+          <c:spPr>
+            <a:solidFill>
+              <a:schemeClr val="accent2"/>
+            </a:solidFill>
+            <a:ln>
+              <a:noFill/>
+            </a:ln>
+            <a:effectLst/>
+          </c:spPr>
+          <c:invertIfNegative val="0"/>
+          <c:cat>
+            <c:strRef>
+              <c:f>Sheet1!$A$2:$A$5</c:f>
+              <c:strCache>
+                <c:ptCount val="4"/>
+                <c:pt idx="0">
+                  <c:v>CWE-78</c:v>
+                </c:pt>
+                <c:pt idx="1">
+                  <c:v>CWE-90</c:v>
+                </c:pt>
+                <c:pt idx="2">
+                  <c:v>CWE-798</c:v>
+                </c:pt>
+                <c:pt idx="3">
+                  <c:v>CWE-501</c:v>
+                </c:pt>
+              </c:strCache>
+            </c:strRef>
+          </c:cat>
+          <c:val>
+            <c:numRef>
+              <c:f>Sheet1!$C$2:$C$5</c:f>
+              <c:numCache>
+                <c:formatCode>General</c:formatCode>
+                <c:ptCount val="4"/>
+                <c:pt idx="0">
+                  <c:v>10</c:v>
+                </c:pt>
+                <c:pt idx="1">
+                  <c:v>10</c:v>
+                </c:pt>
+                <c:pt idx="2">
+                  <c:v>10</c:v>
+                </c:pt>
+                <c:pt idx="3">
+                  <c:v>10</c:v>
+                </c:pt>
+              </c:numCache>
+            </c:numRef>
+          </c:val>
+          <c:extLst>
+            <c:ext xmlns:c16="http://schemas.microsoft.com/office/drawing/2014/chart" uri="{C3380CC4-5D6E-409C-BE32-E72D297353CC}">
+              <c16:uniqueId val="{00000001-3332-4F3C-99BE-F7E77DEDD538}"/>
+            </c:ext>
+          </c:extLst>
+        </c:ser>
+        <c:ser>
+          <c:idx val="2"/>
+          <c:order val="2"/>
+          <c:tx>
+            <c:strRef>
+              <c:f>Sheet1!$D$1</c:f>
+              <c:strCache>
+                <c:ptCount val="1"/>
+                <c:pt idx="0">
+                  <c:v>Removed</c:v>
+                </c:pt>
+              </c:strCache>
+            </c:strRef>
+          </c:tx>
+          <c:spPr>
+            <a:solidFill>
+              <a:schemeClr val="accent3"/>
+            </a:solidFill>
+            <a:ln>
+              <a:noFill/>
+            </a:ln>
+            <a:effectLst/>
+          </c:spPr>
+          <c:invertIfNegative val="0"/>
+          <c:cat>
+            <c:strRef>
+              <c:f>Sheet1!$A$2:$A$5</c:f>
+              <c:strCache>
+                <c:ptCount val="4"/>
+                <c:pt idx="0">
+                  <c:v>CWE-78</c:v>
+                </c:pt>
+                <c:pt idx="1">
+                  <c:v>CWE-90</c:v>
+                </c:pt>
+                <c:pt idx="2">
+                  <c:v>CWE-798</c:v>
+                </c:pt>
+                <c:pt idx="3">
+                  <c:v>CWE-501</c:v>
+                </c:pt>
+              </c:strCache>
+            </c:strRef>
+          </c:cat>
+          <c:val>
+            <c:numRef>
+              <c:f>Sheet1!$D$2:$D$5</c:f>
+              <c:numCache>
+                <c:formatCode>General</c:formatCode>
+                <c:ptCount val="4"/>
+                <c:pt idx="0">
+                  <c:v>10</c:v>
+                </c:pt>
+                <c:pt idx="1">
+                  <c:v>10</c:v>
+                </c:pt>
+                <c:pt idx="2">
+                  <c:v>10</c:v>
+                </c:pt>
+                <c:pt idx="3">
+                  <c:v>10</c:v>
+                </c:pt>
+              </c:numCache>
+            </c:numRef>
+          </c:val>
+          <c:extLst>
+            <c:ext xmlns:c16="http://schemas.microsoft.com/office/drawing/2014/chart" uri="{C3380CC4-5D6E-409C-BE32-E72D297353CC}">
+              <c16:uniqueId val="{00000002-3332-4F3C-99BE-F7E77DEDD538}"/>
+            </c:ext>
+          </c:extLst>
+        </c:ser>
+        <c:dLbls>
+          <c:showLegendKey val="0"/>
+          <c:showVal val="0"/>
+          <c:showCatName val="0"/>
+          <c:showSerName val="0"/>
+          <c:showPercent val="0"/>
+          <c:showBubbleSize val="0"/>
+        </c:dLbls>
+        <c:gapWidth val="219"/>
+        <c:axId val="461299216"/>
+        <c:axId val="461299544"/>
+      </c:barChart>
+      <c:catAx>
+        <c:axId val="461299216"/>
+        <c:scaling>
+          <c:orientation val="minMax"/>
+        </c:scaling>
+        <c:delete val="0"/>
+        <c:axPos val="l"/>
+        <c:numFmt formatCode="General" sourceLinked="1"/>
+        <c:majorTickMark val="none"/>
+        <c:minorTickMark val="none"/>
+        <c:tickLblPos val="nextTo"/>
+        <c:spPr>
+          <a:noFill/>
+          <a:ln w="9525" cap="flat" cmpd="sng" algn="ctr">
+            <a:solidFill>
+              <a:schemeClr val="tx1">
+                <a:lumMod val="15000"/>
+                <a:lumOff val="85000"/>
+              </a:schemeClr>
+            </a:solidFill>
+            <a:round/>
+          </a:ln>
+          <a:effectLst/>
+        </c:spPr>
+        <c:txPr>
+          <a:bodyPr rot="-60000000" spcFirstLastPara="1" vertOverflow="ellipsis" vert="horz" wrap="square" anchor="ctr" anchorCtr="1"/>
+          <a:lstStyle/>
+          <a:p>
+            <a:pPr>
+              <a:defRPr sz="1197" b="0" i="0" u="none" strike="noStrike" kern="1200" baseline="0">
+                <a:solidFill>
+                  <a:schemeClr val="tx1">
+                    <a:lumMod val="65000"/>
+                    <a:lumOff val="35000"/>
+                  </a:schemeClr>
+                </a:solidFill>
+                <a:latin typeface="+mn-lt"/>
+                <a:ea typeface="+mn-ea"/>
+                <a:cs typeface="+mn-cs"/>
+              </a:defRPr>
+            </a:pPr>
+            <a:endParaRPr lang="en-US"/>
+          </a:p>
+        </c:txPr>
+        <c:crossAx val="461299544"/>
+        <c:crosses val="autoZero"/>
+        <c:auto val="1"/>
+        <c:lblAlgn val="ctr"/>
+        <c:lblOffset val="100"/>
+        <c:noMultiLvlLbl val="0"/>
+      </c:catAx>
+      <c:valAx>
+        <c:axId val="461299544"/>
+        <c:scaling>
+          <c:orientation val="minMax"/>
+        </c:scaling>
+        <c:delete val="0"/>
+        <c:axPos val="b"/>
+        <c:majorGridlines>
+          <c:spPr>
+            <a:ln w="9525" cap="flat" cmpd="sng" algn="ctr">
+              <a:solidFill>
+                <a:schemeClr val="tx1">
+                  <a:lumMod val="15000"/>
+                  <a:lumOff val="85000"/>
+                </a:schemeClr>
+              </a:solidFill>
+              <a:round/>
+            </a:ln>
+            <a:effectLst/>
+          </c:spPr>
+        </c:majorGridlines>
+        <c:numFmt formatCode="General" sourceLinked="1"/>
+        <c:majorTickMark val="none"/>
+        <c:minorTickMark val="none"/>
+        <c:tickLblPos val="nextTo"/>
+        <c:spPr>
+          <a:noFill/>
+          <a:ln>
+            <a:noFill/>
+          </a:ln>
+          <a:effectLst/>
+        </c:spPr>
+        <c:txPr>
+          <a:bodyPr rot="-60000000" spcFirstLastPara="1" vertOverflow="ellipsis" vert="horz" wrap="square" anchor="ctr" anchorCtr="1"/>
+          <a:lstStyle/>
+          <a:p>
+            <a:pPr>
+              <a:defRPr sz="1197" b="0" i="0" u="none" strike="noStrike" kern="1200" baseline="0">
+                <a:solidFill>
+                  <a:schemeClr val="tx1">
+                    <a:lumMod val="65000"/>
+                    <a:lumOff val="35000"/>
+                  </a:schemeClr>
+                </a:solidFill>
+                <a:latin typeface="+mn-lt"/>
+                <a:ea typeface="+mn-ea"/>
+                <a:cs typeface="+mn-cs"/>
+              </a:defRPr>
+            </a:pPr>
+            <a:endParaRPr lang="en-US"/>
+          </a:p>
+        </c:txPr>
+        <c:crossAx val="461299216"/>
+        <c:crosses val="autoZero"/>
+        <c:crossBetween val="between"/>
+      </c:valAx>
+      <c:spPr>
+        <a:noFill/>
+        <a:ln>
+          <a:noFill/>
+        </a:ln>
+        <a:effectLst/>
+      </c:spPr>
+    </c:plotArea>
+    <c:legend>
+      <c:legendPos val="b"/>
+      <c:overlay val="0"/>
+      <c:spPr>
+        <a:noFill/>
+        <a:ln>
+          <a:noFill/>
+        </a:ln>
+        <a:effectLst/>
+      </c:spPr>
+      <c:txPr>
+        <a:bodyPr rot="0" spcFirstLastPara="1" vertOverflow="ellipsis" vert="horz" wrap="square" anchor="ctr" anchorCtr="1"/>
+        <a:lstStyle/>
+        <a:p>
+          <a:pPr>
+            <a:defRPr sz="1197" b="0" i="0" u="none" strike="noStrike" kern="1200" baseline="0">
+              <a:solidFill>
+                <a:schemeClr val="tx1">
+                  <a:lumMod val="65000"/>
+                  <a:lumOff val="35000"/>
+                </a:schemeClr>
+              </a:solidFill>
+              <a:latin typeface="+mn-lt"/>
+              <a:ea typeface="+mn-ea"/>
+              <a:cs typeface="+mn-cs"/>
+            </a:defRPr>
+          </a:pPr>
+          <a:endParaRPr lang="en-US"/>
+        </a:p>
+      </c:txPr>
+    </c:legend>
+    <c:plotVisOnly val="1"/>
+    <c:dispBlanksAs val="gap"/>
+    <c:showDLblsOverMax val="0"/>
+  </c:chart>
+  <c:spPr>
+    <a:noFill/>
+    <a:ln>
+      <a:noFill/>
+    </a:ln>
+    <a:effectLst/>
+  </c:spPr>
+  <c:txPr>
+    <a:bodyPr/>
+    <a:lstStyle/>
+    <a:p>
+      <a:pPr>
+        <a:defRPr/>
+      </a:pPr>
+      <a:endParaRPr lang="en-US"/>
+    </a:p>
+  </c:txPr>
+  <c:externalData r:id="rId3">
+    <c:autoUpdate val="0"/>
+  </c:externalData>
+</c:chartSpace>
+</file>
+
+<file path=ppt/charts/chart5.xml><?xml version="1.0" encoding="utf-8"?>
+<c:chartSpace xmlns:c="http://schemas.openxmlformats.org/drawingml/2006/chart" xmlns:a="http://schemas.openxmlformats.org/drawingml/2006/main" xmlns:r="http://schemas.openxmlformats.org/officeDocument/2006/relationships" xmlns:c16r2="http://schemas.microsoft.com/office/drawing/2015/06/chart">
+  <c:date1904 val="0"/>
+  <c:lang val="en-US"/>
+  <c:roundedCorners val="0"/>
+  <mc:AlternateContent xmlns:mc="http://schemas.openxmlformats.org/markup-compatibility/2006">
+    <mc:Choice xmlns:c14="http://schemas.microsoft.com/office/drawing/2007/8/2/chart" Requires="c14">
+      <c14:style val="102"/>
+    </mc:Choice>
+    <mc:Fallback>
+      <c:style val="2"/>
+    </mc:Fallback>
+  </mc:AlternateContent>
+  <c:chart>
+    <c:title>
+      <c:tx>
+        <c:rich>
+          <a:bodyPr rot="0" spcFirstLastPara="1" vertOverflow="ellipsis" vert="horz" wrap="square" anchor="ctr" anchorCtr="1"/>
+          <a:lstStyle/>
+          <a:p>
+            <a:pPr>
               <a:defRPr sz="1100" b="1" i="0" u="none" strike="noStrike" kern="1200" spc="0" baseline="0">
                 <a:solidFill>
                   <a:schemeClr val="tx1">
@@ -2145,7 +2627,7 @@
 </c:chartSpace>
 </file>
 
-<file path=ppt/charts/chart5.xml><?xml version="1.0" encoding="utf-8"?>
+<file path=ppt/charts/chart6.xml><?xml version="1.0" encoding="utf-8"?>
 <c:chartSpace xmlns:c="http://schemas.openxmlformats.org/drawingml/2006/chart" xmlns:a="http://schemas.openxmlformats.org/drawingml/2006/main" xmlns:r="http://schemas.openxmlformats.org/officeDocument/2006/relationships" xmlns:c16r2="http://schemas.microsoft.com/office/drawing/2015/06/chart">
   <c:date1904 val="0"/>
   <c:lang val="en-US"/>
@@ -2568,7 +3050,7 @@
 </c:chartSpace>
 </file>
 
-<file path=ppt/charts/chart6.xml><?xml version="1.0" encoding="utf-8"?>
+<file path=ppt/charts/chart7.xml><?xml version="1.0" encoding="utf-8"?>
 <c:chartSpace xmlns:c="http://schemas.openxmlformats.org/drawingml/2006/chart" xmlns:a="http://schemas.openxmlformats.org/drawingml/2006/main" xmlns:r="http://schemas.openxmlformats.org/officeDocument/2006/relationships" xmlns:c16r2="http://schemas.microsoft.com/office/drawing/2015/06/chart">
   <c:date1904 val="0"/>
   <c:lang val="en-US"/>
@@ -2999,7 +3481,7 @@
 </c:chartSpace>
 </file>
 
-<file path=ppt/charts/chart7.xml><?xml version="1.0" encoding="utf-8"?>
+<file path=ppt/charts/chart8.xml><?xml version="1.0" encoding="utf-8"?>
 <c:chartSpace xmlns:c="http://schemas.openxmlformats.org/drawingml/2006/chart" xmlns:a="http://schemas.openxmlformats.org/drawingml/2006/main" xmlns:r="http://schemas.openxmlformats.org/officeDocument/2006/relationships" xmlns:c16r2="http://schemas.microsoft.com/office/drawing/2015/06/chart">
   <c:date1904 val="0"/>
   <c:lang val="en-US"/>
@@ -3552,7 +4034,7 @@
 </c:chartSpace>
 </file>
 
-<file path=ppt/charts/chart8.xml><?xml version="1.0" encoding="utf-8"?>
+<file path=ppt/charts/chart9.xml><?xml version="1.0" encoding="utf-8"?>
 <c:chartSpace xmlns:c="http://schemas.openxmlformats.org/drawingml/2006/chart" xmlns:a="http://schemas.openxmlformats.org/drawingml/2006/main" xmlns:r="http://schemas.openxmlformats.org/officeDocument/2006/relationships" xmlns:c16r2="http://schemas.microsoft.com/office/drawing/2015/06/chart">
   <c:date1904 val="0"/>
   <c:lang val="en-US"/>
@@ -4809,6 +5291,46 @@
 </cs:colorStyle>
 </file>
 
+<file path=ppt/charts/colors9.xml><?xml version="1.0" encoding="utf-8"?>
+<cs:colorStyle xmlns:cs="http://schemas.microsoft.com/office/drawing/2012/chartStyle" xmlns:a="http://schemas.openxmlformats.org/drawingml/2006/main" meth="cycle" id="10">
+  <a:schemeClr val="accent1"/>
+  <a:schemeClr val="accent2"/>
+  <a:schemeClr val="accent3"/>
+  <a:schemeClr val="accent4"/>
+  <a:schemeClr val="accent5"/>
+  <a:schemeClr val="accent6"/>
+  <cs:variation/>
+  <cs:variation>
+    <a:lumMod val="60000"/>
+  </cs:variation>
+  <cs:variation>
+    <a:lumMod val="80000"/>
+    <a:lumOff val="20000"/>
+  </cs:variation>
+  <cs:variation>
+    <a:lumMod val="80000"/>
+  </cs:variation>
+  <cs:variation>
+    <a:lumMod val="60000"/>
+    <a:lumOff val="40000"/>
+  </cs:variation>
+  <cs:variation>
+    <a:lumMod val="50000"/>
+  </cs:variation>
+  <cs:variation>
+    <a:lumMod val="70000"/>
+    <a:lumOff val="30000"/>
+  </cs:variation>
+  <cs:variation>
+    <a:lumMod val="70000"/>
+  </cs:variation>
+  <cs:variation>
+    <a:lumMod val="50000"/>
+    <a:lumOff val="50000"/>
+  </cs:variation>
+</cs:colorStyle>
+</file>
+
 <file path=ppt/charts/style1.xml><?xml version="1.0" encoding="utf-8"?>
 <cs:chartStyle xmlns:cs="http://schemas.microsoft.com/office/drawing/2012/chartStyle" xmlns:a="http://schemas.openxmlformats.org/drawingml/2006/main" id="201">
   <cs:axisTitle>
@@ -6822,7 +7344,7 @@
 </file>
 
 <file path=ppt/charts/style5.xml><?xml version="1.0" encoding="utf-8"?>
-<cs:chartStyle xmlns:cs="http://schemas.microsoft.com/office/drawing/2012/chartStyle" xmlns:a="http://schemas.openxmlformats.org/drawingml/2006/main" id="317">
+<cs:chartStyle xmlns:cs="http://schemas.microsoft.com/office/drawing/2012/chartStyle" xmlns:a="http://schemas.openxmlformats.org/drawingml/2006/main" id="201">
   <cs:axisTitle>
     <cs:lnRef idx="0"/>
     <cs:fillRef idx="0"/>
@@ -7026,23 +7548,22 @@
     <cs:fillRef idx="0"/>
     <cs:effectRef idx="0"/>
     <cs:fontRef idx="minor">
-      <a:schemeClr val="tx1"/>
+      <a:schemeClr val="dk1"/>
     </cs:fontRef>
     <cs:spPr>
       <a:solidFill>
         <a:schemeClr val="dk1">
-          <a:lumMod val="75000"/>
-          <a:lumOff val="25000"/>
+          <a:lumMod val="65000"/>
+          <a:lumOff val="35000"/>
         </a:schemeClr>
       </a:solidFill>
-      <a:ln w="9525" cap="flat" cmpd="sng" algn="ctr">
+      <a:ln w="9525">
         <a:solidFill>
           <a:schemeClr val="tx1">
             <a:lumMod val="65000"/>
             <a:lumOff val="35000"/>
           </a:schemeClr>
         </a:solidFill>
-        <a:round/>
       </a:ln>
     </cs:spPr>
   </cs:downBar>
@@ -7147,8 +7668,8 @@
       <a:ln w="9525" cap="flat" cmpd="sng" algn="ctr">
         <a:solidFill>
           <a:schemeClr val="tx1">
-            <a:lumMod val="50000"/>
-            <a:lumOff val="50000"/>
+            <a:lumMod val="75000"/>
+            <a:lumOff val="25000"/>
           </a:schemeClr>
         </a:solidFill>
         <a:round/>
@@ -7280,20 +7801,19 @@
     <cs:fillRef idx="0"/>
     <cs:effectRef idx="0"/>
     <cs:fontRef idx="minor">
-      <a:schemeClr val="tx1"/>
+      <a:schemeClr val="dk1"/>
     </cs:fontRef>
     <cs:spPr>
       <a:solidFill>
         <a:schemeClr val="lt1"/>
       </a:solidFill>
-      <a:ln w="9525" cap="flat" cmpd="sng" algn="ctr">
+      <a:ln w="9525">
         <a:solidFill>
           <a:schemeClr val="tx1">
-            <a:lumMod val="65000"/>
-            <a:lumOff val="35000"/>
+            <a:lumMod val="15000"/>
+            <a:lumOff val="85000"/>
           </a:schemeClr>
         </a:solidFill>
-        <a:round/>
       </a:ln>
     </cs:spPr>
   </cs:upBar>
@@ -7832,6 +8352,511 @@
 </file>
 
 <file path=ppt/charts/style7.xml><?xml version="1.0" encoding="utf-8"?>
+<cs:chartStyle xmlns:cs="http://schemas.microsoft.com/office/drawing/2012/chartStyle" xmlns:a="http://schemas.openxmlformats.org/drawingml/2006/main" id="317">
+  <cs:axisTitle>
+    <cs:lnRef idx="0"/>
+    <cs:fillRef idx="0"/>
+    <cs:effectRef idx="0"/>
+    <cs:fontRef idx="minor">
+      <a:schemeClr val="tx1">
+        <a:lumMod val="65000"/>
+        <a:lumOff val="35000"/>
+      </a:schemeClr>
+    </cs:fontRef>
+    <cs:defRPr sz="1330" kern="1200"/>
+  </cs:axisTitle>
+  <cs:categoryAxis>
+    <cs:lnRef idx="0"/>
+    <cs:fillRef idx="0"/>
+    <cs:effectRef idx="0"/>
+    <cs:fontRef idx="minor">
+      <a:schemeClr val="tx1">
+        <a:lumMod val="65000"/>
+        <a:lumOff val="35000"/>
+      </a:schemeClr>
+    </cs:fontRef>
+    <cs:spPr>
+      <a:ln w="9525" cap="flat" cmpd="sng" algn="ctr">
+        <a:solidFill>
+          <a:schemeClr val="tx1">
+            <a:lumMod val="15000"/>
+            <a:lumOff val="85000"/>
+          </a:schemeClr>
+        </a:solidFill>
+        <a:round/>
+      </a:ln>
+    </cs:spPr>
+    <cs:defRPr sz="1197" kern="1200"/>
+  </cs:categoryAxis>
+  <cs:chartArea mods="allowNoFillOverride allowNoLineOverride">
+    <cs:lnRef idx="0"/>
+    <cs:fillRef idx="0"/>
+    <cs:effectRef idx="0"/>
+    <cs:fontRef idx="minor">
+      <a:schemeClr val="tx1"/>
+    </cs:fontRef>
+    <cs:spPr>
+      <a:solidFill>
+        <a:schemeClr val="bg1"/>
+      </a:solidFill>
+      <a:ln w="9525" cap="flat" cmpd="sng" algn="ctr">
+        <a:solidFill>
+          <a:schemeClr val="tx1">
+            <a:lumMod val="15000"/>
+            <a:lumOff val="85000"/>
+          </a:schemeClr>
+        </a:solidFill>
+        <a:round/>
+      </a:ln>
+    </cs:spPr>
+    <cs:defRPr sz="1330" kern="1200"/>
+  </cs:chartArea>
+  <cs:dataLabel>
+    <cs:lnRef idx="0"/>
+    <cs:fillRef idx="0"/>
+    <cs:effectRef idx="0"/>
+    <cs:fontRef idx="minor">
+      <a:schemeClr val="tx1">
+        <a:lumMod val="75000"/>
+        <a:lumOff val="25000"/>
+      </a:schemeClr>
+    </cs:fontRef>
+    <cs:defRPr sz="1197" kern="1200"/>
+  </cs:dataLabel>
+  <cs:dataLabelCallout>
+    <cs:lnRef idx="0"/>
+    <cs:fillRef idx="0"/>
+    <cs:effectRef idx="0"/>
+    <cs:fontRef idx="minor">
+      <a:schemeClr val="dk1">
+        <a:lumMod val="65000"/>
+        <a:lumOff val="35000"/>
+      </a:schemeClr>
+    </cs:fontRef>
+    <cs:spPr>
+      <a:solidFill>
+        <a:schemeClr val="lt1"/>
+      </a:solidFill>
+      <a:ln>
+        <a:solidFill>
+          <a:schemeClr val="dk1">
+            <a:lumMod val="25000"/>
+            <a:lumOff val="75000"/>
+          </a:schemeClr>
+        </a:solidFill>
+      </a:ln>
+    </cs:spPr>
+    <cs:defRPr sz="1197" kern="1200"/>
+    <cs:bodyPr rot="0" spcFirstLastPara="1" vertOverflow="clip" horzOverflow="clip" vert="horz" wrap="square" lIns="36576" tIns="18288" rIns="36576" bIns="18288" anchor="ctr" anchorCtr="1">
+      <a:spAutoFit/>
+    </cs:bodyPr>
+  </cs:dataLabelCallout>
+  <cs:dataPoint>
+    <cs:lnRef idx="0"/>
+    <cs:fillRef idx="1">
+      <cs:styleClr val="auto"/>
+    </cs:fillRef>
+    <cs:effectRef idx="0"/>
+    <cs:fontRef idx="minor">
+      <a:schemeClr val="tx1"/>
+    </cs:fontRef>
+  </cs:dataPoint>
+  <cs:dataPoint3D>
+    <cs:lnRef idx="0"/>
+    <cs:fillRef idx="1">
+      <cs:styleClr val="auto"/>
+    </cs:fillRef>
+    <cs:effectRef idx="0"/>
+    <cs:fontRef idx="minor">
+      <a:schemeClr val="tx1"/>
+    </cs:fontRef>
+  </cs:dataPoint3D>
+  <cs:dataPointLine>
+    <cs:lnRef idx="0">
+      <cs:styleClr val="auto"/>
+    </cs:lnRef>
+    <cs:fillRef idx="1"/>
+    <cs:effectRef idx="0"/>
+    <cs:fontRef idx="minor">
+      <a:schemeClr val="tx1"/>
+    </cs:fontRef>
+    <cs:spPr>
+      <a:ln w="28575" cap="rnd">
+        <a:solidFill>
+          <a:schemeClr val="phClr"/>
+        </a:solidFill>
+        <a:round/>
+      </a:ln>
+    </cs:spPr>
+  </cs:dataPointLine>
+  <cs:dataPointMarker>
+    <cs:lnRef idx="0">
+      <cs:styleClr val="auto"/>
+    </cs:lnRef>
+    <cs:fillRef idx="1">
+      <cs:styleClr val="auto"/>
+    </cs:fillRef>
+    <cs:effectRef idx="0"/>
+    <cs:fontRef idx="minor">
+      <a:schemeClr val="tx1"/>
+    </cs:fontRef>
+    <cs:spPr>
+      <a:ln w="9525">
+        <a:solidFill>
+          <a:schemeClr val="phClr"/>
+        </a:solidFill>
+      </a:ln>
+    </cs:spPr>
+  </cs:dataPointMarker>
+  <cs:dataPointMarkerLayout symbol="circle" size="5"/>
+  <cs:dataPointWireframe>
+    <cs:lnRef idx="0">
+      <cs:styleClr val="auto"/>
+    </cs:lnRef>
+    <cs:fillRef idx="1"/>
+    <cs:effectRef idx="0"/>
+    <cs:fontRef idx="minor">
+      <a:schemeClr val="tx1"/>
+    </cs:fontRef>
+    <cs:spPr>
+      <a:ln w="9525" cap="rnd">
+        <a:solidFill>
+          <a:schemeClr val="phClr"/>
+        </a:solidFill>
+        <a:round/>
+      </a:ln>
+    </cs:spPr>
+  </cs:dataPointWireframe>
+  <cs:dataTable>
+    <cs:lnRef idx="0"/>
+    <cs:fillRef idx="0"/>
+    <cs:effectRef idx="0"/>
+    <cs:fontRef idx="minor">
+      <a:schemeClr val="tx1">
+        <a:lumMod val="65000"/>
+        <a:lumOff val="35000"/>
+      </a:schemeClr>
+    </cs:fontRef>
+    <cs:spPr>
+      <a:noFill/>
+      <a:ln w="9525" cap="flat" cmpd="sng" algn="ctr">
+        <a:solidFill>
+          <a:schemeClr val="tx1">
+            <a:lumMod val="15000"/>
+            <a:lumOff val="85000"/>
+          </a:schemeClr>
+        </a:solidFill>
+        <a:round/>
+      </a:ln>
+    </cs:spPr>
+    <cs:defRPr sz="1197" kern="1200"/>
+  </cs:dataTable>
+  <cs:downBar>
+    <cs:lnRef idx="0"/>
+    <cs:fillRef idx="0"/>
+    <cs:effectRef idx="0"/>
+    <cs:fontRef idx="minor">
+      <a:schemeClr val="tx1"/>
+    </cs:fontRef>
+    <cs:spPr>
+      <a:solidFill>
+        <a:schemeClr val="dk1">
+          <a:lumMod val="75000"/>
+          <a:lumOff val="25000"/>
+        </a:schemeClr>
+      </a:solidFill>
+      <a:ln w="9525" cap="flat" cmpd="sng" algn="ctr">
+        <a:solidFill>
+          <a:schemeClr val="tx1">
+            <a:lumMod val="65000"/>
+            <a:lumOff val="35000"/>
+          </a:schemeClr>
+        </a:solidFill>
+        <a:round/>
+      </a:ln>
+    </cs:spPr>
+  </cs:downBar>
+  <cs:dropLine>
+    <cs:lnRef idx="0"/>
+    <cs:fillRef idx="0"/>
+    <cs:effectRef idx="0"/>
+    <cs:fontRef idx="minor">
+      <a:schemeClr val="tx1"/>
+    </cs:fontRef>
+    <cs:spPr>
+      <a:ln w="9525" cap="flat" cmpd="sng" algn="ctr">
+        <a:solidFill>
+          <a:schemeClr val="tx1">
+            <a:lumMod val="35000"/>
+            <a:lumOff val="65000"/>
+          </a:schemeClr>
+        </a:solidFill>
+        <a:round/>
+      </a:ln>
+    </cs:spPr>
+  </cs:dropLine>
+  <cs:errorBar>
+    <cs:lnRef idx="0"/>
+    <cs:fillRef idx="0"/>
+    <cs:effectRef idx="0"/>
+    <cs:fontRef idx="minor">
+      <a:schemeClr val="tx1"/>
+    </cs:fontRef>
+    <cs:spPr>
+      <a:ln w="9525" cap="flat" cmpd="sng" algn="ctr">
+        <a:solidFill>
+          <a:schemeClr val="tx1">
+            <a:lumMod val="65000"/>
+            <a:lumOff val="35000"/>
+          </a:schemeClr>
+        </a:solidFill>
+        <a:round/>
+      </a:ln>
+    </cs:spPr>
+  </cs:errorBar>
+  <cs:floor>
+    <cs:lnRef idx="0"/>
+    <cs:fillRef idx="0"/>
+    <cs:effectRef idx="0"/>
+    <cs:fontRef idx="minor">
+      <a:schemeClr val="tx1"/>
+    </cs:fontRef>
+    <cs:spPr>
+      <a:noFill/>
+      <a:ln>
+        <a:noFill/>
+      </a:ln>
+    </cs:spPr>
+  </cs:floor>
+  <cs:gridlineMajor>
+    <cs:lnRef idx="0"/>
+    <cs:fillRef idx="0"/>
+    <cs:effectRef idx="0"/>
+    <cs:fontRef idx="minor">
+      <a:schemeClr val="tx1"/>
+    </cs:fontRef>
+    <cs:spPr>
+      <a:ln w="9525" cap="flat" cmpd="sng" algn="ctr">
+        <a:solidFill>
+          <a:schemeClr val="tx1">
+            <a:lumMod val="15000"/>
+            <a:lumOff val="85000"/>
+          </a:schemeClr>
+        </a:solidFill>
+        <a:round/>
+      </a:ln>
+    </cs:spPr>
+  </cs:gridlineMajor>
+  <cs:gridlineMinor>
+    <cs:lnRef idx="0"/>
+    <cs:fillRef idx="0"/>
+    <cs:effectRef idx="0"/>
+    <cs:fontRef idx="minor">
+      <a:schemeClr val="tx1"/>
+    </cs:fontRef>
+    <cs:spPr>
+      <a:ln w="9525" cap="flat" cmpd="sng" algn="ctr">
+        <a:solidFill>
+          <a:schemeClr val="tx1">
+            <a:lumMod val="5000"/>
+            <a:lumOff val="95000"/>
+          </a:schemeClr>
+        </a:solidFill>
+        <a:round/>
+      </a:ln>
+    </cs:spPr>
+  </cs:gridlineMinor>
+  <cs:hiLoLine>
+    <cs:lnRef idx="0"/>
+    <cs:fillRef idx="0"/>
+    <cs:effectRef idx="0"/>
+    <cs:fontRef idx="minor">
+      <a:schemeClr val="tx1"/>
+    </cs:fontRef>
+    <cs:spPr>
+      <a:ln w="9525" cap="flat" cmpd="sng" algn="ctr">
+        <a:solidFill>
+          <a:schemeClr val="tx1">
+            <a:lumMod val="50000"/>
+            <a:lumOff val="50000"/>
+          </a:schemeClr>
+        </a:solidFill>
+        <a:round/>
+      </a:ln>
+    </cs:spPr>
+  </cs:hiLoLine>
+  <cs:leaderLine>
+    <cs:lnRef idx="0"/>
+    <cs:fillRef idx="0"/>
+    <cs:effectRef idx="0"/>
+    <cs:fontRef idx="minor">
+      <a:schemeClr val="tx1"/>
+    </cs:fontRef>
+    <cs:spPr>
+      <a:ln w="9525" cap="flat" cmpd="sng" algn="ctr">
+        <a:solidFill>
+          <a:schemeClr val="tx1">
+            <a:lumMod val="35000"/>
+            <a:lumOff val="65000"/>
+          </a:schemeClr>
+        </a:solidFill>
+        <a:round/>
+      </a:ln>
+    </cs:spPr>
+  </cs:leaderLine>
+  <cs:legend>
+    <cs:lnRef idx="0"/>
+    <cs:fillRef idx="0"/>
+    <cs:effectRef idx="0"/>
+    <cs:fontRef idx="minor">
+      <a:schemeClr val="tx1">
+        <a:lumMod val="65000"/>
+        <a:lumOff val="35000"/>
+      </a:schemeClr>
+    </cs:fontRef>
+    <cs:defRPr sz="1197" kern="1200"/>
+  </cs:legend>
+  <cs:plotArea mods="allowNoFillOverride allowNoLineOverride">
+    <cs:lnRef idx="0"/>
+    <cs:fillRef idx="0"/>
+    <cs:effectRef idx="0"/>
+    <cs:fontRef idx="minor">
+      <a:schemeClr val="tx1"/>
+    </cs:fontRef>
+  </cs:plotArea>
+  <cs:plotArea3D mods="allowNoFillOverride allowNoLineOverride">
+    <cs:lnRef idx="0"/>
+    <cs:fillRef idx="0"/>
+    <cs:effectRef idx="0"/>
+    <cs:fontRef idx="minor">
+      <a:schemeClr val="tx1"/>
+    </cs:fontRef>
+  </cs:plotArea3D>
+  <cs:seriesAxis>
+    <cs:lnRef idx="0"/>
+    <cs:fillRef idx="0"/>
+    <cs:effectRef idx="0"/>
+    <cs:fontRef idx="minor">
+      <a:schemeClr val="tx1">
+        <a:lumMod val="65000"/>
+        <a:lumOff val="35000"/>
+      </a:schemeClr>
+    </cs:fontRef>
+    <cs:defRPr sz="1197" kern="1200"/>
+  </cs:seriesAxis>
+  <cs:seriesLine>
+    <cs:lnRef idx="0"/>
+    <cs:fillRef idx="0"/>
+    <cs:effectRef idx="0"/>
+    <cs:fontRef idx="minor">
+      <a:schemeClr val="tx1"/>
+    </cs:fontRef>
+    <cs:spPr>
+      <a:ln w="9525" cap="flat" cmpd="sng" algn="ctr">
+        <a:solidFill>
+          <a:schemeClr val="tx1">
+            <a:lumMod val="35000"/>
+            <a:lumOff val="65000"/>
+          </a:schemeClr>
+        </a:solidFill>
+        <a:round/>
+      </a:ln>
+    </cs:spPr>
+  </cs:seriesLine>
+  <cs:title>
+    <cs:lnRef idx="0"/>
+    <cs:fillRef idx="0"/>
+    <cs:effectRef idx="0"/>
+    <cs:fontRef idx="minor">
+      <a:schemeClr val="tx1">
+        <a:lumMod val="65000"/>
+        <a:lumOff val="35000"/>
+      </a:schemeClr>
+    </cs:fontRef>
+    <cs:defRPr sz="1862" b="0" kern="1200" spc="0" baseline="0"/>
+  </cs:title>
+  <cs:trendline>
+    <cs:lnRef idx="0">
+      <cs:styleClr val="auto"/>
+    </cs:lnRef>
+    <cs:fillRef idx="0"/>
+    <cs:effectRef idx="0"/>
+    <cs:fontRef idx="minor">
+      <a:schemeClr val="tx1"/>
+    </cs:fontRef>
+    <cs:spPr>
+      <a:ln w="19050" cap="rnd">
+        <a:solidFill>
+          <a:schemeClr val="phClr"/>
+        </a:solidFill>
+        <a:prstDash val="sysDot"/>
+      </a:ln>
+    </cs:spPr>
+  </cs:trendline>
+  <cs:trendlineLabel>
+    <cs:lnRef idx="0"/>
+    <cs:fillRef idx="0"/>
+    <cs:effectRef idx="0"/>
+    <cs:fontRef idx="minor">
+      <a:schemeClr val="tx1">
+        <a:lumMod val="65000"/>
+        <a:lumOff val="35000"/>
+      </a:schemeClr>
+    </cs:fontRef>
+    <cs:defRPr sz="1197" kern="1200"/>
+  </cs:trendlineLabel>
+  <cs:upBar>
+    <cs:lnRef idx="0"/>
+    <cs:fillRef idx="0"/>
+    <cs:effectRef idx="0"/>
+    <cs:fontRef idx="minor">
+      <a:schemeClr val="tx1"/>
+    </cs:fontRef>
+    <cs:spPr>
+      <a:solidFill>
+        <a:schemeClr val="lt1"/>
+      </a:solidFill>
+      <a:ln w="9525" cap="flat" cmpd="sng" algn="ctr">
+        <a:solidFill>
+          <a:schemeClr val="tx1">
+            <a:lumMod val="65000"/>
+            <a:lumOff val="35000"/>
+          </a:schemeClr>
+        </a:solidFill>
+        <a:round/>
+      </a:ln>
+    </cs:spPr>
+  </cs:upBar>
+  <cs:valueAxis>
+    <cs:lnRef idx="0"/>
+    <cs:fillRef idx="0"/>
+    <cs:effectRef idx="0"/>
+    <cs:fontRef idx="minor">
+      <a:schemeClr val="tx1">
+        <a:lumMod val="65000"/>
+        <a:lumOff val="35000"/>
+      </a:schemeClr>
+    </cs:fontRef>
+    <cs:defRPr sz="1197" kern="1200"/>
+  </cs:valueAxis>
+  <cs:wall>
+    <cs:lnRef idx="0"/>
+    <cs:fillRef idx="0"/>
+    <cs:effectRef idx="0"/>
+    <cs:fontRef idx="minor">
+      <a:schemeClr val="tx1"/>
+    </cs:fontRef>
+    <cs:spPr>
+      <a:noFill/>
+      <a:ln>
+        <a:noFill/>
+      </a:ln>
+    </cs:spPr>
+  </cs:wall>
+</cs:chartStyle>
+</file>
+
+<file path=ppt/charts/style8.xml><?xml version="1.0" encoding="utf-8"?>
 <cs:chartStyle xmlns:cs="http://schemas.microsoft.com/office/drawing/2012/chartStyle" xmlns:a="http://schemas.openxmlformats.org/drawingml/2006/main" id="258">
   <cs:axisTitle>
     <cs:lnRef idx="0"/>
@@ -8348,7 +9373,7 @@
 </cs:chartStyle>
 </file>
 
-<file path=ppt/charts/style8.xml><?xml version="1.0" encoding="utf-8"?>
+<file path=ppt/charts/style9.xml><?xml version="1.0" encoding="utf-8"?>
 <cs:chartStyle xmlns:cs="http://schemas.microsoft.com/office/drawing/2012/chartStyle" xmlns:a="http://schemas.openxmlformats.org/drawingml/2006/main" id="344">
   <cs:axisTitle>
     <cs:lnRef idx="0"/>
@@ -8932,7 +9957,7 @@
           <a:p>
             <a:fld id="{BE7CF963-E58D-FC4D-BA9E-60A980752DC6}" type="datetimeFigureOut">
               <a:rPr lang="en-US" smtClean="0"/>
-              <a:t>7/4/2017</a:t>
+              <a:t>6/26/2018</a:t>
             </a:fld>
             <a:endParaRPr lang="en-US"/>
           </a:p>
@@ -9421,7 +10446,7 @@
           <a:p>
             <a:fld id="{B590C078-9131-4E49-8A0D-400FEE8377B5}" type="datetimeFigureOut">
               <a:rPr lang="en-US" smtClean="0"/>
-              <a:t>7/4/2017</a:t>
+              <a:t>6/26/2018</a:t>
             </a:fld>
             <a:endParaRPr lang="en-US"/>
           </a:p>
@@ -13006,7 +14031,7 @@
           <a:p>
             <a:fld id="{B590C078-9131-4E49-8A0D-400FEE8377B5}" type="datetimeFigureOut">
               <a:rPr lang="en-US" smtClean="0"/>
-              <a:t>7/4/2017</a:t>
+              <a:t>6/26/2018</a:t>
             </a:fld>
             <a:endParaRPr lang="en-US"/>
           </a:p>
@@ -17084,7 +18109,7 @@
           <a:p>
             <a:fld id="{B590C078-9131-4E49-8A0D-400FEE8377B5}" type="datetimeFigureOut">
               <a:rPr lang="en-US" smtClean="0"/>
-              <a:t>7/4/2017</a:t>
+              <a:t>6/26/2018</a:t>
             </a:fld>
             <a:endParaRPr lang="en-US"/>
           </a:p>
@@ -20909,7 +21934,7 @@
           <a:p>
             <a:fld id="{B590C078-9131-4E49-8A0D-400FEE8377B5}" type="datetimeFigureOut">
               <a:rPr lang="en-US" smtClean="0"/>
-              <a:t>7/4/2017</a:t>
+              <a:t>6/26/2018</a:t>
             </a:fld>
             <a:endParaRPr lang="en-US"/>
           </a:p>
@@ -21486,6 +22511,138 @@
 </p:sld>
 </file>
 
+<file path=ppt/slides/slide10.xml><?xml version="1.0" encoding="utf-8"?>
+<p:sld xmlns:a="http://schemas.openxmlformats.org/drawingml/2006/main" xmlns:r="http://schemas.openxmlformats.org/officeDocument/2006/relationships" xmlns:p="http://schemas.openxmlformats.org/presentationml/2006/main">
+  <p:cSld>
+    <p:spTree>
+      <p:nvGrpSpPr>
+        <p:cNvPr id="1" name=""/>
+        <p:cNvGrpSpPr/>
+        <p:nvPr/>
+      </p:nvGrpSpPr>
+      <p:grpSpPr>
+        <a:xfrm>
+          <a:off x="0" y="0"/>
+          <a:ext cx="0" cy="0"/>
+          <a:chOff x="0" y="0"/>
+          <a:chExt cx="0" cy="0"/>
+        </a:xfrm>
+      </p:grpSpPr>
+      <p:sp>
+        <p:nvSpPr>
+          <p:cNvPr id="2" name="Title 1"/>
+          <p:cNvSpPr>
+            <a:spLocks noGrp="1"/>
+          </p:cNvSpPr>
+          <p:nvPr>
+            <p:ph type="title"/>
+          </p:nvPr>
+        </p:nvSpPr>
+        <p:spPr/>
+        <p:txBody>
+          <a:bodyPr/>
+          <a:lstStyle/>
+          <a:p>
+            <a:r>
+              <a:rPr lang="en-US" dirty="0"/>
+              <a:t>Pie chart</a:t>
+            </a:r>
+          </a:p>
+        </p:txBody>
+      </p:sp>
+      <p:sp>
+        <p:nvSpPr>
+          <p:cNvPr id="3" name="Text Placeholder 2"/>
+          <p:cNvSpPr>
+            <a:spLocks noGrp="1"/>
+          </p:cNvSpPr>
+          <p:nvPr>
+            <p:ph type="body" sz="quarter" idx="13"/>
+          </p:nvPr>
+        </p:nvSpPr>
+        <p:spPr>
+          <a:xfrm>
+            <a:off x="642730" y="1081253"/>
+            <a:ext cx="10939670" cy="4351338"/>
+          </a:xfrm>
+        </p:spPr>
+        <p:txBody>
+          <a:bodyPr/>
+          <a:lstStyle/>
+          <a:p>
+            <a:r>
+              <a:rPr lang="en-US" sz="1200" dirty="0"/>
+              <a:t>GRAPH;GENERIC_GRAPH;ROW1=TECHNOLOGIES,COL1=METRICS,TECHNOLOGIES=ALL,METRICS=10151</a:t>
+            </a:r>
+          </a:p>
+          <a:p>
+            <a:r>
+              <a:rPr lang="en-US" sz="1200" dirty="0"/>
+              <a:t>GRAPH;GENERIC_GRAPH;ROW1=MODULES,COL1=METRICS,MODULES=ALL,METRICS=10151</a:t>
+            </a:r>
+          </a:p>
+          <a:p>
+            <a:endParaRPr lang="en-US" dirty="0"/>
+          </a:p>
+        </p:txBody>
+      </p:sp>
+      <p:graphicFrame>
+        <p:nvGraphicFramePr>
+          <p:cNvPr id="4" name="Chart 3" descr="GRAPH;GENERIC_GRAPH;ROW1=TECHNOLOGIES,COL1=METRICS,TECHNOLOGIES=ALL,METRICS=10151"/>
+          <p:cNvGraphicFramePr/>
+          <p:nvPr>
+            <p:extLst>
+              <p:ext uri="{D42A27DB-BD31-4B8C-83A1-F6EECF244321}">
+                <p14:modId xmlns:p14="http://schemas.microsoft.com/office/powerpoint/2010/main" val="3288610499"/>
+              </p:ext>
+            </p:extLst>
+          </p:nvPr>
+        </p:nvGraphicFramePr>
+        <p:xfrm>
+          <a:off x="642730" y="2089269"/>
+          <a:ext cx="5337656" cy="3828055"/>
+        </p:xfrm>
+        <a:graphic>
+          <a:graphicData uri="http://schemas.openxmlformats.org/drawingml/2006/chart">
+            <c:chart xmlns:c="http://schemas.openxmlformats.org/drawingml/2006/chart" xmlns:r="http://schemas.openxmlformats.org/officeDocument/2006/relationships" r:id="rId2"/>
+          </a:graphicData>
+        </a:graphic>
+      </p:graphicFrame>
+      <p:graphicFrame>
+        <p:nvGraphicFramePr>
+          <p:cNvPr id="5" name="Chart 4" descr="GRAPH;GENERIC_GRAPH;ROW1=MODULES,COL1=METRICS,MODULES=ALL,METRICS=10151"/>
+          <p:cNvGraphicFramePr/>
+          <p:nvPr>
+            <p:extLst>
+              <p:ext uri="{D42A27DB-BD31-4B8C-83A1-F6EECF244321}">
+                <p14:modId xmlns:p14="http://schemas.microsoft.com/office/powerpoint/2010/main" val="2724615435"/>
+              </p:ext>
+            </p:extLst>
+          </p:nvPr>
+        </p:nvGraphicFramePr>
+        <p:xfrm>
+          <a:off x="5900529" y="2089269"/>
+          <a:ext cx="5524215" cy="3691421"/>
+        </p:xfrm>
+        <a:graphic>
+          <a:graphicData uri="http://schemas.openxmlformats.org/drawingml/2006/chart">
+            <c:chart xmlns:c="http://schemas.openxmlformats.org/drawingml/2006/chart" xmlns:r="http://schemas.openxmlformats.org/officeDocument/2006/relationships" r:id="rId3"/>
+          </a:graphicData>
+        </a:graphic>
+      </p:graphicFrame>
+    </p:spTree>
+    <p:extLst>
+      <p:ext uri="{BB962C8B-B14F-4D97-AF65-F5344CB8AC3E}">
+        <p14:creationId xmlns:p14="http://schemas.microsoft.com/office/powerpoint/2010/main" val="792657900"/>
+      </p:ext>
+    </p:extLst>
+  </p:cSld>
+  <p:clrMapOvr>
+    <a:masterClrMapping/>
+  </p:clrMapOvr>
+</p:sld>
+</file>
+
 <file path=ppt/slides/slide2.xml><?xml version="1.0" encoding="utf-8"?>
 <p:sld xmlns:a="http://schemas.openxmlformats.org/drawingml/2006/main" xmlns:r="http://schemas.openxmlformats.org/officeDocument/2006/relationships" xmlns:p="http://schemas.openxmlformats.org/presentationml/2006/main">
   <p:cSld>
@@ -21563,7 +22720,7 @@
         </p:nvSpPr>
         <p:spPr>
           <a:xfrm>
-            <a:off x="726141" y="6257364"/>
+            <a:off x="744070" y="5764646"/>
             <a:ext cx="10703859" cy="367553"/>
           </a:xfrm>
           <a:prstGeom prst="rect">
@@ -21728,21 +22885,8 @@
                   <a:schemeClr val="accent1"/>
                 </a:solidFill>
               </a:rPr>
-              <a:t>CRITICAL</a:t>
-            </a:r>
-            <a:r>
-              <a:rPr lang="fr-FR">
-                <a:solidFill>
-                  <a:schemeClr val="accent1"/>
-                </a:solidFill>
-              </a:rPr>
-              <a:t>_VIOLATIONS *</a:t>
-            </a:r>
-            <a:endParaRPr lang="fr-FR" dirty="0">
-              <a:solidFill>
-                <a:schemeClr val="accent1"/>
-              </a:solidFill>
-            </a:endParaRPr>
+              <a:t>CRITICAL_VIOLATIONS *</a:t>
+            </a:r>
           </a:p>
         </p:txBody>
       </p:sp>
@@ -23375,6 +24519,122 @@
             <a:r>
               <a:rPr lang="en-US" sz="1200" dirty="0"/>
               <a:t>CRITICAL_QUALITY_RULES</a:t>
+            </a:r>
+            <a:endParaRPr lang="en-US" dirty="0"/>
+          </a:p>
+        </p:txBody>
+      </p:sp>
+      <p:sp>
+        <p:nvSpPr>
+          <p:cNvPr id="35" name="Rectangle: Rounded Corners 34">
+            <a:extLst>
+              <a:ext uri="{FF2B5EF4-FFF2-40B4-BE49-F238E27FC236}">
+                <a16:creationId xmlns:a16="http://schemas.microsoft.com/office/drawing/2014/main" id="{F2270BD1-60A3-4E04-AB63-4A4ECBC0191A}"/>
+              </a:ext>
+            </a:extLst>
+          </p:cNvPr>
+          <p:cNvSpPr/>
+          <p:nvPr/>
+        </p:nvSpPr>
+        <p:spPr>
+          <a:xfrm>
+            <a:off x="4686677" y="3490689"/>
+            <a:ext cx="2382338" cy="322080"/>
+          </a:xfrm>
+          <a:prstGeom prst="roundRect">
+            <a:avLst/>
+          </a:prstGeom>
+          <a:solidFill>
+            <a:schemeClr val="accent2"/>
+          </a:solidFill>
+          <a:ln>
+            <a:noFill/>
+          </a:ln>
+        </p:spPr>
+        <p:style>
+          <a:lnRef idx="2">
+            <a:schemeClr val="accent1">
+              <a:shade val="50000"/>
+            </a:schemeClr>
+          </a:lnRef>
+          <a:fillRef idx="1">
+            <a:schemeClr val="accent1"/>
+          </a:fillRef>
+          <a:effectRef idx="0">
+            <a:schemeClr val="accent1"/>
+          </a:effectRef>
+          <a:fontRef idx="minor">
+            <a:schemeClr val="lt1"/>
+          </a:fontRef>
+        </p:style>
+        <p:txBody>
+          <a:bodyPr rtlCol="0" anchor="ctr"/>
+          <a:lstStyle/>
+          <a:p>
+            <a:pPr algn="ctr"/>
+            <a:r>
+              <a:rPr lang="en-US" sz="1200" dirty="0"/>
+              <a:t>&lt;STANDARD TAG NAME&gt;**</a:t>
+            </a:r>
+          </a:p>
+        </p:txBody>
+      </p:sp>
+      <p:sp>
+        <p:nvSpPr>
+          <p:cNvPr id="36" name="TextBox 35">
+            <a:extLst>
+              <a:ext uri="{FF2B5EF4-FFF2-40B4-BE49-F238E27FC236}">
+                <a16:creationId xmlns:a16="http://schemas.microsoft.com/office/drawing/2014/main" id="{5ED69680-1964-47F4-A9EB-64FE0F09C846}"/>
+              </a:ext>
+            </a:extLst>
+          </p:cNvPr>
+          <p:cNvSpPr txBox="1"/>
+          <p:nvPr/>
+        </p:nvSpPr>
+        <p:spPr>
+          <a:xfrm>
+            <a:off x="715662" y="6052369"/>
+            <a:ext cx="10703859" cy="447383"/>
+          </a:xfrm>
+          <a:prstGeom prst="rect">
+            <a:avLst/>
+          </a:prstGeom>
+        </p:spPr>
+        <p:txBody>
+          <a:bodyPr vert="horz" wrap="square" lIns="91440" tIns="45720" rIns="91440" bIns="45720" rtlCol="0" anchor="t">
+            <a:noAutofit/>
+          </a:bodyPr>
+          <a:lstStyle>
+            <a:defPPr>
+              <a:defRPr lang="en-US"/>
+            </a:defPPr>
+            <a:lvl1pPr>
+              <a:defRPr sz="1200">
+                <a:solidFill>
+                  <a:schemeClr val="tx1">
+                    <a:lumMod val="50000"/>
+                    <a:lumOff val="50000"/>
+                  </a:schemeClr>
+                </a:solidFill>
+              </a:defRPr>
+            </a:lvl1pPr>
+          </a:lstStyle>
+          <a:p>
+            <a:r>
+              <a:rPr lang="en-US" dirty="0"/>
+              <a:t>** </a:t>
+            </a:r>
+            <a:r>
+              <a:rPr lang="en-GB" dirty="0"/>
+              <a:t>The selection of metrics by standard quality tag name should only be used for an application where the extension “Standard Quality Rules” is installed. If not, no metrics will be selected and </a:t>
+            </a:r>
+            <a:r>
+              <a:rPr lang="en-US" dirty="0"/>
+              <a:t>graph</a:t>
+            </a:r>
+            <a:r>
+              <a:rPr lang="en-GB" dirty="0"/>
+              <a:t> will be empty.</a:t>
             </a:r>
             <a:endParaRPr lang="en-US" dirty="0"/>
           </a:p>
@@ -24652,6 +25912,166 @@
           <a:p>
             <a:r>
               <a:rPr lang="en-US" dirty="0"/>
+              <a:t>Stacked Bar – sample with Standard Quality Rules</a:t>
+            </a:r>
+          </a:p>
+        </p:txBody>
+      </p:sp>
+      <p:sp>
+        <p:nvSpPr>
+          <p:cNvPr id="4" name="Text Placeholder 2"/>
+          <p:cNvSpPr>
+            <a:spLocks noGrp="1"/>
+          </p:cNvSpPr>
+          <p:nvPr>
+            <p:ph type="body" sz="quarter" idx="13"/>
+          </p:nvPr>
+        </p:nvSpPr>
+        <p:spPr>
+          <a:xfrm>
+            <a:off x="642730" y="980148"/>
+            <a:ext cx="10939670" cy="400110"/>
+          </a:xfrm>
+        </p:spPr>
+        <p:txBody>
+          <a:bodyPr>
+            <a:normAutofit/>
+          </a:bodyPr>
+          <a:lstStyle/>
+          <a:p>
+            <a:r>
+              <a:rPr lang="en-US" sz="1200" dirty="0"/>
+              <a:t>GRAPH;GENERIC_GRAPH;COL1=VIOLATIONS,ROW1=METRICS,VIOLATIONS=ALL,METRICS=CWE</a:t>
+            </a:r>
+          </a:p>
+        </p:txBody>
+      </p:sp>
+      <p:graphicFrame>
+        <p:nvGraphicFramePr>
+          <p:cNvPr id="6" name="Chart 5" descr="GRAPH;GENERIC_GRAPH;COL1=VIOLATIONS,ROW1=METRICS,VIOLATIONS=ALL,METRICS=CWE;"/>
+          <p:cNvGraphicFramePr/>
+          <p:nvPr>
+            <p:extLst>
+              <p:ext uri="{D42A27DB-BD31-4B8C-83A1-F6EECF244321}">
+                <p14:modId xmlns:p14="http://schemas.microsoft.com/office/powerpoint/2010/main" val="226504414"/>
+              </p:ext>
+            </p:extLst>
+          </p:nvPr>
+        </p:nvGraphicFramePr>
+        <p:xfrm>
+          <a:off x="3030070" y="2207640"/>
+          <a:ext cx="5486399" cy="3081535"/>
+        </p:xfrm>
+        <a:graphic>
+          <a:graphicData uri="http://schemas.openxmlformats.org/drawingml/2006/chart">
+            <c:chart xmlns:c="http://schemas.openxmlformats.org/drawingml/2006/chart" xmlns:r="http://schemas.openxmlformats.org/officeDocument/2006/relationships" r:id="rId2"/>
+          </a:graphicData>
+        </a:graphic>
+      </p:graphicFrame>
+      <p:sp>
+        <p:nvSpPr>
+          <p:cNvPr id="5" name="TextBox 4">
+            <a:extLst>
+              <a:ext uri="{FF2B5EF4-FFF2-40B4-BE49-F238E27FC236}">
+                <a16:creationId xmlns:a16="http://schemas.microsoft.com/office/drawing/2014/main" id="{84253685-C3E1-418B-B51F-E9F2711AA509}"/>
+              </a:ext>
+            </a:extLst>
+          </p:cNvPr>
+          <p:cNvSpPr txBox="1"/>
+          <p:nvPr/>
+        </p:nvSpPr>
+        <p:spPr>
+          <a:xfrm>
+            <a:off x="726141" y="1380124"/>
+            <a:ext cx="10703859" cy="447383"/>
+          </a:xfrm>
+          <a:prstGeom prst="rect">
+            <a:avLst/>
+          </a:prstGeom>
+        </p:spPr>
+        <p:txBody>
+          <a:bodyPr vert="horz" wrap="square" lIns="91440" tIns="45720" rIns="91440" bIns="45720" rtlCol="0" anchor="t">
+            <a:noAutofit/>
+          </a:bodyPr>
+          <a:lstStyle>
+            <a:defPPr>
+              <a:defRPr lang="en-US"/>
+            </a:defPPr>
+            <a:lvl1pPr>
+              <a:defRPr sz="1200">
+                <a:solidFill>
+                  <a:schemeClr val="tx1">
+                    <a:lumMod val="50000"/>
+                    <a:lumOff val="50000"/>
+                  </a:schemeClr>
+                </a:solidFill>
+              </a:defRPr>
+            </a:lvl1pPr>
+          </a:lstStyle>
+          <a:p>
+            <a:r>
+              <a:rPr lang="en-GB" dirty="0"/>
+              <a:t>The selection of metrics by standard quality tag name should only be used for an application where the extension “Standard Quality Rules” is installed. If not, no metrics will be selected and </a:t>
+            </a:r>
+            <a:r>
+              <a:rPr lang="en-US" dirty="0"/>
+              <a:t>graph</a:t>
+            </a:r>
+            <a:r>
+              <a:rPr lang="en-GB" dirty="0"/>
+              <a:t> will be empty.</a:t>
+            </a:r>
+            <a:endParaRPr lang="en-US" dirty="0"/>
+          </a:p>
+        </p:txBody>
+      </p:sp>
+    </p:spTree>
+    <p:extLst>
+      <p:ext uri="{BB962C8B-B14F-4D97-AF65-F5344CB8AC3E}">
+        <p14:creationId xmlns:p14="http://schemas.microsoft.com/office/powerpoint/2010/main" val="1594165088"/>
+      </p:ext>
+    </p:extLst>
+  </p:cSld>
+  <p:clrMapOvr>
+    <a:masterClrMapping/>
+  </p:clrMapOvr>
+</p:sld>
+</file>
+
+<file path=ppt/slides/slide8.xml><?xml version="1.0" encoding="utf-8"?>
+<p:sld xmlns:a="http://schemas.openxmlformats.org/drawingml/2006/main" xmlns:r="http://schemas.openxmlformats.org/officeDocument/2006/relationships" xmlns:p="http://schemas.openxmlformats.org/presentationml/2006/main">
+  <p:cSld>
+    <p:spTree>
+      <p:nvGrpSpPr>
+        <p:cNvPr id="1" name=""/>
+        <p:cNvGrpSpPr/>
+        <p:nvPr/>
+      </p:nvGrpSpPr>
+      <p:grpSpPr>
+        <a:xfrm>
+          <a:off x="0" y="0"/>
+          <a:ext cx="0" cy="0"/>
+          <a:chOff x="0" y="0"/>
+          <a:chExt cx="0" cy="0"/>
+        </a:xfrm>
+      </p:grpSpPr>
+      <p:sp>
+        <p:nvSpPr>
+          <p:cNvPr id="2" name="Title 1"/>
+          <p:cNvSpPr>
+            <a:spLocks noGrp="1"/>
+          </p:cNvSpPr>
+          <p:nvPr>
+            <p:ph type="title"/>
+          </p:nvPr>
+        </p:nvSpPr>
+        <p:spPr/>
+        <p:txBody>
+          <a:bodyPr/>
+          <a:lstStyle/>
+          <a:p>
+            <a:r>
+              <a:rPr lang="en-US" dirty="0"/>
               <a:t>Stacked Bar – sample 2</a:t>
             </a:r>
           </a:p>
@@ -24722,7 +26142,7 @@
 </p:sld>
 </file>
 
-<file path=ppt/slides/slide8.xml><?xml version="1.0" encoding="utf-8"?>
+<file path=ppt/slides/slide9.xml><?xml version="1.0" encoding="utf-8"?>
 <p:sld xmlns:a="http://schemas.openxmlformats.org/drawingml/2006/main" xmlns:r="http://schemas.openxmlformats.org/officeDocument/2006/relationships" xmlns:p="http://schemas.openxmlformats.org/presentationml/2006/main">
   <p:cSld>
     <p:spTree>
@@ -24836,138 +26256,6 @@
     <p:extLst>
       <p:ext uri="{BB962C8B-B14F-4D97-AF65-F5344CB8AC3E}">
         <p14:creationId xmlns:p14="http://schemas.microsoft.com/office/powerpoint/2010/main" val="2552926134"/>
-      </p:ext>
-    </p:extLst>
-  </p:cSld>
-  <p:clrMapOvr>
-    <a:masterClrMapping/>
-  </p:clrMapOvr>
-</p:sld>
-</file>
-
-<file path=ppt/slides/slide9.xml><?xml version="1.0" encoding="utf-8"?>
-<p:sld xmlns:a="http://schemas.openxmlformats.org/drawingml/2006/main" xmlns:r="http://schemas.openxmlformats.org/officeDocument/2006/relationships" xmlns:p="http://schemas.openxmlformats.org/presentationml/2006/main">
-  <p:cSld>
-    <p:spTree>
-      <p:nvGrpSpPr>
-        <p:cNvPr id="1" name=""/>
-        <p:cNvGrpSpPr/>
-        <p:nvPr/>
-      </p:nvGrpSpPr>
-      <p:grpSpPr>
-        <a:xfrm>
-          <a:off x="0" y="0"/>
-          <a:ext cx="0" cy="0"/>
-          <a:chOff x="0" y="0"/>
-          <a:chExt cx="0" cy="0"/>
-        </a:xfrm>
-      </p:grpSpPr>
-      <p:sp>
-        <p:nvSpPr>
-          <p:cNvPr id="2" name="Title 1"/>
-          <p:cNvSpPr>
-            <a:spLocks noGrp="1"/>
-          </p:cNvSpPr>
-          <p:nvPr>
-            <p:ph type="title"/>
-          </p:nvPr>
-        </p:nvSpPr>
-        <p:spPr/>
-        <p:txBody>
-          <a:bodyPr/>
-          <a:lstStyle/>
-          <a:p>
-            <a:r>
-              <a:rPr lang="en-US" dirty="0"/>
-              <a:t>Pie chart</a:t>
-            </a:r>
-          </a:p>
-        </p:txBody>
-      </p:sp>
-      <p:sp>
-        <p:nvSpPr>
-          <p:cNvPr id="3" name="Text Placeholder 2"/>
-          <p:cNvSpPr>
-            <a:spLocks noGrp="1"/>
-          </p:cNvSpPr>
-          <p:nvPr>
-            <p:ph type="body" sz="quarter" idx="13"/>
-          </p:nvPr>
-        </p:nvSpPr>
-        <p:spPr>
-          <a:xfrm>
-            <a:off x="642730" y="1081253"/>
-            <a:ext cx="10939670" cy="4351338"/>
-          </a:xfrm>
-        </p:spPr>
-        <p:txBody>
-          <a:bodyPr/>
-          <a:lstStyle/>
-          <a:p>
-            <a:r>
-              <a:rPr lang="en-US" sz="1200" dirty="0"/>
-              <a:t>GRAPH;GENERIC_GRAPH;ROW1=TECHNOLOGIES,COL1=METRICS,TECHNOLOGIES=ALL,METRICS=10151</a:t>
-            </a:r>
-          </a:p>
-          <a:p>
-            <a:r>
-              <a:rPr lang="en-US" sz="1200" dirty="0"/>
-              <a:t>GRAPH;GENERIC_GRAPH;ROW1=MODULES,COL1=METRICS,MODULES=ALL,METRICS=10151</a:t>
-            </a:r>
-          </a:p>
-          <a:p>
-            <a:endParaRPr lang="en-US" dirty="0"/>
-          </a:p>
-        </p:txBody>
-      </p:sp>
-      <p:graphicFrame>
-        <p:nvGraphicFramePr>
-          <p:cNvPr id="4" name="Chart 3" descr="GRAPH;GENERIC_GRAPH;ROW1=TECHNOLOGIES,COL1=METRICS,TECHNOLOGIES=ALL,METRICS=10151"/>
-          <p:cNvGraphicFramePr/>
-          <p:nvPr>
-            <p:extLst>
-              <p:ext uri="{D42A27DB-BD31-4B8C-83A1-F6EECF244321}">
-                <p14:modId xmlns:p14="http://schemas.microsoft.com/office/powerpoint/2010/main" val="3288610499"/>
-              </p:ext>
-            </p:extLst>
-          </p:nvPr>
-        </p:nvGraphicFramePr>
-        <p:xfrm>
-          <a:off x="642730" y="2089269"/>
-          <a:ext cx="5337656" cy="3828055"/>
-        </p:xfrm>
-        <a:graphic>
-          <a:graphicData uri="http://schemas.openxmlformats.org/drawingml/2006/chart">
-            <c:chart xmlns:c="http://schemas.openxmlformats.org/drawingml/2006/chart" xmlns:r="http://schemas.openxmlformats.org/officeDocument/2006/relationships" r:id="rId2"/>
-          </a:graphicData>
-        </a:graphic>
-      </p:graphicFrame>
-      <p:graphicFrame>
-        <p:nvGraphicFramePr>
-          <p:cNvPr id="5" name="Chart 4" descr="GRAPH;GENERIC_GRAPH;ROW1=MODULES,COL1=METRICS,MODULES=ALL,METRICS=10151"/>
-          <p:cNvGraphicFramePr/>
-          <p:nvPr>
-            <p:extLst>
-              <p:ext uri="{D42A27DB-BD31-4B8C-83A1-F6EECF244321}">
-                <p14:modId xmlns:p14="http://schemas.microsoft.com/office/powerpoint/2010/main" val="2724615435"/>
-              </p:ext>
-            </p:extLst>
-          </p:nvPr>
-        </p:nvGraphicFramePr>
-        <p:xfrm>
-          <a:off x="5900529" y="2089269"/>
-          <a:ext cx="5524215" cy="3691421"/>
-        </p:xfrm>
-        <a:graphic>
-          <a:graphicData uri="http://schemas.openxmlformats.org/drawingml/2006/chart">
-            <c:chart xmlns:c="http://schemas.openxmlformats.org/drawingml/2006/chart" xmlns:r="http://schemas.openxmlformats.org/officeDocument/2006/relationships" r:id="rId3"/>
-          </a:graphicData>
-        </a:graphic>
-      </p:graphicFrame>
-    </p:spTree>
-    <p:extLst>
-      <p:ext uri="{BB962C8B-B14F-4D97-AF65-F5344CB8AC3E}">
-        <p14:creationId xmlns:p14="http://schemas.microsoft.com/office/powerpoint/2010/main" val="792657900"/>
       </p:ext>
     </p:extLst>
   </p:cSld>

</xml_diff>

<commit_message>
REPORTGEN-352 : Change title of a graph
</commit_message>
<xml_diff>
--- a/CastReporting.Reporting/TemplatesFiles/Generic Graph Definition.pptx
+++ b/CastReporting.Reporting/TemplatesFiles/Generic Graph Definition.pptx
@@ -1755,10 +1755,28 @@
               </a:defRPr>
             </a:pPr>
             <a:r>
+              <a:rPr lang="fr-FR" sz="1000" b="1">
+                <a:effectLst/>
+              </a:rPr>
+              <a:t>ADDED,</a:t>
+            </a:r>
+            <a:r>
+              <a:rPr lang="fr-FR" sz="1000" b="1" baseline="0">
+                <a:effectLst/>
+              </a:rPr>
+              <a:t> </a:t>
+            </a:r>
+            <a:r>
+              <a:rPr lang="fr-FR" sz="1000" b="1">
+                <a:effectLst/>
+              </a:rPr>
+              <a:t>REMOVED AND TOTAL VIOLATIONS </a:t>
+            </a:r>
+            <a:r>
               <a:rPr lang="fr-FR" sz="1000" b="1" dirty="0">
                 <a:effectLst/>
               </a:rPr>
-              <a:t>ADDED AND REMOVED VIOLATIONS BY QUALITY</a:t>
+              <a:t>BY QUALITY</a:t>
             </a:r>
             <a:r>
               <a:rPr lang="fr-FR" sz="1000" b="1" baseline="0" dirty="0">
@@ -9957,7 +9975,7 @@
           <a:p>
             <a:fld id="{BE7CF963-E58D-FC4D-BA9E-60A980752DC6}" type="datetimeFigureOut">
               <a:rPr lang="en-US" smtClean="0"/>
-              <a:t>6/26/2018</a:t>
+              <a:t>7/5/2018</a:t>
             </a:fld>
             <a:endParaRPr lang="en-US"/>
           </a:p>
@@ -10446,7 +10464,7 @@
           <a:p>
             <a:fld id="{B590C078-9131-4E49-8A0D-400FEE8377B5}" type="datetimeFigureOut">
               <a:rPr lang="en-US" smtClean="0"/>
-              <a:t>6/26/2018</a:t>
+              <a:t>7/5/2018</a:t>
             </a:fld>
             <a:endParaRPr lang="en-US"/>
           </a:p>
@@ -14031,7 +14049,7 @@
           <a:p>
             <a:fld id="{B590C078-9131-4E49-8A0D-400FEE8377B5}" type="datetimeFigureOut">
               <a:rPr lang="en-US" smtClean="0"/>
-              <a:t>6/26/2018</a:t>
+              <a:t>7/5/2018</a:t>
             </a:fld>
             <a:endParaRPr lang="en-US"/>
           </a:p>
@@ -18109,7 +18127,7 @@
           <a:p>
             <a:fld id="{B590C078-9131-4E49-8A0D-400FEE8377B5}" type="datetimeFigureOut">
               <a:rPr lang="en-US" smtClean="0"/>
-              <a:t>6/26/2018</a:t>
+              <a:t>7/5/2018</a:t>
             </a:fld>
             <a:endParaRPr lang="en-US"/>
           </a:p>
@@ -21934,7 +21952,7 @@
           <a:p>
             <a:fld id="{B590C078-9131-4E49-8A0D-400FEE8377B5}" type="datetimeFigureOut">
               <a:rPr lang="en-US" smtClean="0"/>
-              <a:t>6/26/2018</a:t>
+              <a:t>7/5/2018</a:t>
             </a:fld>
             <a:endParaRPr lang="en-US"/>
           </a:p>
@@ -25953,7 +25971,7 @@
           <p:nvPr>
             <p:extLst>
               <p:ext uri="{D42A27DB-BD31-4B8C-83A1-F6EECF244321}">
-                <p14:modId xmlns:p14="http://schemas.microsoft.com/office/powerpoint/2010/main" val="226504414"/>
+                <p14:modId xmlns:p14="http://schemas.microsoft.com/office/powerpoint/2010/main" val="1312746053"/>
               </p:ext>
             </p:extLst>
           </p:nvPr>

</xml_diff>

<commit_message>
REPORTGEN-397 : update extension name for quality standards
</commit_message>
<xml_diff>
--- a/CastReporting.Reporting/TemplatesFiles/Generic Graph Definition.pptx
+++ b/CastReporting.Reporting/TemplatesFiles/Generic Graph Definition.pptx
@@ -9975,7 +9975,7 @@
           <a:p>
             <a:fld id="{BE7CF963-E58D-FC4D-BA9E-60A980752DC6}" type="datetimeFigureOut">
               <a:rPr lang="en-US" smtClean="0"/>
-              <a:t>7/5/2018</a:t>
+              <a:t>9/7/2018</a:t>
             </a:fld>
             <a:endParaRPr lang="en-US"/>
           </a:p>
@@ -10464,7 +10464,7 @@
           <a:p>
             <a:fld id="{B590C078-9131-4E49-8A0D-400FEE8377B5}" type="datetimeFigureOut">
               <a:rPr lang="en-US" smtClean="0"/>
-              <a:t>7/5/2018</a:t>
+              <a:t>9/7/2018</a:t>
             </a:fld>
             <a:endParaRPr lang="en-US"/>
           </a:p>
@@ -14049,7 +14049,7 @@
           <a:p>
             <a:fld id="{B590C078-9131-4E49-8A0D-400FEE8377B5}" type="datetimeFigureOut">
               <a:rPr lang="en-US" smtClean="0"/>
-              <a:t>7/5/2018</a:t>
+              <a:t>9/7/2018</a:t>
             </a:fld>
             <a:endParaRPr lang="en-US"/>
           </a:p>
@@ -18127,7 +18127,7 @@
           <a:p>
             <a:fld id="{B590C078-9131-4E49-8A0D-400FEE8377B5}" type="datetimeFigureOut">
               <a:rPr lang="en-US" smtClean="0"/>
-              <a:t>7/5/2018</a:t>
+              <a:t>9/7/2018</a:t>
             </a:fld>
             <a:endParaRPr lang="en-US"/>
           </a:p>
@@ -21952,7 +21952,7 @@
           <a:p>
             <a:fld id="{B590C078-9131-4E49-8A0D-400FEE8377B5}" type="datetimeFigureOut">
               <a:rPr lang="en-US" smtClean="0"/>
-              <a:t>7/5/2018</a:t>
+              <a:t>9/7/2018</a:t>
             </a:fld>
             <a:endParaRPr lang="en-US"/>
           </a:p>
@@ -24644,7 +24644,15 @@
             </a:r>
             <a:r>
               <a:rPr lang="en-GB" dirty="0"/>
-              <a:t>The selection of metrics by standard quality tag name should only be used for an application where the extension “Standard Quality Rules” is installed. If not, no metrics will be selected and </a:t>
+              <a:t>The selection of metrics by standard quality tag name should only be used for an application where the </a:t>
+            </a:r>
+            <a:r>
+              <a:rPr lang="en-GB"/>
+              <a:t>extension “Quality Standards Support” </a:t>
+            </a:r>
+            <a:r>
+              <a:rPr lang="en-GB" dirty="0"/>
+              <a:t>is installed. If not, no metrics will be selected and </a:t>
             </a:r>
             <a:r>
               <a:rPr lang="en-US" dirty="0"/>

</xml_diff>

<commit_message>
REPORTGEN-397 : fix extension name in templates
</commit_message>
<xml_diff>
--- a/CastReporting.Reporting/TemplatesFiles/Generic Graph Definition.pptx
+++ b/CastReporting.Reporting/TemplatesFiles/Generic Graph Definition.pptx
@@ -9975,7 +9975,7 @@
           <a:p>
             <a:fld id="{BE7CF963-E58D-FC4D-BA9E-60A980752DC6}" type="datetimeFigureOut">
               <a:rPr lang="en-US" smtClean="0"/>
-              <a:t>9/7/2018</a:t>
+              <a:t>9/27/2018</a:t>
             </a:fld>
             <a:endParaRPr lang="en-US"/>
           </a:p>
@@ -10464,7 +10464,7 @@
           <a:p>
             <a:fld id="{B590C078-9131-4E49-8A0D-400FEE8377B5}" type="datetimeFigureOut">
               <a:rPr lang="en-US" smtClean="0"/>
-              <a:t>9/7/2018</a:t>
+              <a:t>9/27/2018</a:t>
             </a:fld>
             <a:endParaRPr lang="en-US"/>
           </a:p>
@@ -14049,7 +14049,7 @@
           <a:p>
             <a:fld id="{B590C078-9131-4E49-8A0D-400FEE8377B5}" type="datetimeFigureOut">
               <a:rPr lang="en-US" smtClean="0"/>
-              <a:t>9/7/2018</a:t>
+              <a:t>9/27/2018</a:t>
             </a:fld>
             <a:endParaRPr lang="en-US"/>
           </a:p>
@@ -18127,7 +18127,7 @@
           <a:p>
             <a:fld id="{B590C078-9131-4E49-8A0D-400FEE8377B5}" type="datetimeFigureOut">
               <a:rPr lang="en-US" smtClean="0"/>
-              <a:t>9/7/2018</a:t>
+              <a:t>9/27/2018</a:t>
             </a:fld>
             <a:endParaRPr lang="en-US"/>
           </a:p>
@@ -21952,7 +21952,7 @@
           <a:p>
             <a:fld id="{B590C078-9131-4E49-8A0D-400FEE8377B5}" type="datetimeFigureOut">
               <a:rPr lang="en-US" smtClean="0"/>
-              <a:t>9/7/2018</a:t>
+              <a:t>9/27/2018</a:t>
             </a:fld>
             <a:endParaRPr lang="en-US"/>
           </a:p>
@@ -24644,15 +24644,7 @@
             </a:r>
             <a:r>
               <a:rPr lang="en-GB" dirty="0"/>
-              <a:t>The selection of metrics by standard quality tag name should only be used for an application where the </a:t>
-            </a:r>
-            <a:r>
-              <a:rPr lang="en-GB"/>
-              <a:t>extension “Quality Standards Support” </a:t>
-            </a:r>
-            <a:r>
-              <a:rPr lang="en-GB" dirty="0"/>
-              <a:t>is installed. If not, no metrics will be selected and </a:t>
+              <a:t>The selection of metrics by standard quality tag name should only be used for an application where the extension “Quality Standards Support” is installed. If not, no metrics will be selected and </a:t>
             </a:r>
             <a:r>
               <a:rPr lang="en-US" dirty="0"/>
@@ -26037,7 +26029,7 @@
           <a:p>
             <a:r>
               <a:rPr lang="en-GB" dirty="0"/>
-              <a:t>The selection of metrics by standard quality tag name should only be used for an application where the extension “Standard Quality Rules” is installed. If not, no metrics will be selected and </a:t>
+              <a:t>The selection of metrics by standard quality tag name should only be used for an application where the extension “Quality Standards Support” is installed. If not, no metrics will be selected and </a:t>
             </a:r>
             <a:r>
               <a:rPr lang="en-US" dirty="0"/>

</xml_diff>